<commit_message>
complements to lab services spec (html) + corrections of examples
</commit_message>
<xml_diff>
--- a/input/images-source/LabCompendium.pptx
+++ b/input/images-source/LabCompendium.pptx
@@ -197,7 +197,7 @@
           <a:p>
             <a:fld id="{C0FC2EA5-DDD9-41B5-A743-573E81829967}" type="datetimeFigureOut">
               <a:rPr lang="fr-FR" smtClean="0"/>
-              <a:t>11/02/2020</a:t>
+              <a:t>12/02/2020</a:t>
             </a:fld>
             <a:endParaRPr lang="fr-FR"/>
           </a:p>
@@ -695,7 +695,7 @@
           <a:p>
             <a:fld id="{DEBA1CB3-45B4-4365-8A01-D60AF6EBF46C}" type="datetimeFigureOut">
               <a:rPr lang="fr-FR" smtClean="0"/>
-              <a:t>11/02/2020</a:t>
+              <a:t>12/02/2020</a:t>
             </a:fld>
             <a:endParaRPr lang="fr-FR"/>
           </a:p>
@@ -893,7 +893,7 @@
           <a:p>
             <a:fld id="{DEBA1CB3-45B4-4365-8A01-D60AF6EBF46C}" type="datetimeFigureOut">
               <a:rPr lang="fr-FR" smtClean="0"/>
-              <a:t>11/02/2020</a:t>
+              <a:t>12/02/2020</a:t>
             </a:fld>
             <a:endParaRPr lang="fr-FR"/>
           </a:p>
@@ -1101,7 +1101,7 @@
           <a:p>
             <a:fld id="{DEBA1CB3-45B4-4365-8A01-D60AF6EBF46C}" type="datetimeFigureOut">
               <a:rPr lang="fr-FR" smtClean="0"/>
-              <a:t>11/02/2020</a:t>
+              <a:t>12/02/2020</a:t>
             </a:fld>
             <a:endParaRPr lang="fr-FR"/>
           </a:p>
@@ -1299,7 +1299,7 @@
           <a:p>
             <a:fld id="{DEBA1CB3-45B4-4365-8A01-D60AF6EBF46C}" type="datetimeFigureOut">
               <a:rPr lang="fr-FR" smtClean="0"/>
-              <a:t>11/02/2020</a:t>
+              <a:t>12/02/2020</a:t>
             </a:fld>
             <a:endParaRPr lang="fr-FR"/>
           </a:p>
@@ -1574,7 +1574,7 @@
           <a:p>
             <a:fld id="{DEBA1CB3-45B4-4365-8A01-D60AF6EBF46C}" type="datetimeFigureOut">
               <a:rPr lang="fr-FR" smtClean="0"/>
-              <a:t>11/02/2020</a:t>
+              <a:t>12/02/2020</a:t>
             </a:fld>
             <a:endParaRPr lang="fr-FR"/>
           </a:p>
@@ -1839,7 +1839,7 @@
           <a:p>
             <a:fld id="{DEBA1CB3-45B4-4365-8A01-D60AF6EBF46C}" type="datetimeFigureOut">
               <a:rPr lang="fr-FR" smtClean="0"/>
-              <a:t>11/02/2020</a:t>
+              <a:t>12/02/2020</a:t>
             </a:fld>
             <a:endParaRPr lang="fr-FR"/>
           </a:p>
@@ -2251,7 +2251,7 @@
           <a:p>
             <a:fld id="{DEBA1CB3-45B4-4365-8A01-D60AF6EBF46C}" type="datetimeFigureOut">
               <a:rPr lang="fr-FR" smtClean="0"/>
-              <a:t>11/02/2020</a:t>
+              <a:t>12/02/2020</a:t>
             </a:fld>
             <a:endParaRPr lang="fr-FR"/>
           </a:p>
@@ -2392,7 +2392,7 @@
           <a:p>
             <a:fld id="{DEBA1CB3-45B4-4365-8A01-D60AF6EBF46C}" type="datetimeFigureOut">
               <a:rPr lang="fr-FR" smtClean="0"/>
-              <a:t>11/02/2020</a:t>
+              <a:t>12/02/2020</a:t>
             </a:fld>
             <a:endParaRPr lang="fr-FR"/>
           </a:p>
@@ -2505,7 +2505,7 @@
           <a:p>
             <a:fld id="{DEBA1CB3-45B4-4365-8A01-D60AF6EBF46C}" type="datetimeFigureOut">
               <a:rPr lang="fr-FR" smtClean="0"/>
-              <a:t>11/02/2020</a:t>
+              <a:t>12/02/2020</a:t>
             </a:fld>
             <a:endParaRPr lang="fr-FR"/>
           </a:p>
@@ -2816,7 +2816,7 @@
           <a:p>
             <a:fld id="{DEBA1CB3-45B4-4365-8A01-D60AF6EBF46C}" type="datetimeFigureOut">
               <a:rPr lang="fr-FR" smtClean="0"/>
-              <a:t>11/02/2020</a:t>
+              <a:t>12/02/2020</a:t>
             </a:fld>
             <a:endParaRPr lang="fr-FR"/>
           </a:p>
@@ -3104,7 +3104,7 @@
           <a:p>
             <a:fld id="{DEBA1CB3-45B4-4365-8A01-D60AF6EBF46C}" type="datetimeFigureOut">
               <a:rPr lang="fr-FR" smtClean="0"/>
-              <a:t>11/02/2020</a:t>
+              <a:t>12/02/2020</a:t>
             </a:fld>
             <a:endParaRPr lang="fr-FR"/>
           </a:p>
@@ -3345,7 +3345,7 @@
           <a:p>
             <a:fld id="{DEBA1CB3-45B4-4365-8A01-D60AF6EBF46C}" type="datetimeFigureOut">
               <a:rPr lang="fr-FR" smtClean="0"/>
-              <a:t>11/02/2020</a:t>
+              <a:t>12/02/2020</a:t>
             </a:fld>
             <a:endParaRPr lang="fr-FR"/>
           </a:p>
@@ -3776,7 +3776,7 @@
         </p:nvSpPr>
         <p:spPr>
           <a:xfrm>
-            <a:off x="3881603" y="388733"/>
+            <a:off x="4436782" y="334303"/>
             <a:ext cx="607145" cy="369332"/>
           </a:xfrm>
           <a:prstGeom prst="rect">
@@ -3815,8 +3815,8 @@
         </p:nvCxnSpPr>
         <p:spPr>
           <a:xfrm rot="16200000" flipV="1">
-            <a:off x="4738077" y="-107569"/>
-            <a:ext cx="372868" cy="2121650"/>
+            <a:off x="5048324" y="82932"/>
+            <a:ext cx="307552" cy="1566472"/>
           </a:xfrm>
           <a:prstGeom prst="bentConnector2">
             <a:avLst/>
@@ -3855,7 +3855,7 @@
         </p:nvSpPr>
         <p:spPr>
           <a:xfrm>
-            <a:off x="1702701" y="198251"/>
+            <a:off x="2257879" y="143821"/>
             <a:ext cx="2160985" cy="1137142"/>
           </a:xfrm>
           <a:prstGeom prst="rect">
@@ -3955,7 +3955,7 @@
         </p:nvSpPr>
         <p:spPr>
           <a:xfrm>
-            <a:off x="4255955" y="750410"/>
+            <a:off x="5438569" y="393286"/>
             <a:ext cx="1876007" cy="369332"/>
           </a:xfrm>
           <a:prstGeom prst="rect">
@@ -3994,7 +3994,7 @@
         </p:nvCxnSpPr>
         <p:spPr>
           <a:xfrm rot="5400000">
-            <a:off x="5600182" y="2665386"/>
+            <a:off x="5600182" y="2545640"/>
             <a:ext cx="770309" cy="1"/>
           </a:xfrm>
           <a:prstGeom prst="bentConnector3">
@@ -4036,7 +4036,7 @@
         </p:nvSpPr>
         <p:spPr>
           <a:xfrm>
-            <a:off x="4527907" y="3050541"/>
+            <a:off x="4527907" y="2930795"/>
             <a:ext cx="2914855" cy="1140542"/>
           </a:xfrm>
           <a:prstGeom prst="rect">
@@ -4143,7 +4143,7 @@
         </p:nvSpPr>
         <p:spPr>
           <a:xfrm>
-            <a:off x="5516244" y="2635273"/>
+            <a:off x="5516244" y="2515527"/>
             <a:ext cx="607145" cy="369332"/>
           </a:xfrm>
           <a:prstGeom prst="rect">
@@ -4178,7 +4178,7 @@
         </p:nvSpPr>
         <p:spPr>
           <a:xfrm>
-            <a:off x="3727352" y="2281178"/>
+            <a:off x="3727352" y="2161432"/>
             <a:ext cx="2593912" cy="369332"/>
           </a:xfrm>
           <a:prstGeom prst="rect">
@@ -4213,7 +4213,7 @@
         </p:nvSpPr>
         <p:spPr>
           <a:xfrm>
-            <a:off x="4247572" y="4878514"/>
+            <a:off x="4247572" y="4758768"/>
             <a:ext cx="3479034" cy="1090457"/>
           </a:xfrm>
           <a:prstGeom prst="rect">
@@ -4320,7 +4320,7 @@
         </p:nvSpPr>
         <p:spPr>
           <a:xfrm>
-            <a:off x="8555068" y="4878514"/>
+            <a:off x="8555068" y="4758768"/>
             <a:ext cx="3111179" cy="1090457"/>
           </a:xfrm>
           <a:prstGeom prst="rect">
@@ -4427,7 +4427,7 @@
         </p:nvSpPr>
         <p:spPr>
           <a:xfrm>
-            <a:off x="456300" y="4878514"/>
+            <a:off x="456300" y="4824084"/>
             <a:ext cx="2887484" cy="1142774"/>
           </a:xfrm>
           <a:prstGeom prst="rect">
@@ -4538,8 +4538,8 @@
         </p:nvCxnSpPr>
         <p:spPr>
           <a:xfrm rot="10800000" flipV="1">
-            <a:off x="1900043" y="3620812"/>
-            <a:ext cx="2627865" cy="1257702"/>
+            <a:off x="1900043" y="3501066"/>
+            <a:ext cx="2627865" cy="1323018"/>
           </a:xfrm>
           <a:prstGeom prst="bentConnector2">
             <a:avLst/>
@@ -4582,7 +4582,7 @@
         </p:nvCxnSpPr>
         <p:spPr>
           <a:xfrm rot="16200000" flipH="1">
-            <a:off x="5642497" y="4533921"/>
+            <a:off x="5642497" y="4414175"/>
             <a:ext cx="687431" cy="1754"/>
           </a:xfrm>
           <a:prstGeom prst="bentConnector3">
@@ -4628,7 +4628,7 @@
         </p:nvCxnSpPr>
         <p:spPr>
           <a:xfrm>
-            <a:off x="7442762" y="3620812"/>
+            <a:off x="7442762" y="3501066"/>
             <a:ext cx="2667896" cy="1257702"/>
           </a:xfrm>
           <a:prstGeom prst="bentConnector2">
@@ -4668,7 +4668,7 @@
         </p:nvSpPr>
         <p:spPr>
           <a:xfrm>
-            <a:off x="2210804" y="3258318"/>
+            <a:off x="2210804" y="3203888"/>
             <a:ext cx="2308432" cy="369332"/>
           </a:xfrm>
           <a:prstGeom prst="rect">
@@ -4703,7 +4703,7 @@
         </p:nvSpPr>
         <p:spPr>
           <a:xfrm>
-            <a:off x="1891372" y="4445589"/>
+            <a:off x="1891372" y="4391159"/>
             <a:ext cx="607145" cy="369332"/>
           </a:xfrm>
           <a:prstGeom prst="rect">
@@ -4738,7 +4738,7 @@
         </p:nvSpPr>
         <p:spPr>
           <a:xfrm>
-            <a:off x="5976002" y="4207356"/>
+            <a:off x="5976002" y="4087610"/>
             <a:ext cx="2577103" cy="369332"/>
           </a:xfrm>
           <a:prstGeom prst="rect">
@@ -4773,7 +4773,7 @@
         </p:nvSpPr>
         <p:spPr>
           <a:xfrm>
-            <a:off x="6000916" y="4520089"/>
+            <a:off x="6000916" y="4400343"/>
             <a:ext cx="607145" cy="369332"/>
           </a:xfrm>
           <a:prstGeom prst="rect">
@@ -4808,7 +4808,7 @@
         </p:nvSpPr>
         <p:spPr>
           <a:xfrm>
-            <a:off x="9601316" y="4481343"/>
+            <a:off x="9601316" y="4361597"/>
             <a:ext cx="607145" cy="369332"/>
           </a:xfrm>
           <a:prstGeom prst="rect">
@@ -4843,7 +4843,7 @@
         </p:nvSpPr>
         <p:spPr>
           <a:xfrm>
-            <a:off x="7470755" y="3244398"/>
+            <a:off x="7470755" y="3124652"/>
             <a:ext cx="3111179" cy="369332"/>
           </a:xfrm>
           <a:prstGeom prst="rect">
@@ -4878,7 +4878,7 @@
         </p:nvSpPr>
         <p:spPr>
           <a:xfrm>
-            <a:off x="47328" y="65567"/>
+            <a:off x="602506" y="11137"/>
             <a:ext cx="1540369" cy="646331"/>
           </a:xfrm>
           <a:prstGeom prst="rect">
@@ -4921,7 +4921,7 @@
         </p:nvSpPr>
         <p:spPr>
           <a:xfrm>
-            <a:off x="7314576" y="971935"/>
+            <a:off x="7314576" y="852189"/>
             <a:ext cx="3211448" cy="646331"/>
           </a:xfrm>
           <a:prstGeom prst="rect">
@@ -4970,7 +4970,7 @@
         </p:nvSpPr>
         <p:spPr>
           <a:xfrm>
-            <a:off x="5951984" y="2653781"/>
+            <a:off x="6017300" y="2523149"/>
             <a:ext cx="6190996" cy="369332"/>
           </a:xfrm>
           <a:prstGeom prst="rect">
@@ -5019,7 +5019,7 @@
         </p:nvSpPr>
         <p:spPr>
           <a:xfrm>
-            <a:off x="319249" y="3886478"/>
+            <a:off x="319249" y="3832048"/>
             <a:ext cx="1540369" cy="923330"/>
           </a:xfrm>
           <a:prstGeom prst="rect">
@@ -5069,7 +5069,7 @@
         </p:nvSpPr>
         <p:spPr>
           <a:xfrm>
-            <a:off x="3708376" y="4222015"/>
+            <a:off x="3708376" y="4102269"/>
             <a:ext cx="2268722" cy="646331"/>
           </a:xfrm>
           <a:prstGeom prst="rect">
@@ -5119,7 +5119,7 @@
         </p:nvSpPr>
         <p:spPr>
           <a:xfrm>
-            <a:off x="10172283" y="3868765"/>
+            <a:off x="10172283" y="3749019"/>
             <a:ext cx="1541314" cy="923330"/>
           </a:xfrm>
           <a:prstGeom prst="rect">
@@ -5168,7 +5168,7 @@
         </p:nvSpPr>
         <p:spPr>
           <a:xfrm>
-            <a:off x="6908365" y="1932366"/>
+            <a:off x="6908365" y="1812620"/>
             <a:ext cx="340999" cy="324520"/>
           </a:xfrm>
           <a:prstGeom prst="rect">
@@ -5218,7 +5218,7 @@
         </p:nvCxnSpPr>
         <p:spPr>
           <a:xfrm rot="5400000" flipH="1" flipV="1">
-            <a:off x="7082984" y="2090506"/>
+            <a:off x="7082984" y="1970760"/>
             <a:ext cx="162260" cy="170499"/>
           </a:xfrm>
           <a:prstGeom prst="bentConnector4">
@@ -5261,7 +5261,7 @@
         </p:nvSpPr>
         <p:spPr>
           <a:xfrm>
-            <a:off x="6559778" y="2249873"/>
+            <a:off x="6559778" y="2130127"/>
             <a:ext cx="607145" cy="369332"/>
           </a:xfrm>
           <a:prstGeom prst="rect">
@@ -5296,7 +5296,7 @@
         </p:nvSpPr>
         <p:spPr>
           <a:xfrm>
-            <a:off x="7282291" y="1757764"/>
+            <a:off x="7282291" y="1638018"/>
             <a:ext cx="1740637" cy="369332"/>
           </a:xfrm>
           <a:prstGeom prst="rect">
@@ -5331,7 +5331,7 @@
         </p:nvSpPr>
         <p:spPr>
           <a:xfrm>
-            <a:off x="4688380" y="1139690"/>
+            <a:off x="4688380" y="1019944"/>
             <a:ext cx="2593911" cy="1140542"/>
           </a:xfrm>
           <a:prstGeom prst="rect">
@@ -5438,7 +5438,7 @@
         </p:nvSpPr>
         <p:spPr>
           <a:xfrm>
-            <a:off x="7470755" y="6193297"/>
+            <a:off x="7470755" y="6073551"/>
             <a:ext cx="1667712" cy="476672"/>
           </a:xfrm>
           <a:prstGeom prst="rect">
@@ -5530,7 +5530,7 @@
         </p:nvCxnSpPr>
         <p:spPr>
           <a:xfrm rot="16200000" flipH="1">
-            <a:off x="6497591" y="5458469"/>
+            <a:off x="6497591" y="5338723"/>
             <a:ext cx="462662" cy="1483666"/>
           </a:xfrm>
           <a:prstGeom prst="bentConnector2">
@@ -5574,7 +5574,7 @@
         </p:nvCxnSpPr>
         <p:spPr>
           <a:xfrm rot="5400000">
-            <a:off x="9393232" y="5714207"/>
+            <a:off x="9393232" y="5594461"/>
             <a:ext cx="462662" cy="972191"/>
           </a:xfrm>
           <a:prstGeom prst="bentConnector2">
@@ -5614,7 +5614,7 @@
         </p:nvSpPr>
         <p:spPr>
           <a:xfrm>
-            <a:off x="6871041" y="6422142"/>
+            <a:off x="6871041" y="5986708"/>
             <a:ext cx="607145" cy="369332"/>
           </a:xfrm>
           <a:prstGeom prst="rect">
@@ -5649,7 +5649,7 @@
         </p:nvSpPr>
         <p:spPr>
           <a:xfrm>
-            <a:off x="9194141" y="6408899"/>
+            <a:off x="9194141" y="5973465"/>
             <a:ext cx="607145" cy="369332"/>
           </a:xfrm>
           <a:prstGeom prst="rect">
@@ -5795,8 +5795,8 @@
         </p:nvCxnSpPr>
         <p:spPr>
           <a:xfrm rot="10800000" flipV="1">
-            <a:off x="1900042" y="1709961"/>
-            <a:ext cx="2788338" cy="252786"/>
+            <a:off x="1900042" y="1590215"/>
+            <a:ext cx="2788338" cy="372532"/>
           </a:xfrm>
           <a:prstGeom prst="bentConnector2">
             <a:avLst/>
@@ -5835,7 +5835,7 @@
         </p:nvSpPr>
         <p:spPr>
           <a:xfrm>
-            <a:off x="1399128" y="1563300"/>
+            <a:off x="1946952" y="1598863"/>
             <a:ext cx="607145" cy="369332"/>
           </a:xfrm>
           <a:prstGeom prst="rect">
@@ -5870,8 +5870,8 @@
         </p:nvSpPr>
         <p:spPr>
           <a:xfrm>
-            <a:off x="3252196" y="1381265"/>
-            <a:ext cx="1740637" cy="369332"/>
+            <a:off x="3330595" y="1545357"/>
+            <a:ext cx="1443487" cy="369332"/>
           </a:xfrm>
           <a:prstGeom prst="rect">
             <a:avLst/>
@@ -5887,6 +5887,99 @@
             <a:r>
               <a:rPr lang="en-US" noProof="1"/>
               <a:t>serviceBilling</a:t>
+            </a:r>
+          </a:p>
+        </p:txBody>
+      </p:sp>
+      <p:sp>
+        <p:nvSpPr>
+          <p:cNvPr id="49" name="ZoneTexte 48">
+            <a:extLst>
+              <a:ext uri="{FF2B5EF4-FFF2-40B4-BE49-F238E27FC236}">
+                <a16:creationId xmlns:a16="http://schemas.microsoft.com/office/drawing/2014/main" id="{34BC439E-46D1-4D3A-A747-099A225EED85}"/>
+              </a:ext>
+            </a:extLst>
+          </p:cNvPr>
+          <p:cNvSpPr txBox="1"/>
+          <p:nvPr/>
+        </p:nvSpPr>
+        <p:spPr>
+          <a:xfrm>
+            <a:off x="-2790" y="1280963"/>
+            <a:ext cx="1849648" cy="646331"/>
+          </a:xfrm>
+          <a:prstGeom prst="rect">
+            <a:avLst/>
+          </a:prstGeom>
+          <a:noFill/>
+        </p:spPr>
+        <p:txBody>
+          <a:bodyPr wrap="square" rtlCol="0">
+            <a:spAutoFit/>
+          </a:bodyPr>
+          <a:lstStyle/>
+          <a:p>
+            <a:pPr algn="r"/>
+            <a:r>
+              <a:rPr lang="en-US" i="1" noProof="1">
+                <a:solidFill>
+                  <a:schemeClr val="accent1">
+                    <a:lumMod val="60000"/>
+                    <a:lumOff val="40000"/>
+                  </a:schemeClr>
+                </a:solidFill>
+              </a:rPr>
+              <a:t>a billing code and associated rules</a:t>
+            </a:r>
+          </a:p>
+        </p:txBody>
+      </p:sp>
+      <p:sp>
+        <p:nvSpPr>
+          <p:cNvPr id="50" name="ZoneTexte 49">
+            <a:extLst>
+              <a:ext uri="{FF2B5EF4-FFF2-40B4-BE49-F238E27FC236}">
+                <a16:creationId xmlns:a16="http://schemas.microsoft.com/office/drawing/2014/main" id="{8B1414DC-932C-4FB2-A682-250462EEBE39}"/>
+              </a:ext>
+            </a:extLst>
+          </p:cNvPr>
+          <p:cNvSpPr txBox="1"/>
+          <p:nvPr/>
+        </p:nvSpPr>
+        <p:spPr>
+          <a:xfrm>
+            <a:off x="5607055" y="6550223"/>
+            <a:ext cx="4601406" cy="369332"/>
+          </a:xfrm>
+          <a:prstGeom prst="rect">
+            <a:avLst/>
+          </a:prstGeom>
+          <a:noFill/>
+        </p:spPr>
+        <p:txBody>
+          <a:bodyPr wrap="square" rtlCol="0">
+            <a:spAutoFit/>
+          </a:bodyPr>
+          <a:lstStyle>
+            <a:defPPr>
+              <a:defRPr lang="fr-FR"/>
+            </a:defPPr>
+            <a:lvl1pPr>
+              <a:defRPr>
+                <a:solidFill>
+                  <a:schemeClr val="accent1">
+                    <a:lumMod val="60000"/>
+                    <a:lumOff val="40000"/>
+                  </a:schemeClr>
+                </a:solidFill>
+              </a:defRPr>
+            </a:lvl1pPr>
+          </a:lstStyle>
+          <a:p>
+            <a:pPr algn="r"/>
+            <a:r>
+              <a:rPr lang="en-US" i="1" noProof="1"/>
+              <a:t>valid|normal|abnormal|critical values</a:t>
             </a:r>
           </a:p>
         </p:txBody>

</xml_diff>

<commit_message>
corrected slicing on PlanDefinition.action.code.coding
</commit_message>
<xml_diff>
--- a/input/images-source/LabCompendium.pptx
+++ b/input/images-source/LabCompendium.pptx
@@ -197,7 +197,7 @@
           <a:p>
             <a:fld id="{C0FC2EA5-DDD9-41B5-A743-573E81829967}" type="datetimeFigureOut">
               <a:rPr lang="fr-FR" smtClean="0"/>
-              <a:t>12/02/2020</a:t>
+              <a:t>29/05/2020</a:t>
             </a:fld>
             <a:endParaRPr lang="fr-FR"/>
           </a:p>
@@ -695,7 +695,7 @@
           <a:p>
             <a:fld id="{DEBA1CB3-45B4-4365-8A01-D60AF6EBF46C}" type="datetimeFigureOut">
               <a:rPr lang="fr-FR" smtClean="0"/>
-              <a:t>12/02/2020</a:t>
+              <a:t>29/05/2020</a:t>
             </a:fld>
             <a:endParaRPr lang="fr-FR"/>
           </a:p>
@@ -893,7 +893,7 @@
           <a:p>
             <a:fld id="{DEBA1CB3-45B4-4365-8A01-D60AF6EBF46C}" type="datetimeFigureOut">
               <a:rPr lang="fr-FR" smtClean="0"/>
-              <a:t>12/02/2020</a:t>
+              <a:t>29/05/2020</a:t>
             </a:fld>
             <a:endParaRPr lang="fr-FR"/>
           </a:p>
@@ -1101,7 +1101,7 @@
           <a:p>
             <a:fld id="{DEBA1CB3-45B4-4365-8A01-D60AF6EBF46C}" type="datetimeFigureOut">
               <a:rPr lang="fr-FR" smtClean="0"/>
-              <a:t>12/02/2020</a:t>
+              <a:t>29/05/2020</a:t>
             </a:fld>
             <a:endParaRPr lang="fr-FR"/>
           </a:p>
@@ -1299,7 +1299,7 @@
           <a:p>
             <a:fld id="{DEBA1CB3-45B4-4365-8A01-D60AF6EBF46C}" type="datetimeFigureOut">
               <a:rPr lang="fr-FR" smtClean="0"/>
-              <a:t>12/02/2020</a:t>
+              <a:t>29/05/2020</a:t>
             </a:fld>
             <a:endParaRPr lang="fr-FR"/>
           </a:p>
@@ -1574,7 +1574,7 @@
           <a:p>
             <a:fld id="{DEBA1CB3-45B4-4365-8A01-D60AF6EBF46C}" type="datetimeFigureOut">
               <a:rPr lang="fr-FR" smtClean="0"/>
-              <a:t>12/02/2020</a:t>
+              <a:t>29/05/2020</a:t>
             </a:fld>
             <a:endParaRPr lang="fr-FR"/>
           </a:p>
@@ -1839,7 +1839,7 @@
           <a:p>
             <a:fld id="{DEBA1CB3-45B4-4365-8A01-D60AF6EBF46C}" type="datetimeFigureOut">
               <a:rPr lang="fr-FR" smtClean="0"/>
-              <a:t>12/02/2020</a:t>
+              <a:t>29/05/2020</a:t>
             </a:fld>
             <a:endParaRPr lang="fr-FR"/>
           </a:p>
@@ -2251,7 +2251,7 @@
           <a:p>
             <a:fld id="{DEBA1CB3-45B4-4365-8A01-D60AF6EBF46C}" type="datetimeFigureOut">
               <a:rPr lang="fr-FR" smtClean="0"/>
-              <a:t>12/02/2020</a:t>
+              <a:t>29/05/2020</a:t>
             </a:fld>
             <a:endParaRPr lang="fr-FR"/>
           </a:p>
@@ -2392,7 +2392,7 @@
           <a:p>
             <a:fld id="{DEBA1CB3-45B4-4365-8A01-D60AF6EBF46C}" type="datetimeFigureOut">
               <a:rPr lang="fr-FR" smtClean="0"/>
-              <a:t>12/02/2020</a:t>
+              <a:t>29/05/2020</a:t>
             </a:fld>
             <a:endParaRPr lang="fr-FR"/>
           </a:p>
@@ -2505,7 +2505,7 @@
           <a:p>
             <a:fld id="{DEBA1CB3-45B4-4365-8A01-D60AF6EBF46C}" type="datetimeFigureOut">
               <a:rPr lang="fr-FR" smtClean="0"/>
-              <a:t>12/02/2020</a:t>
+              <a:t>29/05/2020</a:t>
             </a:fld>
             <a:endParaRPr lang="fr-FR"/>
           </a:p>
@@ -2816,7 +2816,7 @@
           <a:p>
             <a:fld id="{DEBA1CB3-45B4-4365-8A01-D60AF6EBF46C}" type="datetimeFigureOut">
               <a:rPr lang="fr-FR" smtClean="0"/>
-              <a:t>12/02/2020</a:t>
+              <a:t>29/05/2020</a:t>
             </a:fld>
             <a:endParaRPr lang="fr-FR"/>
           </a:p>
@@ -3104,7 +3104,7 @@
           <a:p>
             <a:fld id="{DEBA1CB3-45B4-4365-8A01-D60AF6EBF46C}" type="datetimeFigureOut">
               <a:rPr lang="fr-FR" smtClean="0"/>
-              <a:t>12/02/2020</a:t>
+              <a:t>29/05/2020</a:t>
             </a:fld>
             <a:endParaRPr lang="fr-FR"/>
           </a:p>
@@ -3345,7 +3345,7 @@
           <a:p>
             <a:fld id="{DEBA1CB3-45B4-4365-8A01-D60AF6EBF46C}" type="datetimeFigureOut">
               <a:rPr lang="fr-FR" smtClean="0"/>
-              <a:t>12/02/2020</a:t>
+              <a:t>29/05/2020</a:t>
             </a:fld>
             <a:endParaRPr lang="fr-FR"/>
           </a:p>
@@ -3764,6 +3764,52 @@
       </p:grpSpPr>
       <p:sp>
         <p:nvSpPr>
+          <p:cNvPr id="58" name="Rectangle 57">
+            <a:extLst>
+              <a:ext uri="{FF2B5EF4-FFF2-40B4-BE49-F238E27FC236}">
+                <a16:creationId xmlns:a16="http://schemas.microsoft.com/office/drawing/2014/main" id="{539DD055-8EF1-46D5-A759-909838B13B59}"/>
+              </a:ext>
+            </a:extLst>
+          </p:cNvPr>
+          <p:cNvSpPr/>
+          <p:nvPr/>
+        </p:nvSpPr>
+        <p:spPr>
+          <a:xfrm>
+            <a:off x="6934666" y="1107870"/>
+            <a:ext cx="340999" cy="288748"/>
+          </a:xfrm>
+          <a:prstGeom prst="rect">
+            <a:avLst/>
+          </a:prstGeom>
+        </p:spPr>
+        <p:style>
+          <a:lnRef idx="2">
+            <a:schemeClr val="accent1">
+              <a:shade val="50000"/>
+            </a:schemeClr>
+          </a:lnRef>
+          <a:fillRef idx="1">
+            <a:schemeClr val="accent1"/>
+          </a:fillRef>
+          <a:effectRef idx="0">
+            <a:schemeClr val="accent1"/>
+          </a:effectRef>
+          <a:fontRef idx="minor">
+            <a:schemeClr val="lt1"/>
+          </a:fontRef>
+        </p:style>
+        <p:txBody>
+          <a:bodyPr rtlCol="0" anchor="ctr"/>
+          <a:lstStyle/>
+          <a:p>
+            <a:pPr algn="ctr"/>
+            <a:endParaRPr lang="fr-FR"/>
+          </a:p>
+        </p:txBody>
+      </p:sp>
+      <p:sp>
+        <p:nvSpPr>
           <p:cNvPr id="9" name="ZoneTexte 8">
             <a:extLst>
               <a:ext uri="{FF2B5EF4-FFF2-40B4-BE49-F238E27FC236}">
@@ -3777,7 +3823,7 @@
         <p:spPr>
           <a:xfrm>
             <a:off x="4436782" y="334303"/>
-            <a:ext cx="607145" cy="369332"/>
+            <a:ext cx="607145" cy="338554"/>
           </a:xfrm>
           <a:prstGeom prst="rect">
             <a:avLst/>
@@ -3791,7 +3837,7 @@
           <a:lstStyle/>
           <a:p>
             <a:r>
-              <a:rPr lang="en-US" noProof="1"/>
+              <a:rPr lang="en-US" sz="1600" noProof="1"/>
               <a:t>0..*</a:t>
             </a:r>
           </a:p>
@@ -3955,7 +4001,7 @@
         </p:nvSpPr>
         <p:spPr>
           <a:xfrm>
-            <a:off x="5438569" y="393286"/>
+            <a:off x="5079296" y="326787"/>
             <a:ext cx="1876007" cy="369332"/>
           </a:xfrm>
           <a:prstGeom prst="rect">
@@ -4178,8 +4224,8 @@
         </p:nvSpPr>
         <p:spPr>
           <a:xfrm>
-            <a:off x="3727352" y="2161432"/>
-            <a:ext cx="2593912" cy="369332"/>
+            <a:off x="3048677" y="2227058"/>
+            <a:ext cx="2986046" cy="369332"/>
           </a:xfrm>
           <a:prstGeom prst="rect">
             <a:avLst/>
@@ -4194,7 +4240,7 @@
           <a:p>
             <a:r>
               <a:rPr lang="en-US" noProof="1"/>
-              <a:t>action.(…).definition[x]</a:t>
+              <a:t>action.(…).definitionCanonical</a:t>
             </a:r>
           </a:p>
         </p:txBody>
@@ -4213,7 +4259,7 @@
         </p:nvSpPr>
         <p:spPr>
           <a:xfrm>
-            <a:off x="4247572" y="4758768"/>
+            <a:off x="4247572" y="4950922"/>
             <a:ext cx="3479034" cy="1090457"/>
           </a:xfrm>
           <a:prstGeom prst="rect">
@@ -4320,7 +4366,7 @@
         </p:nvSpPr>
         <p:spPr>
           <a:xfrm>
-            <a:off x="8555068" y="4758768"/>
+            <a:off x="8886368" y="4513606"/>
             <a:ext cx="3111179" cy="1090457"/>
           </a:xfrm>
           <a:prstGeom prst="rect">
@@ -4427,7 +4473,7 @@
         </p:nvSpPr>
         <p:spPr>
           <a:xfrm>
-            <a:off x="456300" y="4824084"/>
+            <a:off x="456300" y="4890344"/>
             <a:ext cx="2887484" cy="1142774"/>
           </a:xfrm>
           <a:prstGeom prst="rect">
@@ -4539,7 +4585,7 @@
         <p:spPr>
           <a:xfrm rot="10800000" flipV="1">
             <a:off x="1900043" y="3501066"/>
-            <a:ext cx="2627865" cy="1323018"/>
+            <a:ext cx="2627865" cy="1389278"/>
           </a:xfrm>
           <a:prstGeom prst="bentConnector2">
             <a:avLst/>
@@ -4582,8 +4628,8 @@
         </p:nvCxnSpPr>
         <p:spPr>
           <a:xfrm rot="16200000" flipH="1">
-            <a:off x="5642497" y="4414175"/>
-            <a:ext cx="687431" cy="1754"/>
+            <a:off x="5546420" y="4510252"/>
+            <a:ext cx="879585" cy="1754"/>
           </a:xfrm>
           <a:prstGeom prst="bentConnector3">
             <a:avLst>
@@ -4629,7 +4675,7 @@
         <p:spPr>
           <a:xfrm>
             <a:off x="7442762" y="3501066"/>
-            <a:ext cx="2667896" cy="1257702"/>
+            <a:ext cx="2999196" cy="1012540"/>
           </a:xfrm>
           <a:prstGeom prst="bentConnector2">
             <a:avLst/>
@@ -4703,8 +4749,8 @@
         </p:nvSpPr>
         <p:spPr>
           <a:xfrm>
-            <a:off x="1891372" y="4391159"/>
-            <a:ext cx="607145" cy="369332"/>
+            <a:off x="1891372" y="4457419"/>
+            <a:ext cx="607145" cy="338554"/>
           </a:xfrm>
           <a:prstGeom prst="rect">
             <a:avLst/>
@@ -4718,7 +4764,7 @@
           <a:lstStyle/>
           <a:p>
             <a:r>
-              <a:rPr lang="en-US" noProof="1"/>
+              <a:rPr lang="en-US" sz="1600" noProof="1"/>
               <a:t>0..*</a:t>
             </a:r>
           </a:p>
@@ -4773,8 +4819,8 @@
         </p:nvSpPr>
         <p:spPr>
           <a:xfrm>
-            <a:off x="6000916" y="4400343"/>
-            <a:ext cx="607145" cy="369332"/>
+            <a:off x="6000916" y="4552741"/>
+            <a:ext cx="607145" cy="338554"/>
           </a:xfrm>
           <a:prstGeom prst="rect">
             <a:avLst/>
@@ -4788,7 +4834,7 @@
           <a:lstStyle/>
           <a:p>
             <a:r>
-              <a:rPr lang="en-US" noProof="1"/>
+              <a:rPr lang="en-US" sz="1600" noProof="1"/>
               <a:t>0..*</a:t>
             </a:r>
           </a:p>
@@ -4808,8 +4854,8 @@
         </p:nvSpPr>
         <p:spPr>
           <a:xfrm>
-            <a:off x="9601316" y="4361597"/>
-            <a:ext cx="607145" cy="369332"/>
+            <a:off x="9972372" y="4116435"/>
+            <a:ext cx="607145" cy="338554"/>
           </a:xfrm>
           <a:prstGeom prst="rect">
             <a:avLst/>
@@ -4823,7 +4869,7 @@
           <a:lstStyle/>
           <a:p>
             <a:r>
-              <a:rPr lang="en-US" noProof="1"/>
+              <a:rPr lang="en-US" sz="1600" noProof="1"/>
               <a:t>0..*</a:t>
             </a:r>
           </a:p>
@@ -4921,8 +4967,8 @@
         </p:nvSpPr>
         <p:spPr>
           <a:xfrm>
-            <a:off x="7314576" y="852189"/>
-            <a:ext cx="3211448" cy="646331"/>
+            <a:off x="7011639" y="117496"/>
+            <a:ext cx="3160644" cy="646331"/>
           </a:xfrm>
           <a:prstGeom prst="rect">
             <a:avLst/>
@@ -5019,7 +5065,7 @@
         </p:nvSpPr>
         <p:spPr>
           <a:xfrm>
-            <a:off x="319249" y="3832048"/>
+            <a:off x="319249" y="3898308"/>
             <a:ext cx="1540369" cy="923330"/>
           </a:xfrm>
           <a:prstGeom prst="rect">
@@ -5069,7 +5115,7 @@
         </p:nvSpPr>
         <p:spPr>
           <a:xfrm>
-            <a:off x="3708376" y="4102269"/>
+            <a:off x="3702787" y="4259092"/>
             <a:ext cx="2268722" cy="646331"/>
           </a:xfrm>
           <a:prstGeom prst="rect">
@@ -5119,7 +5165,7 @@
         </p:nvSpPr>
         <p:spPr>
           <a:xfrm>
-            <a:off x="10172283" y="3749019"/>
+            <a:off x="10503583" y="3503857"/>
             <a:ext cx="1541314" cy="923330"/>
           </a:xfrm>
           <a:prstGeom prst="rect">
@@ -5262,7 +5308,7 @@
         <p:spPr>
           <a:xfrm>
             <a:off x="6559778" y="2130127"/>
-            <a:ext cx="607145" cy="369332"/>
+            <a:ext cx="607145" cy="338554"/>
           </a:xfrm>
           <a:prstGeom prst="rect">
             <a:avLst/>
@@ -5276,7 +5322,7 @@
           <a:lstStyle/>
           <a:p>
             <a:r>
-              <a:rPr lang="en-US" noProof="1"/>
+              <a:rPr lang="en-US" sz="1600" noProof="1"/>
               <a:t>0..*</a:t>
             </a:r>
           </a:p>
@@ -5296,8 +5342,8 @@
         </p:nvSpPr>
         <p:spPr>
           <a:xfrm>
-            <a:off x="7282291" y="1638018"/>
-            <a:ext cx="1740637" cy="369332"/>
+            <a:off x="7494207" y="1813974"/>
+            <a:ext cx="1719788" cy="646331"/>
           </a:xfrm>
           <a:prstGeom prst="rect">
             <a:avLst/>
@@ -5312,7 +5358,21 @@
           <a:p>
             <a:r>
               <a:rPr lang="en-US" noProof="1"/>
-              <a:t>relatedArtifact</a:t>
+              <a:t>relatedArtifact (</a:t>
+            </a:r>
+            <a:r>
+              <a:rPr lang="en-US" i="1" noProof="1">
+                <a:solidFill>
+                  <a:schemeClr val="accent6">
+                    <a:lumMod val="75000"/>
+                  </a:schemeClr>
+                </a:solidFill>
+              </a:rPr>
+              <a:t>is replaced by</a:t>
+            </a:r>
+            <a:r>
+              <a:rPr lang="en-US" noProof="1"/>
+              <a:t>)</a:t>
             </a:r>
           </a:p>
         </p:txBody>
@@ -5438,7 +5498,7 @@
         </p:nvSpPr>
         <p:spPr>
           <a:xfrm>
-            <a:off x="7470755" y="6073551"/>
+            <a:off x="8186369" y="6013917"/>
             <a:ext cx="1667712" cy="476672"/>
           </a:xfrm>
           <a:prstGeom prst="rect">
@@ -5530,8 +5590,8 @@
         </p:nvCxnSpPr>
         <p:spPr>
           <a:xfrm rot="16200000" flipH="1">
-            <a:off x="6497591" y="5338723"/>
-            <a:ext cx="462662" cy="1483666"/>
+            <a:off x="6981292" y="5047176"/>
+            <a:ext cx="210874" cy="2199280"/>
           </a:xfrm>
           <a:prstGeom prst="bentConnector2">
             <a:avLst/>
@@ -5574,8 +5634,8 @@
         </p:nvCxnSpPr>
         <p:spPr>
           <a:xfrm rot="5400000">
-            <a:off x="9393232" y="5594461"/>
-            <a:ext cx="462662" cy="972191"/>
+            <a:off x="9823925" y="5634220"/>
+            <a:ext cx="648190" cy="587877"/>
           </a:xfrm>
           <a:prstGeom prst="bentConnector2">
             <a:avLst/>
@@ -5614,8 +5674,8 @@
         </p:nvSpPr>
         <p:spPr>
           <a:xfrm>
-            <a:off x="6871041" y="5986708"/>
-            <a:ext cx="607145" cy="369332"/>
+            <a:off x="7634898" y="6202144"/>
+            <a:ext cx="607145" cy="338554"/>
           </a:xfrm>
           <a:prstGeom prst="rect">
             <a:avLst/>
@@ -5629,7 +5689,7 @@
           <a:lstStyle/>
           <a:p>
             <a:r>
-              <a:rPr lang="en-US" noProof="1"/>
+              <a:rPr lang="en-US" sz="1600" noProof="1"/>
               <a:t>0..4</a:t>
             </a:r>
           </a:p>
@@ -5649,8 +5709,8 @@
         </p:nvSpPr>
         <p:spPr>
           <a:xfrm>
-            <a:off x="9194141" y="5973465"/>
-            <a:ext cx="607145" cy="369332"/>
+            <a:off x="9916381" y="6205871"/>
+            <a:ext cx="607145" cy="338554"/>
           </a:xfrm>
           <a:prstGeom prst="rect">
             <a:avLst/>
@@ -5664,7 +5724,7 @@
           <a:lstStyle/>
           <a:p>
             <a:r>
-              <a:rPr lang="en-US" noProof="1"/>
+              <a:rPr lang="en-US" sz="1600" noProof="1"/>
               <a:t>0..4</a:t>
             </a:r>
           </a:p>
@@ -5684,8 +5744,8 @@
         </p:nvSpPr>
         <p:spPr>
           <a:xfrm>
-            <a:off x="507901" y="1962747"/>
-            <a:ext cx="2784281" cy="1140542"/>
+            <a:off x="189854" y="1962747"/>
+            <a:ext cx="2627866" cy="1140542"/>
           </a:xfrm>
           <a:prstGeom prst="rect">
             <a:avLst/>
@@ -5795,8 +5855,8 @@
         </p:nvCxnSpPr>
         <p:spPr>
           <a:xfrm rot="10800000" flipV="1">
-            <a:off x="1900042" y="1590215"/>
-            <a:ext cx="2788338" cy="372532"/>
+            <a:off x="1503788" y="1590215"/>
+            <a:ext cx="3184593" cy="372532"/>
           </a:xfrm>
           <a:prstGeom prst="bentConnector2">
             <a:avLst/>
@@ -5835,8 +5895,8 @@
         </p:nvSpPr>
         <p:spPr>
           <a:xfrm>
-            <a:off x="1946952" y="1598863"/>
-            <a:ext cx="607145" cy="369332"/>
+            <a:off x="1556018" y="1598863"/>
+            <a:ext cx="607145" cy="338554"/>
           </a:xfrm>
           <a:prstGeom prst="rect">
             <a:avLst/>
@@ -5850,7 +5910,7 @@
           <a:lstStyle/>
           <a:p>
             <a:r>
-              <a:rPr lang="en-US" noProof="1"/>
+              <a:rPr lang="en-US" sz="1600" noProof="1"/>
               <a:t>0..*</a:t>
             </a:r>
           </a:p>
@@ -5905,8 +5965,8 @@
         </p:nvSpPr>
         <p:spPr>
           <a:xfrm>
-            <a:off x="-2790" y="1280963"/>
-            <a:ext cx="1849648" cy="646331"/>
+            <a:off x="-85375" y="991359"/>
+            <a:ext cx="1627978" cy="923330"/>
           </a:xfrm>
           <a:prstGeom prst="rect">
             <a:avLst/>
@@ -5948,7 +6008,7 @@
         </p:nvSpPr>
         <p:spPr>
           <a:xfrm>
-            <a:off x="5607055" y="6550223"/>
+            <a:off x="6322669" y="6490589"/>
             <a:ext cx="4601406" cy="369332"/>
           </a:xfrm>
           <a:prstGeom prst="rect">
@@ -5980,6 +6040,155 @@
             <a:r>
               <a:rPr lang="en-US" i="1" noProof="1"/>
               <a:t>valid|normal|abnormal|critical values</a:t>
+            </a:r>
+          </a:p>
+        </p:txBody>
+      </p:sp>
+      <p:cxnSp>
+        <p:nvCxnSpPr>
+          <p:cNvPr id="59" name="Connecteur : en angle 58">
+            <a:extLst>
+              <a:ext uri="{FF2B5EF4-FFF2-40B4-BE49-F238E27FC236}">
+                <a16:creationId xmlns:a16="http://schemas.microsoft.com/office/drawing/2014/main" id="{CEC98B57-A84A-4965-8F1C-9AD5C1F66F68}"/>
+              </a:ext>
+            </a:extLst>
+          </p:cNvPr>
+          <p:cNvCxnSpPr>
+            <a:cxnSpLocks/>
+            <a:stCxn id="58" idx="3"/>
+            <a:endCxn id="58" idx="0"/>
+          </p:cNvCxnSpPr>
+          <p:nvPr/>
+        </p:nvCxnSpPr>
+        <p:spPr>
+          <a:xfrm flipH="1" flipV="1">
+            <a:off x="7105166" y="1107870"/>
+            <a:ext cx="170499" cy="144374"/>
+          </a:xfrm>
+          <a:prstGeom prst="bentConnector4">
+            <a:avLst>
+              <a:gd name="adj1" fmla="val -134077"/>
+              <a:gd name="adj2" fmla="val 258339"/>
+            </a:avLst>
+          </a:prstGeom>
+          <a:ln w="28575">
+            <a:headEnd type="arrow" w="med" len="med"/>
+            <a:tailEnd type="none" w="med" len="med"/>
+          </a:ln>
+        </p:spPr>
+        <p:style>
+          <a:lnRef idx="1">
+            <a:schemeClr val="accent1"/>
+          </a:lnRef>
+          <a:fillRef idx="0">
+            <a:schemeClr val="accent1"/>
+          </a:fillRef>
+          <a:effectRef idx="0">
+            <a:schemeClr val="accent1"/>
+          </a:effectRef>
+          <a:fontRef idx="minor">
+            <a:schemeClr val="tx1"/>
+          </a:fontRef>
+        </p:style>
+      </p:cxnSp>
+      <p:sp>
+        <p:nvSpPr>
+          <p:cNvPr id="61" name="ZoneTexte 60">
+            <a:extLst>
+              <a:ext uri="{FF2B5EF4-FFF2-40B4-BE49-F238E27FC236}">
+                <a16:creationId xmlns:a16="http://schemas.microsoft.com/office/drawing/2014/main" id="{F15FD08A-EE01-41B9-A74C-D190D9D0CE08}"/>
+              </a:ext>
+            </a:extLst>
+          </p:cNvPr>
+          <p:cNvSpPr txBox="1"/>
+          <p:nvPr/>
+        </p:nvSpPr>
+        <p:spPr>
+          <a:xfrm>
+            <a:off x="7248234" y="1231109"/>
+            <a:ext cx="607145" cy="338554"/>
+          </a:xfrm>
+          <a:prstGeom prst="rect">
+            <a:avLst/>
+          </a:prstGeom>
+          <a:noFill/>
+        </p:spPr>
+        <p:txBody>
+          <a:bodyPr wrap="square" rtlCol="0">
+            <a:spAutoFit/>
+          </a:bodyPr>
+          <a:lstStyle/>
+          <a:p>
+            <a:r>
+              <a:rPr lang="en-US" sz="1600" noProof="1"/>
+              <a:t>0..*</a:t>
+            </a:r>
+          </a:p>
+        </p:txBody>
+      </p:sp>
+      <p:sp>
+        <p:nvSpPr>
+          <p:cNvPr id="62" name="ZoneTexte 61">
+            <a:extLst>
+              <a:ext uri="{FF2B5EF4-FFF2-40B4-BE49-F238E27FC236}">
+                <a16:creationId xmlns:a16="http://schemas.microsoft.com/office/drawing/2014/main" id="{B84E6AD3-4ED3-4FEA-969E-C0AC05903492}"/>
+              </a:ext>
+            </a:extLst>
+          </p:cNvPr>
+          <p:cNvSpPr txBox="1"/>
+          <p:nvPr/>
+        </p:nvSpPr>
+        <p:spPr>
+          <a:xfrm>
+            <a:off x="7668071" y="924084"/>
+            <a:ext cx="3301435" cy="646331"/>
+          </a:xfrm>
+          <a:prstGeom prst="rect">
+            <a:avLst/>
+          </a:prstGeom>
+          <a:noFill/>
+        </p:spPr>
+        <p:txBody>
+          <a:bodyPr wrap="square" rtlCol="0">
+            <a:spAutoFit/>
+          </a:bodyPr>
+          <a:lstStyle/>
+          <a:p>
+            <a:r>
+              <a:rPr lang="en-US" noProof="1"/>
+              <a:t>action.action.definitionCanonical (</a:t>
+            </a:r>
+            <a:r>
+              <a:rPr lang="en-US" i="1" noProof="1">
+                <a:solidFill>
+                  <a:schemeClr val="accent6">
+                    <a:lumMod val="75000"/>
+                  </a:schemeClr>
+                </a:solidFill>
+              </a:rPr>
+              <a:t>embeds</a:t>
+            </a:r>
+            <a:r>
+              <a:rPr lang="en-US" i="1" noProof="1"/>
+              <a:t> </a:t>
+            </a:r>
+            <a:r>
+              <a:rPr lang="en-US" noProof="1"/>
+              <a:t>or </a:t>
+            </a:r>
+            <a:r>
+              <a:rPr lang="en-US" i="1" noProof="1">
+                <a:solidFill>
+                  <a:schemeClr val="accent6">
+                    <a:lumMod val="75000"/>
+                  </a:schemeClr>
+                </a:solidFill>
+              </a:rPr>
+              <a:t>reflexes</a:t>
+            </a:r>
+            <a:r>
+              <a:rPr lang="en-US" noProof="1"/>
+              <a:t>)</a:t>
             </a:r>
           </a:p>
         </p:txBody>

</xml_diff>

<commit_message>
Corrected image of lab compendium
</commit_message>
<xml_diff>
--- a/input/images-source/LabCompendium.pptx
+++ b/input/images-source/LabCompendium.pptx
@@ -197,7 +197,7 @@
           <a:p>
             <a:fld id="{C0FC2EA5-DDD9-41B5-A743-573E81829967}" type="datetimeFigureOut">
               <a:rPr lang="fr-FR" smtClean="0"/>
-              <a:t>29/05/2020</a:t>
+              <a:t>05/06/2020</a:t>
             </a:fld>
             <a:endParaRPr lang="fr-FR"/>
           </a:p>
@@ -695,7 +695,7 @@
           <a:p>
             <a:fld id="{DEBA1CB3-45B4-4365-8A01-D60AF6EBF46C}" type="datetimeFigureOut">
               <a:rPr lang="fr-FR" smtClean="0"/>
-              <a:t>29/05/2020</a:t>
+              <a:t>05/06/2020</a:t>
             </a:fld>
             <a:endParaRPr lang="fr-FR"/>
           </a:p>
@@ -893,7 +893,7 @@
           <a:p>
             <a:fld id="{DEBA1CB3-45B4-4365-8A01-D60AF6EBF46C}" type="datetimeFigureOut">
               <a:rPr lang="fr-FR" smtClean="0"/>
-              <a:t>29/05/2020</a:t>
+              <a:t>05/06/2020</a:t>
             </a:fld>
             <a:endParaRPr lang="fr-FR"/>
           </a:p>
@@ -1101,7 +1101,7 @@
           <a:p>
             <a:fld id="{DEBA1CB3-45B4-4365-8A01-D60AF6EBF46C}" type="datetimeFigureOut">
               <a:rPr lang="fr-FR" smtClean="0"/>
-              <a:t>29/05/2020</a:t>
+              <a:t>05/06/2020</a:t>
             </a:fld>
             <a:endParaRPr lang="fr-FR"/>
           </a:p>
@@ -1299,7 +1299,7 @@
           <a:p>
             <a:fld id="{DEBA1CB3-45B4-4365-8A01-D60AF6EBF46C}" type="datetimeFigureOut">
               <a:rPr lang="fr-FR" smtClean="0"/>
-              <a:t>29/05/2020</a:t>
+              <a:t>05/06/2020</a:t>
             </a:fld>
             <a:endParaRPr lang="fr-FR"/>
           </a:p>
@@ -1574,7 +1574,7 @@
           <a:p>
             <a:fld id="{DEBA1CB3-45B4-4365-8A01-D60AF6EBF46C}" type="datetimeFigureOut">
               <a:rPr lang="fr-FR" smtClean="0"/>
-              <a:t>29/05/2020</a:t>
+              <a:t>05/06/2020</a:t>
             </a:fld>
             <a:endParaRPr lang="fr-FR"/>
           </a:p>
@@ -1839,7 +1839,7 @@
           <a:p>
             <a:fld id="{DEBA1CB3-45B4-4365-8A01-D60AF6EBF46C}" type="datetimeFigureOut">
               <a:rPr lang="fr-FR" smtClean="0"/>
-              <a:t>29/05/2020</a:t>
+              <a:t>05/06/2020</a:t>
             </a:fld>
             <a:endParaRPr lang="fr-FR"/>
           </a:p>
@@ -2251,7 +2251,7 @@
           <a:p>
             <a:fld id="{DEBA1CB3-45B4-4365-8A01-D60AF6EBF46C}" type="datetimeFigureOut">
               <a:rPr lang="fr-FR" smtClean="0"/>
-              <a:t>29/05/2020</a:t>
+              <a:t>05/06/2020</a:t>
             </a:fld>
             <a:endParaRPr lang="fr-FR"/>
           </a:p>
@@ -2392,7 +2392,7 @@
           <a:p>
             <a:fld id="{DEBA1CB3-45B4-4365-8A01-D60AF6EBF46C}" type="datetimeFigureOut">
               <a:rPr lang="fr-FR" smtClean="0"/>
-              <a:t>29/05/2020</a:t>
+              <a:t>05/06/2020</a:t>
             </a:fld>
             <a:endParaRPr lang="fr-FR"/>
           </a:p>
@@ -2505,7 +2505,7 @@
           <a:p>
             <a:fld id="{DEBA1CB3-45B4-4365-8A01-D60AF6EBF46C}" type="datetimeFigureOut">
               <a:rPr lang="fr-FR" smtClean="0"/>
-              <a:t>29/05/2020</a:t>
+              <a:t>05/06/2020</a:t>
             </a:fld>
             <a:endParaRPr lang="fr-FR"/>
           </a:p>
@@ -2816,7 +2816,7 @@
           <a:p>
             <a:fld id="{DEBA1CB3-45B4-4365-8A01-D60AF6EBF46C}" type="datetimeFigureOut">
               <a:rPr lang="fr-FR" smtClean="0"/>
-              <a:t>29/05/2020</a:t>
+              <a:t>05/06/2020</a:t>
             </a:fld>
             <a:endParaRPr lang="fr-FR"/>
           </a:p>
@@ -3104,7 +3104,7 @@
           <a:p>
             <a:fld id="{DEBA1CB3-45B4-4365-8A01-D60AF6EBF46C}" type="datetimeFigureOut">
               <a:rPr lang="fr-FR" smtClean="0"/>
-              <a:t>29/05/2020</a:t>
+              <a:t>05/06/2020</a:t>
             </a:fld>
             <a:endParaRPr lang="fr-FR"/>
           </a:p>
@@ -3345,7 +3345,7 @@
           <a:p>
             <a:fld id="{DEBA1CB3-45B4-4365-8A01-D60AF6EBF46C}" type="datetimeFigureOut">
               <a:rPr lang="fr-FR" smtClean="0"/>
-              <a:t>29/05/2020</a:t>
+              <a:t>05/06/2020</a:t>
             </a:fld>
             <a:endParaRPr lang="fr-FR"/>
           </a:p>
@@ -3764,52 +3764,6 @@
       </p:grpSpPr>
       <p:sp>
         <p:nvSpPr>
-          <p:cNvPr id="64" name="Rectangle 63">
-            <a:extLst>
-              <a:ext uri="{FF2B5EF4-FFF2-40B4-BE49-F238E27FC236}">
-                <a16:creationId xmlns:a16="http://schemas.microsoft.com/office/drawing/2014/main" id="{6CD60E96-2AFE-4D34-8AE7-ECF9D31501F0}"/>
-              </a:ext>
-            </a:extLst>
-          </p:cNvPr>
-          <p:cNvSpPr/>
-          <p:nvPr/>
-        </p:nvSpPr>
-        <p:spPr>
-          <a:xfrm>
-            <a:off x="6923554" y="1013936"/>
-            <a:ext cx="340999" cy="217887"/>
-          </a:xfrm>
-          <a:prstGeom prst="rect">
-            <a:avLst/>
-          </a:prstGeom>
-        </p:spPr>
-        <p:style>
-          <a:lnRef idx="2">
-            <a:schemeClr val="accent1">
-              <a:shade val="50000"/>
-            </a:schemeClr>
-          </a:lnRef>
-          <a:fillRef idx="1">
-            <a:schemeClr val="accent1"/>
-          </a:fillRef>
-          <a:effectRef idx="0">
-            <a:schemeClr val="accent1"/>
-          </a:effectRef>
-          <a:fontRef idx="minor">
-            <a:schemeClr val="lt1"/>
-          </a:fontRef>
-        </p:style>
-        <p:txBody>
-          <a:bodyPr rtlCol="0" anchor="ctr"/>
-          <a:lstStyle/>
-          <a:p>
-            <a:pPr algn="ctr"/>
-            <a:endParaRPr lang="fr-FR"/>
-          </a:p>
-        </p:txBody>
-      </p:sp>
-      <p:sp>
-        <p:nvSpPr>
           <p:cNvPr id="8" name="Rectangle 7">
             <a:extLst>
               <a:ext uri="{FF2B5EF4-FFF2-40B4-BE49-F238E27FC236}">
@@ -6256,137 +6210,6 @@
                 </a:solidFill>
               </a:rPr>
               <a:t>includes</a:t>
-            </a:r>
-            <a:r>
-              <a:rPr lang="en-US" noProof="1"/>
-              <a:t>)</a:t>
-            </a:r>
-          </a:p>
-        </p:txBody>
-      </p:sp>
-      <p:cxnSp>
-        <p:nvCxnSpPr>
-          <p:cNvPr id="65" name="Connecteur : en angle 64">
-            <a:extLst>
-              <a:ext uri="{FF2B5EF4-FFF2-40B4-BE49-F238E27FC236}">
-                <a16:creationId xmlns:a16="http://schemas.microsoft.com/office/drawing/2014/main" id="{476B43B7-696D-4AD5-8357-3897D95ACD3A}"/>
-              </a:ext>
-            </a:extLst>
-          </p:cNvPr>
-          <p:cNvCxnSpPr>
-            <a:cxnSpLocks/>
-            <a:stCxn id="64" idx="3"/>
-            <a:endCxn id="64" idx="0"/>
-          </p:cNvCxnSpPr>
-          <p:nvPr/>
-        </p:nvCxnSpPr>
-        <p:spPr>
-          <a:xfrm flipH="1" flipV="1">
-            <a:off x="7094054" y="1013936"/>
-            <a:ext cx="170499" cy="108944"/>
-          </a:xfrm>
-          <a:prstGeom prst="bentConnector4">
-            <a:avLst>
-              <a:gd name="adj1" fmla="val -134077"/>
-              <a:gd name="adj2" fmla="val 309833"/>
-            </a:avLst>
-          </a:prstGeom>
-          <a:ln w="28575">
-            <a:headEnd type="arrow" w="med" len="med"/>
-            <a:tailEnd type="none" w="med" len="med"/>
-          </a:ln>
-        </p:spPr>
-        <p:style>
-          <a:lnRef idx="1">
-            <a:schemeClr val="accent1"/>
-          </a:lnRef>
-          <a:fillRef idx="0">
-            <a:schemeClr val="accent1"/>
-          </a:fillRef>
-          <a:effectRef idx="0">
-            <a:schemeClr val="accent1"/>
-          </a:effectRef>
-          <a:fontRef idx="minor">
-            <a:schemeClr val="tx1"/>
-          </a:fontRef>
-        </p:style>
-      </p:cxnSp>
-      <p:sp>
-        <p:nvSpPr>
-          <p:cNvPr id="66" name="ZoneTexte 65">
-            <a:extLst>
-              <a:ext uri="{FF2B5EF4-FFF2-40B4-BE49-F238E27FC236}">
-                <a16:creationId xmlns:a16="http://schemas.microsoft.com/office/drawing/2014/main" id="{A33D02C2-BA90-449F-AE59-7ECD9085C945}"/>
-              </a:ext>
-            </a:extLst>
-          </p:cNvPr>
-          <p:cNvSpPr txBox="1"/>
-          <p:nvPr/>
-        </p:nvSpPr>
-        <p:spPr>
-          <a:xfrm>
-            <a:off x="7288677" y="1106063"/>
-            <a:ext cx="607145" cy="338554"/>
-          </a:xfrm>
-          <a:prstGeom prst="rect">
-            <a:avLst/>
-          </a:prstGeom>
-          <a:noFill/>
-        </p:spPr>
-        <p:txBody>
-          <a:bodyPr wrap="square" rtlCol="0">
-            <a:spAutoFit/>
-          </a:bodyPr>
-          <a:lstStyle/>
-          <a:p>
-            <a:r>
-              <a:rPr lang="en-US" sz="1600" noProof="1"/>
-              <a:t>0..*</a:t>
-            </a:r>
-          </a:p>
-        </p:txBody>
-      </p:sp>
-      <p:sp>
-        <p:nvSpPr>
-          <p:cNvPr id="67" name="ZoneTexte 66">
-            <a:extLst>
-              <a:ext uri="{FF2B5EF4-FFF2-40B4-BE49-F238E27FC236}">
-                <a16:creationId xmlns:a16="http://schemas.microsoft.com/office/drawing/2014/main" id="{10D4F8C0-74BA-4BCF-9A1C-9EEBC3A560A0}"/>
-              </a:ext>
-            </a:extLst>
-          </p:cNvPr>
-          <p:cNvSpPr txBox="1"/>
-          <p:nvPr/>
-        </p:nvSpPr>
-        <p:spPr>
-          <a:xfrm>
-            <a:off x="7593471" y="753547"/>
-            <a:ext cx="4404076" cy="369332"/>
-          </a:xfrm>
-          <a:prstGeom prst="rect">
-            <a:avLst/>
-          </a:prstGeom>
-          <a:noFill/>
-        </p:spPr>
-        <p:txBody>
-          <a:bodyPr wrap="square" rtlCol="0">
-            <a:spAutoFit/>
-          </a:bodyPr>
-          <a:lstStyle/>
-          <a:p>
-            <a:r>
-              <a:rPr lang="en-US" noProof="1"/>
-              <a:t>action.(…).definitionCanonical (</a:t>
-            </a:r>
-            <a:r>
-              <a:rPr lang="en-US" i="1" noProof="1">
-                <a:solidFill>
-                  <a:schemeClr val="accent6">
-                    <a:lumMod val="75000"/>
-                  </a:schemeClr>
-                </a:solidFill>
-              </a:rPr>
-              <a:t>reflexes</a:t>
             </a:r>
             <a:r>
               <a:rPr lang="en-US" noProof="1"/>

</xml_diff>

<commit_message>
Lab specification page reflecting the design changes regarding specimen requirements
</commit_message>
<xml_diff>
--- a/input/images-source/LabCompendium.pptx
+++ b/input/images-source/LabCompendium.pptx
@@ -197,7 +197,7 @@
           <a:p>
             <a:fld id="{C0FC2EA5-DDD9-41B5-A743-573E81829967}" type="datetimeFigureOut">
               <a:rPr lang="fr-FR" smtClean="0"/>
-              <a:t>05/06/2020</a:t>
+              <a:t>12/06/2020</a:t>
             </a:fld>
             <a:endParaRPr lang="fr-FR"/>
           </a:p>
@@ -695,7 +695,7 @@
           <a:p>
             <a:fld id="{DEBA1CB3-45B4-4365-8A01-D60AF6EBF46C}" type="datetimeFigureOut">
               <a:rPr lang="fr-FR" smtClean="0"/>
-              <a:t>05/06/2020</a:t>
+              <a:t>12/06/2020</a:t>
             </a:fld>
             <a:endParaRPr lang="fr-FR"/>
           </a:p>
@@ -893,7 +893,7 @@
           <a:p>
             <a:fld id="{DEBA1CB3-45B4-4365-8A01-D60AF6EBF46C}" type="datetimeFigureOut">
               <a:rPr lang="fr-FR" smtClean="0"/>
-              <a:t>05/06/2020</a:t>
+              <a:t>12/06/2020</a:t>
             </a:fld>
             <a:endParaRPr lang="fr-FR"/>
           </a:p>
@@ -1101,7 +1101,7 @@
           <a:p>
             <a:fld id="{DEBA1CB3-45B4-4365-8A01-D60AF6EBF46C}" type="datetimeFigureOut">
               <a:rPr lang="fr-FR" smtClean="0"/>
-              <a:t>05/06/2020</a:t>
+              <a:t>12/06/2020</a:t>
             </a:fld>
             <a:endParaRPr lang="fr-FR"/>
           </a:p>
@@ -1299,7 +1299,7 @@
           <a:p>
             <a:fld id="{DEBA1CB3-45B4-4365-8A01-D60AF6EBF46C}" type="datetimeFigureOut">
               <a:rPr lang="fr-FR" smtClean="0"/>
-              <a:t>05/06/2020</a:t>
+              <a:t>12/06/2020</a:t>
             </a:fld>
             <a:endParaRPr lang="fr-FR"/>
           </a:p>
@@ -1574,7 +1574,7 @@
           <a:p>
             <a:fld id="{DEBA1CB3-45B4-4365-8A01-D60AF6EBF46C}" type="datetimeFigureOut">
               <a:rPr lang="fr-FR" smtClean="0"/>
-              <a:t>05/06/2020</a:t>
+              <a:t>12/06/2020</a:t>
             </a:fld>
             <a:endParaRPr lang="fr-FR"/>
           </a:p>
@@ -1839,7 +1839,7 @@
           <a:p>
             <a:fld id="{DEBA1CB3-45B4-4365-8A01-D60AF6EBF46C}" type="datetimeFigureOut">
               <a:rPr lang="fr-FR" smtClean="0"/>
-              <a:t>05/06/2020</a:t>
+              <a:t>12/06/2020</a:t>
             </a:fld>
             <a:endParaRPr lang="fr-FR"/>
           </a:p>
@@ -2251,7 +2251,7 @@
           <a:p>
             <a:fld id="{DEBA1CB3-45B4-4365-8A01-D60AF6EBF46C}" type="datetimeFigureOut">
               <a:rPr lang="fr-FR" smtClean="0"/>
-              <a:t>05/06/2020</a:t>
+              <a:t>12/06/2020</a:t>
             </a:fld>
             <a:endParaRPr lang="fr-FR"/>
           </a:p>
@@ -2392,7 +2392,7 @@
           <a:p>
             <a:fld id="{DEBA1CB3-45B4-4365-8A01-D60AF6EBF46C}" type="datetimeFigureOut">
               <a:rPr lang="fr-FR" smtClean="0"/>
-              <a:t>05/06/2020</a:t>
+              <a:t>12/06/2020</a:t>
             </a:fld>
             <a:endParaRPr lang="fr-FR"/>
           </a:p>
@@ -2505,7 +2505,7 @@
           <a:p>
             <a:fld id="{DEBA1CB3-45B4-4365-8A01-D60AF6EBF46C}" type="datetimeFigureOut">
               <a:rPr lang="fr-FR" smtClean="0"/>
-              <a:t>05/06/2020</a:t>
+              <a:t>12/06/2020</a:t>
             </a:fld>
             <a:endParaRPr lang="fr-FR"/>
           </a:p>
@@ -2816,7 +2816,7 @@
           <a:p>
             <a:fld id="{DEBA1CB3-45B4-4365-8A01-D60AF6EBF46C}" type="datetimeFigureOut">
               <a:rPr lang="fr-FR" smtClean="0"/>
-              <a:t>05/06/2020</a:t>
+              <a:t>12/06/2020</a:t>
             </a:fld>
             <a:endParaRPr lang="fr-FR"/>
           </a:p>
@@ -3104,7 +3104,7 @@
           <a:p>
             <a:fld id="{DEBA1CB3-45B4-4365-8A01-D60AF6EBF46C}" type="datetimeFigureOut">
               <a:rPr lang="fr-FR" smtClean="0"/>
-              <a:t>05/06/2020</a:t>
+              <a:t>12/06/2020</a:t>
             </a:fld>
             <a:endParaRPr lang="fr-FR"/>
           </a:p>
@@ -3345,7 +3345,7 @@
           <a:p>
             <a:fld id="{DEBA1CB3-45B4-4365-8A01-D60AF6EBF46C}" type="datetimeFigureOut">
               <a:rPr lang="fr-FR" smtClean="0"/>
-              <a:t>05/06/2020</a:t>
+              <a:t>12/06/2020</a:t>
             </a:fld>
             <a:endParaRPr lang="fr-FR"/>
           </a:p>
@@ -3776,7 +3776,7 @@
         </p:nvSpPr>
         <p:spPr>
           <a:xfrm>
-            <a:off x="7112001" y="1426241"/>
+            <a:off x="7112001" y="1035307"/>
             <a:ext cx="143498" cy="164249"/>
           </a:xfrm>
           <a:prstGeom prst="rect">
@@ -3822,7 +3822,7 @@
         </p:nvSpPr>
         <p:spPr>
           <a:xfrm>
-            <a:off x="6934666" y="1709006"/>
+            <a:off x="6934666" y="1318072"/>
             <a:ext cx="340999" cy="288748"/>
           </a:xfrm>
           <a:prstGeom prst="rect">
@@ -4047,7 +4047,7 @@
         </p:nvSpPr>
         <p:spPr>
           <a:xfrm>
-            <a:off x="4247572" y="640893"/>
+            <a:off x="4283482" y="379103"/>
             <a:ext cx="1876007" cy="369332"/>
           </a:xfrm>
           <a:prstGeom prst="rect">
@@ -4270,8 +4270,8 @@
         </p:nvSpPr>
         <p:spPr>
           <a:xfrm>
-            <a:off x="3048677" y="2227058"/>
-            <a:ext cx="2986046" cy="369332"/>
+            <a:off x="5944430" y="2232575"/>
+            <a:ext cx="4293851" cy="369332"/>
           </a:xfrm>
           <a:prstGeom prst="rect">
             <a:avLst/>
@@ -4286,7 +4286,7 @@
           <a:p>
             <a:r>
               <a:rPr lang="en-US" noProof="1"/>
-              <a:t>action.(…).definitionCanonical</a:t>
+              <a:t>action[.action[.action]].definitionCanonical</a:t>
             </a:r>
           </a:p>
         </p:txBody>
@@ -4305,8 +4305,8 @@
         </p:nvSpPr>
         <p:spPr>
           <a:xfrm>
-            <a:off x="4247572" y="4950922"/>
-            <a:ext cx="3479034" cy="1090457"/>
+            <a:off x="4373268" y="4950922"/>
+            <a:ext cx="3227642" cy="1090457"/>
           </a:xfrm>
           <a:prstGeom prst="rect">
             <a:avLst/>
@@ -4364,7 +4364,7 @@
           </a:fontRef>
         </p:style>
         <p:txBody>
-          <a:bodyPr rtlCol="0" anchor="ctr"/>
+          <a:bodyPr lIns="0" rIns="0" rtlCol="0" anchor="ctr"/>
           <a:lstStyle/>
           <a:p>
             <a:pPr algn="ctr"/>
@@ -4505,12 +4505,646 @@
           </a:p>
         </p:txBody>
       </p:sp>
-      <p:sp>
-        <p:nvSpPr>
-          <p:cNvPr id="56" name="Rectangle 55">
-            <a:extLst>
-              <a:ext uri="{FF2B5EF4-FFF2-40B4-BE49-F238E27FC236}">
-                <a16:creationId xmlns:a16="http://schemas.microsoft.com/office/drawing/2014/main" id="{F6F11366-8458-4112-A323-141BA159FFFC}"/>
+      <p:cxnSp>
+        <p:nvCxnSpPr>
+          <p:cNvPr id="57" name="Connecteur : en angle 56">
+            <a:extLst>
+              <a:ext uri="{FF2B5EF4-FFF2-40B4-BE49-F238E27FC236}">
+                <a16:creationId xmlns:a16="http://schemas.microsoft.com/office/drawing/2014/main" id="{15990ED7-D7B7-4EEE-A20B-C21EC57541DC}"/>
+              </a:ext>
+            </a:extLst>
+          </p:cNvPr>
+          <p:cNvCxnSpPr>
+            <a:cxnSpLocks/>
+            <a:stCxn id="13" idx="1"/>
+            <a:endCxn id="67" idx="0"/>
+          </p:cNvCxnSpPr>
+          <p:nvPr/>
+        </p:nvCxnSpPr>
+        <p:spPr>
+          <a:xfrm rot="10800000" flipV="1">
+            <a:off x="3290158" y="2036277"/>
+            <a:ext cx="1411474" cy="2909651"/>
+          </a:xfrm>
+          <a:prstGeom prst="bentConnector2">
+            <a:avLst/>
+          </a:prstGeom>
+          <a:ln w="28575">
+            <a:headEnd type="none" w="med" len="med"/>
+            <a:tailEnd type="arrow" w="med" len="med"/>
+          </a:ln>
+        </p:spPr>
+        <p:style>
+          <a:lnRef idx="1">
+            <a:schemeClr val="accent1"/>
+          </a:lnRef>
+          <a:fillRef idx="0">
+            <a:schemeClr val="accent1"/>
+          </a:fillRef>
+          <a:effectRef idx="0">
+            <a:schemeClr val="accent1"/>
+          </a:effectRef>
+          <a:fontRef idx="minor">
+            <a:schemeClr val="tx1"/>
+          </a:fontRef>
+        </p:style>
+      </p:cxnSp>
+      <p:cxnSp>
+        <p:nvCxnSpPr>
+          <p:cNvPr id="60" name="Connecteur : en angle 59">
+            <a:extLst>
+              <a:ext uri="{FF2B5EF4-FFF2-40B4-BE49-F238E27FC236}">
+                <a16:creationId xmlns:a16="http://schemas.microsoft.com/office/drawing/2014/main" id="{DA2AF1A3-48F7-47E0-B4B7-79E68B4E6B5C}"/>
+              </a:ext>
+            </a:extLst>
+          </p:cNvPr>
+          <p:cNvCxnSpPr>
+            <a:cxnSpLocks/>
+            <a:stCxn id="46" idx="2"/>
+            <a:endCxn id="54" idx="0"/>
+          </p:cNvCxnSpPr>
+          <p:nvPr/>
+        </p:nvCxnSpPr>
+        <p:spPr>
+          <a:xfrm rot="16200000" flipH="1">
+            <a:off x="5546420" y="4510252"/>
+            <a:ext cx="879585" cy="1754"/>
+          </a:xfrm>
+          <a:prstGeom prst="bentConnector3">
+            <a:avLst>
+              <a:gd name="adj1" fmla="val 50000"/>
+            </a:avLst>
+          </a:prstGeom>
+          <a:ln w="28575">
+            <a:headEnd type="none" w="med" len="med"/>
+            <a:tailEnd type="arrow" w="med" len="med"/>
+          </a:ln>
+        </p:spPr>
+        <p:style>
+          <a:lnRef idx="1">
+            <a:schemeClr val="accent1"/>
+          </a:lnRef>
+          <a:fillRef idx="0">
+            <a:schemeClr val="accent1"/>
+          </a:fillRef>
+          <a:effectRef idx="0">
+            <a:schemeClr val="accent1"/>
+          </a:effectRef>
+          <a:fontRef idx="minor">
+            <a:schemeClr val="tx1"/>
+          </a:fontRef>
+        </p:style>
+      </p:cxnSp>
+      <p:cxnSp>
+        <p:nvCxnSpPr>
+          <p:cNvPr id="63" name="Connecteur : en angle 62">
+            <a:extLst>
+              <a:ext uri="{FF2B5EF4-FFF2-40B4-BE49-F238E27FC236}">
+                <a16:creationId xmlns:a16="http://schemas.microsoft.com/office/drawing/2014/main" id="{52F29C62-3816-4A94-93C8-4E3BA5AF99AA}"/>
+              </a:ext>
+            </a:extLst>
+          </p:cNvPr>
+          <p:cNvCxnSpPr>
+            <a:cxnSpLocks/>
+            <a:stCxn id="46" idx="3"/>
+            <a:endCxn id="55" idx="0"/>
+          </p:cNvCxnSpPr>
+          <p:nvPr/>
+        </p:nvCxnSpPr>
+        <p:spPr>
+          <a:xfrm>
+            <a:off x="7442762" y="3501066"/>
+            <a:ext cx="2999196" cy="1012540"/>
+          </a:xfrm>
+          <a:prstGeom prst="bentConnector2">
+            <a:avLst/>
+          </a:prstGeom>
+          <a:ln w="28575">
+            <a:headEnd type="none" w="med" len="med"/>
+            <a:tailEnd type="arrow" w="med" len="med"/>
+          </a:ln>
+        </p:spPr>
+        <p:style>
+          <a:lnRef idx="1">
+            <a:schemeClr val="accent1"/>
+          </a:lnRef>
+          <a:fillRef idx="0">
+            <a:schemeClr val="accent1"/>
+          </a:fillRef>
+          <a:effectRef idx="0">
+            <a:schemeClr val="accent1"/>
+          </a:effectRef>
+          <a:fontRef idx="minor">
+            <a:schemeClr val="tx1"/>
+          </a:fontRef>
+        </p:style>
+      </p:cxnSp>
+      <p:sp>
+        <p:nvSpPr>
+          <p:cNvPr id="70" name="ZoneTexte 69">
+            <a:extLst>
+              <a:ext uri="{FF2B5EF4-FFF2-40B4-BE49-F238E27FC236}">
+                <a16:creationId xmlns:a16="http://schemas.microsoft.com/office/drawing/2014/main" id="{32AC0154-36F6-4FA3-B245-FE044FA1CE68}"/>
+              </a:ext>
+            </a:extLst>
+          </p:cNvPr>
+          <p:cNvSpPr txBox="1"/>
+          <p:nvPr/>
+        </p:nvSpPr>
+        <p:spPr>
+          <a:xfrm>
+            <a:off x="3238672" y="1998412"/>
+            <a:ext cx="1429261" cy="923330"/>
+          </a:xfrm>
+          <a:prstGeom prst="rect">
+            <a:avLst/>
+          </a:prstGeom>
+          <a:noFill/>
+        </p:spPr>
+        <p:txBody>
+          <a:bodyPr wrap="square" rtlCol="0">
+            <a:spAutoFit/>
+          </a:bodyPr>
+          <a:lstStyle/>
+          <a:p>
+            <a:r>
+              <a:rPr lang="en-US" noProof="1"/>
+              <a:t>Requirement for input specimen</a:t>
+            </a:r>
+          </a:p>
+        </p:txBody>
+      </p:sp>
+      <p:sp>
+        <p:nvSpPr>
+          <p:cNvPr id="71" name="ZoneTexte 70">
+            <a:extLst>
+              <a:ext uri="{FF2B5EF4-FFF2-40B4-BE49-F238E27FC236}">
+                <a16:creationId xmlns:a16="http://schemas.microsoft.com/office/drawing/2014/main" id="{98BEC931-6B82-43BE-8606-752AC314803E}"/>
+              </a:ext>
+            </a:extLst>
+          </p:cNvPr>
+          <p:cNvSpPr txBox="1"/>
+          <p:nvPr/>
+        </p:nvSpPr>
+        <p:spPr>
+          <a:xfrm>
+            <a:off x="2847435" y="4511129"/>
+            <a:ext cx="607145" cy="338554"/>
+          </a:xfrm>
+          <a:prstGeom prst="rect">
+            <a:avLst/>
+          </a:prstGeom>
+          <a:noFill/>
+        </p:spPr>
+        <p:txBody>
+          <a:bodyPr wrap="square" rtlCol="0">
+            <a:spAutoFit/>
+          </a:bodyPr>
+          <a:lstStyle/>
+          <a:p>
+            <a:r>
+              <a:rPr lang="en-US" sz="1600" noProof="1"/>
+              <a:t>0..*</a:t>
+            </a:r>
+          </a:p>
+        </p:txBody>
+      </p:sp>
+      <p:sp>
+        <p:nvSpPr>
+          <p:cNvPr id="72" name="ZoneTexte 71">
+            <a:extLst>
+              <a:ext uri="{FF2B5EF4-FFF2-40B4-BE49-F238E27FC236}">
+                <a16:creationId xmlns:a16="http://schemas.microsoft.com/office/drawing/2014/main" id="{A9309530-9C72-431E-AF17-F95DB70E7D31}"/>
+              </a:ext>
+            </a:extLst>
+          </p:cNvPr>
+          <p:cNvSpPr txBox="1"/>
+          <p:nvPr/>
+        </p:nvSpPr>
+        <p:spPr>
+          <a:xfrm>
+            <a:off x="5976002" y="4087610"/>
+            <a:ext cx="2577103" cy="369332"/>
+          </a:xfrm>
+          <a:prstGeom prst="rect">
+            <a:avLst/>
+          </a:prstGeom>
+          <a:noFill/>
+        </p:spPr>
+        <p:txBody>
+          <a:bodyPr wrap="square" rtlCol="0">
+            <a:spAutoFit/>
+          </a:bodyPr>
+          <a:lstStyle/>
+          <a:p>
+            <a:r>
+              <a:rPr lang="en-US" noProof="1"/>
+              <a:t>observationRequirement</a:t>
+            </a:r>
+          </a:p>
+        </p:txBody>
+      </p:sp>
+      <p:sp>
+        <p:nvSpPr>
+          <p:cNvPr id="73" name="ZoneTexte 72">
+            <a:extLst>
+              <a:ext uri="{FF2B5EF4-FFF2-40B4-BE49-F238E27FC236}">
+                <a16:creationId xmlns:a16="http://schemas.microsoft.com/office/drawing/2014/main" id="{EB4220E8-E8FB-4F6B-8617-DD85238222A6}"/>
+              </a:ext>
+            </a:extLst>
+          </p:cNvPr>
+          <p:cNvSpPr txBox="1"/>
+          <p:nvPr/>
+        </p:nvSpPr>
+        <p:spPr>
+          <a:xfrm>
+            <a:off x="6000916" y="4552741"/>
+            <a:ext cx="607145" cy="338554"/>
+          </a:xfrm>
+          <a:prstGeom prst="rect">
+            <a:avLst/>
+          </a:prstGeom>
+          <a:noFill/>
+        </p:spPr>
+        <p:txBody>
+          <a:bodyPr wrap="square" rtlCol="0">
+            <a:spAutoFit/>
+          </a:bodyPr>
+          <a:lstStyle/>
+          <a:p>
+            <a:r>
+              <a:rPr lang="en-US" sz="1600" noProof="1"/>
+              <a:t>0..*</a:t>
+            </a:r>
+          </a:p>
+        </p:txBody>
+      </p:sp>
+      <p:sp>
+        <p:nvSpPr>
+          <p:cNvPr id="74" name="ZoneTexte 73">
+            <a:extLst>
+              <a:ext uri="{FF2B5EF4-FFF2-40B4-BE49-F238E27FC236}">
+                <a16:creationId xmlns:a16="http://schemas.microsoft.com/office/drawing/2014/main" id="{0DE7D4C7-570D-4738-83D2-78C610CF8DB2}"/>
+              </a:ext>
+            </a:extLst>
+          </p:cNvPr>
+          <p:cNvSpPr txBox="1"/>
+          <p:nvPr/>
+        </p:nvSpPr>
+        <p:spPr>
+          <a:xfrm>
+            <a:off x="9972372" y="4116435"/>
+            <a:ext cx="607145" cy="338554"/>
+          </a:xfrm>
+          <a:prstGeom prst="rect">
+            <a:avLst/>
+          </a:prstGeom>
+          <a:noFill/>
+        </p:spPr>
+        <p:txBody>
+          <a:bodyPr wrap="square" rtlCol="0">
+            <a:spAutoFit/>
+          </a:bodyPr>
+          <a:lstStyle/>
+          <a:p>
+            <a:r>
+              <a:rPr lang="en-US" sz="1600" noProof="1"/>
+              <a:t>0..*</a:t>
+            </a:r>
+          </a:p>
+        </p:txBody>
+      </p:sp>
+      <p:sp>
+        <p:nvSpPr>
+          <p:cNvPr id="75" name="ZoneTexte 74">
+            <a:extLst>
+              <a:ext uri="{FF2B5EF4-FFF2-40B4-BE49-F238E27FC236}">
+                <a16:creationId xmlns:a16="http://schemas.microsoft.com/office/drawing/2014/main" id="{2EFF53CD-4ECD-44EE-9F56-5713E9D8A8F4}"/>
+              </a:ext>
+            </a:extLst>
+          </p:cNvPr>
+          <p:cNvSpPr txBox="1"/>
+          <p:nvPr/>
+        </p:nvSpPr>
+        <p:spPr>
+          <a:xfrm>
+            <a:off x="7470755" y="3124652"/>
+            <a:ext cx="3111179" cy="369332"/>
+          </a:xfrm>
+          <a:prstGeom prst="rect">
+            <a:avLst/>
+          </a:prstGeom>
+          <a:noFill/>
+        </p:spPr>
+        <p:txBody>
+          <a:bodyPr wrap="square" rtlCol="0">
+            <a:spAutoFit/>
+          </a:bodyPr>
+          <a:lstStyle/>
+          <a:p>
+            <a:r>
+              <a:rPr lang="en-US" noProof="1"/>
+              <a:t>observationResultRequirement</a:t>
+            </a:r>
+          </a:p>
+        </p:txBody>
+      </p:sp>
+      <p:sp>
+        <p:nvSpPr>
+          <p:cNvPr id="2" name="ZoneTexte 1">
+            <a:extLst>
+              <a:ext uri="{FF2B5EF4-FFF2-40B4-BE49-F238E27FC236}">
+                <a16:creationId xmlns:a16="http://schemas.microsoft.com/office/drawing/2014/main" id="{14C66D9E-6541-4236-87A7-C6FE9DAC58A9}"/>
+              </a:ext>
+            </a:extLst>
+          </p:cNvPr>
+          <p:cNvSpPr txBox="1"/>
+          <p:nvPr/>
+        </p:nvSpPr>
+        <p:spPr>
+          <a:xfrm>
+            <a:off x="18301" y="19604"/>
+            <a:ext cx="1540369" cy="646331"/>
+          </a:xfrm>
+          <a:prstGeom prst="rect">
+            <a:avLst/>
+          </a:prstGeom>
+          <a:noFill/>
+        </p:spPr>
+        <p:txBody>
+          <a:bodyPr wrap="square" rtlCol="0">
+            <a:spAutoFit/>
+          </a:bodyPr>
+          <a:lstStyle/>
+          <a:p>
+            <a:pPr algn="r"/>
+            <a:r>
+              <a:rPr lang="en-US" i="1" noProof="1">
+                <a:solidFill>
+                  <a:schemeClr val="accent1">
+                    <a:lumMod val="60000"/>
+                    <a:lumOff val="40000"/>
+                  </a:schemeClr>
+                </a:solidFill>
+              </a:rPr>
+              <a:t>a laboratory compendium</a:t>
+            </a:r>
+          </a:p>
+        </p:txBody>
+      </p:sp>
+      <p:sp>
+        <p:nvSpPr>
+          <p:cNvPr id="4" name="ZoneTexte 3">
+            <a:extLst>
+              <a:ext uri="{FF2B5EF4-FFF2-40B4-BE49-F238E27FC236}">
+                <a16:creationId xmlns:a16="http://schemas.microsoft.com/office/drawing/2014/main" id="{5B6C8461-F70B-415E-81E3-8C60209C46E4}"/>
+              </a:ext>
+            </a:extLst>
+          </p:cNvPr>
+          <p:cNvSpPr txBox="1"/>
+          <p:nvPr/>
+        </p:nvSpPr>
+        <p:spPr>
+          <a:xfrm>
+            <a:off x="6159489" y="215127"/>
+            <a:ext cx="3160644" cy="646331"/>
+          </a:xfrm>
+          <a:prstGeom prst="rect">
+            <a:avLst/>
+          </a:prstGeom>
+          <a:noFill/>
+        </p:spPr>
+        <p:txBody>
+          <a:bodyPr wrap="square" rtlCol="0">
+            <a:spAutoFit/>
+          </a:bodyPr>
+          <a:lstStyle>
+            <a:defPPr>
+              <a:defRPr lang="fr-FR"/>
+            </a:defPPr>
+            <a:lvl1pPr>
+              <a:defRPr>
+                <a:solidFill>
+                  <a:schemeClr val="accent1">
+                    <a:lumMod val="60000"/>
+                    <a:lumOff val="40000"/>
+                  </a:schemeClr>
+                </a:solidFill>
+              </a:defRPr>
+            </a:lvl1pPr>
+          </a:lstStyle>
+          <a:p>
+            <a:r>
+              <a:rPr lang="en-US" i="1" noProof="1"/>
+              <a:t>a laboratory service accessible by the consumers of the catalog</a:t>
+            </a:r>
+          </a:p>
+        </p:txBody>
+      </p:sp>
+      <p:sp>
+        <p:nvSpPr>
+          <p:cNvPr id="5" name="ZoneTexte 4">
+            <a:extLst>
+              <a:ext uri="{FF2B5EF4-FFF2-40B4-BE49-F238E27FC236}">
+                <a16:creationId xmlns:a16="http://schemas.microsoft.com/office/drawing/2014/main" id="{0BEB468F-E1B9-4178-88A1-7D05D12F5B2A}"/>
+              </a:ext>
+            </a:extLst>
+          </p:cNvPr>
+          <p:cNvSpPr txBox="1"/>
+          <p:nvPr/>
+        </p:nvSpPr>
+        <p:spPr>
+          <a:xfrm>
+            <a:off x="6017300" y="2523149"/>
+            <a:ext cx="6190996" cy="369332"/>
+          </a:xfrm>
+          <a:prstGeom prst="rect">
+            <a:avLst/>
+          </a:prstGeom>
+          <a:noFill/>
+        </p:spPr>
+        <p:txBody>
+          <a:bodyPr wrap="square" rtlCol="0">
+            <a:spAutoFit/>
+          </a:bodyPr>
+          <a:lstStyle>
+            <a:defPPr>
+              <a:defRPr lang="fr-FR"/>
+            </a:defPPr>
+            <a:lvl1pPr>
+              <a:defRPr>
+                <a:solidFill>
+                  <a:schemeClr val="accent1">
+                    <a:lumMod val="60000"/>
+                    <a:lumOff val="40000"/>
+                  </a:schemeClr>
+                </a:solidFill>
+              </a:defRPr>
+            </a:lvl1pPr>
+          </a:lstStyle>
+          <a:p>
+            <a:r>
+              <a:rPr lang="en-US" i="1" noProof="1"/>
+              <a:t>a laboratory procedure operationalizing the service </a:t>
+            </a:r>
+          </a:p>
+        </p:txBody>
+      </p:sp>
+      <p:sp>
+        <p:nvSpPr>
+          <p:cNvPr id="32" name="ZoneTexte 31">
+            <a:extLst>
+              <a:ext uri="{FF2B5EF4-FFF2-40B4-BE49-F238E27FC236}">
+                <a16:creationId xmlns:a16="http://schemas.microsoft.com/office/drawing/2014/main" id="{12A68CC3-C8B9-4937-AF74-D3235493E42E}"/>
+              </a:ext>
+            </a:extLst>
+          </p:cNvPr>
+          <p:cNvSpPr txBox="1"/>
+          <p:nvPr/>
+        </p:nvSpPr>
+        <p:spPr>
+          <a:xfrm>
+            <a:off x="637856" y="4187963"/>
+            <a:ext cx="2109840" cy="646331"/>
+          </a:xfrm>
+          <a:prstGeom prst="rect">
+            <a:avLst/>
+          </a:prstGeom>
+          <a:noFill/>
+        </p:spPr>
+        <p:txBody>
+          <a:bodyPr wrap="square" rtlCol="0">
+            <a:spAutoFit/>
+          </a:bodyPr>
+          <a:lstStyle>
+            <a:defPPr>
+              <a:defRPr lang="fr-FR"/>
+            </a:defPPr>
+            <a:lvl1pPr>
+              <a:defRPr>
+                <a:solidFill>
+                  <a:schemeClr val="accent1">
+                    <a:lumMod val="60000"/>
+                    <a:lumOff val="40000"/>
+                  </a:schemeClr>
+                </a:solidFill>
+              </a:defRPr>
+            </a:lvl1pPr>
+          </a:lstStyle>
+          <a:p>
+            <a:pPr algn="r"/>
+            <a:r>
+              <a:rPr lang="en-US" i="1" noProof="1"/>
+              <a:t>a specimen required by the procedure</a:t>
+            </a:r>
+          </a:p>
+        </p:txBody>
+      </p:sp>
+      <p:sp>
+        <p:nvSpPr>
+          <p:cNvPr id="33" name="ZoneTexte 32">
+            <a:extLst>
+              <a:ext uri="{FF2B5EF4-FFF2-40B4-BE49-F238E27FC236}">
+                <a16:creationId xmlns:a16="http://schemas.microsoft.com/office/drawing/2014/main" id="{0A105627-941F-444D-B556-9B067AA85A13}"/>
+              </a:ext>
+            </a:extLst>
+          </p:cNvPr>
+          <p:cNvSpPr txBox="1"/>
+          <p:nvPr/>
+        </p:nvSpPr>
+        <p:spPr>
+          <a:xfrm>
+            <a:off x="3702787" y="4259092"/>
+            <a:ext cx="2268722" cy="646331"/>
+          </a:xfrm>
+          <a:prstGeom prst="rect">
+            <a:avLst/>
+          </a:prstGeom>
+          <a:noFill/>
+        </p:spPr>
+        <p:txBody>
+          <a:bodyPr wrap="square" rtlCol="0">
+            <a:spAutoFit/>
+          </a:bodyPr>
+          <a:lstStyle>
+            <a:defPPr>
+              <a:defRPr lang="fr-FR"/>
+            </a:defPPr>
+            <a:lvl1pPr>
+              <a:defRPr>
+                <a:solidFill>
+                  <a:schemeClr val="accent1">
+                    <a:lumMod val="60000"/>
+                    <a:lumOff val="40000"/>
+                  </a:schemeClr>
+                </a:solidFill>
+              </a:defRPr>
+            </a:lvl1pPr>
+          </a:lstStyle>
+          <a:p>
+            <a:pPr algn="r"/>
+            <a:r>
+              <a:rPr lang="en-US" i="1" noProof="1"/>
+              <a:t>an input observation to the procedure</a:t>
+            </a:r>
+          </a:p>
+        </p:txBody>
+      </p:sp>
+      <p:sp>
+        <p:nvSpPr>
+          <p:cNvPr id="34" name="ZoneTexte 33">
+            <a:extLst>
+              <a:ext uri="{FF2B5EF4-FFF2-40B4-BE49-F238E27FC236}">
+                <a16:creationId xmlns:a16="http://schemas.microsoft.com/office/drawing/2014/main" id="{F26F3D45-53F9-4EC5-BA9D-39047742D144}"/>
+              </a:ext>
+            </a:extLst>
+          </p:cNvPr>
+          <p:cNvSpPr txBox="1"/>
+          <p:nvPr/>
+        </p:nvSpPr>
+        <p:spPr>
+          <a:xfrm>
+            <a:off x="10503583" y="3503857"/>
+            <a:ext cx="1541314" cy="923330"/>
+          </a:xfrm>
+          <a:prstGeom prst="rect">
+            <a:avLst/>
+          </a:prstGeom>
+          <a:noFill/>
+        </p:spPr>
+        <p:txBody>
+          <a:bodyPr wrap="square" rtlCol="0">
+            <a:spAutoFit/>
+          </a:bodyPr>
+          <a:lstStyle>
+            <a:defPPr>
+              <a:defRPr lang="fr-FR"/>
+            </a:defPPr>
+            <a:lvl1pPr>
+              <a:defRPr>
+                <a:solidFill>
+                  <a:schemeClr val="accent1">
+                    <a:lumMod val="60000"/>
+                    <a:lumOff val="40000"/>
+                  </a:schemeClr>
+                </a:solidFill>
+              </a:defRPr>
+            </a:lvl1pPr>
+          </a:lstStyle>
+          <a:p>
+            <a:r>
+              <a:rPr lang="en-US" i="1" noProof="1"/>
+              <a:t>an output observation of the procedure</a:t>
+            </a:r>
+          </a:p>
+        </p:txBody>
+      </p:sp>
+      <p:sp>
+        <p:nvSpPr>
+          <p:cNvPr id="30" name="Rectangle 29">
+            <a:extLst>
+              <a:ext uri="{FF2B5EF4-FFF2-40B4-BE49-F238E27FC236}">
+                <a16:creationId xmlns:a16="http://schemas.microsoft.com/office/drawing/2014/main" id="{3FF89A57-DB25-4A6C-878E-8BC0F0E66DCE}"/>
               </a:ext>
             </a:extLst>
           </p:cNvPr>
@@ -4519,8 +5153,54 @@
         </p:nvSpPr>
         <p:spPr>
           <a:xfrm>
-            <a:off x="617167" y="4932679"/>
-            <a:ext cx="2887484" cy="1142774"/>
+            <a:off x="6908365" y="1872870"/>
+            <a:ext cx="340999" cy="217887"/>
+          </a:xfrm>
+          <a:prstGeom prst="rect">
+            <a:avLst/>
+          </a:prstGeom>
+        </p:spPr>
+        <p:style>
+          <a:lnRef idx="2">
+            <a:schemeClr val="accent1">
+              <a:shade val="50000"/>
+            </a:schemeClr>
+          </a:lnRef>
+          <a:fillRef idx="1">
+            <a:schemeClr val="accent1"/>
+          </a:fillRef>
+          <a:effectRef idx="0">
+            <a:schemeClr val="accent1"/>
+          </a:effectRef>
+          <a:fontRef idx="minor">
+            <a:schemeClr val="lt1"/>
+          </a:fontRef>
+        </p:style>
+        <p:txBody>
+          <a:bodyPr rtlCol="0" anchor="ctr"/>
+          <a:lstStyle/>
+          <a:p>
+            <a:pPr algn="ctr"/>
+            <a:endParaRPr lang="fr-FR"/>
+          </a:p>
+        </p:txBody>
+      </p:sp>
+      <p:sp>
+        <p:nvSpPr>
+          <p:cNvPr id="38" name="Rectangle 37">
+            <a:extLst>
+              <a:ext uri="{FF2B5EF4-FFF2-40B4-BE49-F238E27FC236}">
+                <a16:creationId xmlns:a16="http://schemas.microsoft.com/office/drawing/2014/main" id="{84729A3E-A76D-4D5C-845E-6B5227D6B57E}"/>
+              </a:ext>
+            </a:extLst>
+          </p:cNvPr>
+          <p:cNvSpPr/>
+          <p:nvPr/>
+        </p:nvSpPr>
+        <p:spPr>
+          <a:xfrm>
+            <a:off x="8338775" y="6013917"/>
+            <a:ext cx="1667712" cy="476672"/>
           </a:xfrm>
           <a:prstGeom prst="rect">
             <a:avLst/>
@@ -4588,50 +5268,31 @@
                   <a:srgbClr val="FFFF00"/>
                 </a:solidFill>
               </a:rPr>
-              <a:t>LabSpecimenDefinition</a:t>
-            </a:r>
-          </a:p>
-          <a:p>
-            <a:pPr algn="ctr"/>
-            <a:r>
-              <a:rPr lang="en-US" sz="2000" noProof="1">
-                <a:solidFill>
-                  <a:schemeClr val="bg1"/>
-                </a:solidFill>
-              </a:rPr>
-              <a:t>Profile of </a:t>
-            </a:r>
-            <a:r>
-              <a:rPr lang="en-US" sz="2200" noProof="1">
-                <a:solidFill>
-                  <a:srgbClr val="FFFF00"/>
-                </a:solidFill>
-              </a:rPr>
-              <a:t>SpecimenDefinition</a:t>
+              <a:t>ValueSet</a:t>
             </a:r>
           </a:p>
         </p:txBody>
       </p:sp>
       <p:cxnSp>
         <p:nvCxnSpPr>
-          <p:cNvPr id="57" name="Connecteur : en angle 56">
-            <a:extLst>
-              <a:ext uri="{FF2B5EF4-FFF2-40B4-BE49-F238E27FC236}">
-                <a16:creationId xmlns:a16="http://schemas.microsoft.com/office/drawing/2014/main" id="{15990ED7-D7B7-4EEE-A20B-C21EC57541DC}"/>
+          <p:cNvPr id="39" name="Connecteur : en angle 38">
+            <a:extLst>
+              <a:ext uri="{FF2B5EF4-FFF2-40B4-BE49-F238E27FC236}">
+                <a16:creationId xmlns:a16="http://schemas.microsoft.com/office/drawing/2014/main" id="{8C9A6475-6E13-4D17-99C8-139A747BD801}"/>
               </a:ext>
             </a:extLst>
           </p:cNvPr>
           <p:cNvCxnSpPr>
             <a:cxnSpLocks/>
-            <a:stCxn id="46" idx="1"/>
-            <a:endCxn id="56" idx="0"/>
+            <a:stCxn id="54" idx="2"/>
+            <a:endCxn id="38" idx="1"/>
           </p:cNvCxnSpPr>
           <p:nvPr/>
         </p:nvCxnSpPr>
         <p:spPr>
-          <a:xfrm rot="10800000" flipV="1">
-            <a:off x="2060909" y="3501065"/>
-            <a:ext cx="2466998" cy="1431613"/>
+          <a:xfrm rot="16200000" flipH="1">
+            <a:off x="7057495" y="4970973"/>
+            <a:ext cx="210874" cy="2351686"/>
           </a:xfrm>
           <a:prstGeom prst="bentConnector2">
             <a:avLst/>
@@ -4658,29 +5319,27 @@
       </p:cxnSp>
       <p:cxnSp>
         <p:nvCxnSpPr>
-          <p:cNvPr id="60" name="Connecteur : en angle 59">
-            <a:extLst>
-              <a:ext uri="{FF2B5EF4-FFF2-40B4-BE49-F238E27FC236}">
-                <a16:creationId xmlns:a16="http://schemas.microsoft.com/office/drawing/2014/main" id="{DA2AF1A3-48F7-47E0-B4B7-79E68B4E6B5C}"/>
+          <p:cNvPr id="40" name="Connecteur : en angle 39">
+            <a:extLst>
+              <a:ext uri="{FF2B5EF4-FFF2-40B4-BE49-F238E27FC236}">
+                <a16:creationId xmlns:a16="http://schemas.microsoft.com/office/drawing/2014/main" id="{444B2695-C708-469B-B42D-479F8382004C}"/>
               </a:ext>
             </a:extLst>
           </p:cNvPr>
           <p:cNvCxnSpPr>
             <a:cxnSpLocks/>
-            <a:stCxn id="46" idx="2"/>
-            <a:endCxn id="54" idx="0"/>
+            <a:stCxn id="55" idx="2"/>
+            <a:endCxn id="38" idx="3"/>
           </p:cNvCxnSpPr>
           <p:nvPr/>
         </p:nvCxnSpPr>
         <p:spPr>
-          <a:xfrm rot="16200000" flipH="1">
-            <a:off x="5546420" y="4510252"/>
-            <a:ext cx="879585" cy="1754"/>
-          </a:xfrm>
-          <a:prstGeom prst="bentConnector3">
-            <a:avLst>
-              <a:gd name="adj1" fmla="val 50000"/>
-            </a:avLst>
+          <a:xfrm rot="5400000">
+            <a:off x="9900128" y="5710423"/>
+            <a:ext cx="648190" cy="435471"/>
+          </a:xfrm>
+          <a:prstGeom prst="bentConnector2">
+            <a:avLst/>
           </a:prstGeom>
           <a:ln w="28575">
             <a:headEnd type="none" w="med" len="med"/>
@@ -4702,56 +5361,12 @@
           </a:fontRef>
         </p:style>
       </p:cxnSp>
-      <p:cxnSp>
-        <p:nvCxnSpPr>
-          <p:cNvPr id="63" name="Connecteur : en angle 62">
-            <a:extLst>
-              <a:ext uri="{FF2B5EF4-FFF2-40B4-BE49-F238E27FC236}">
-                <a16:creationId xmlns:a16="http://schemas.microsoft.com/office/drawing/2014/main" id="{52F29C62-3816-4A94-93C8-4E3BA5AF99AA}"/>
-              </a:ext>
-            </a:extLst>
-          </p:cNvPr>
-          <p:cNvCxnSpPr>
-            <a:cxnSpLocks/>
-            <a:stCxn id="46" idx="3"/>
-            <a:endCxn id="55" idx="0"/>
-          </p:cNvCxnSpPr>
-          <p:nvPr/>
-        </p:nvCxnSpPr>
-        <p:spPr>
-          <a:xfrm>
-            <a:off x="7442762" y="3501066"/>
-            <a:ext cx="2999196" cy="1012540"/>
-          </a:xfrm>
-          <a:prstGeom prst="bentConnector2">
-            <a:avLst/>
-          </a:prstGeom>
-          <a:ln w="28575">
-            <a:headEnd type="none" w="med" len="med"/>
-            <a:tailEnd type="arrow" w="med" len="med"/>
-          </a:ln>
-        </p:spPr>
-        <p:style>
-          <a:lnRef idx="1">
-            <a:schemeClr val="accent1"/>
-          </a:lnRef>
-          <a:fillRef idx="0">
-            <a:schemeClr val="accent1"/>
-          </a:fillRef>
-          <a:effectRef idx="0">
-            <a:schemeClr val="accent1"/>
-          </a:effectRef>
-          <a:fontRef idx="minor">
-            <a:schemeClr val="tx1"/>
-          </a:fontRef>
-        </p:style>
-      </p:cxnSp>
-      <p:sp>
-        <p:nvSpPr>
-          <p:cNvPr id="70" name="ZoneTexte 69">
-            <a:extLst>
-              <a:ext uri="{FF2B5EF4-FFF2-40B4-BE49-F238E27FC236}">
-                <a16:creationId xmlns:a16="http://schemas.microsoft.com/office/drawing/2014/main" id="{32AC0154-36F6-4FA3-B245-FE044FA1CE68}"/>
+      <p:sp>
+        <p:nvSpPr>
+          <p:cNvPr id="44" name="ZoneTexte 43">
+            <a:extLst>
+              <a:ext uri="{FF2B5EF4-FFF2-40B4-BE49-F238E27FC236}">
+                <a16:creationId xmlns:a16="http://schemas.microsoft.com/office/drawing/2014/main" id="{ABDD23CA-E87E-4D3B-BBE6-6BFF35D20C07}"/>
               </a:ext>
             </a:extLst>
           </p:cNvPr>
@@ -4760,8 +5375,8 @@
         </p:nvSpPr>
         <p:spPr>
           <a:xfrm>
-            <a:off x="2228146" y="3475822"/>
-            <a:ext cx="2308432" cy="369332"/>
+            <a:off x="7787304" y="6202144"/>
+            <a:ext cx="607145" cy="338554"/>
           </a:xfrm>
           <a:prstGeom prst="rect">
             <a:avLst/>
@@ -4775,18 +5390,18 @@
           <a:lstStyle/>
           <a:p>
             <a:r>
-              <a:rPr lang="en-US" noProof="1"/>
-              <a:t>specimenRequirement</a:t>
-            </a:r>
-          </a:p>
-        </p:txBody>
-      </p:sp>
-      <p:sp>
-        <p:nvSpPr>
-          <p:cNvPr id="71" name="ZoneTexte 70">
-            <a:extLst>
-              <a:ext uri="{FF2B5EF4-FFF2-40B4-BE49-F238E27FC236}">
-                <a16:creationId xmlns:a16="http://schemas.microsoft.com/office/drawing/2014/main" id="{98BEC931-6B82-43BE-8606-752AC314803E}"/>
+              <a:rPr lang="en-US" sz="1600" noProof="1"/>
+              <a:t>0..4</a:t>
+            </a:r>
+          </a:p>
+        </p:txBody>
+      </p:sp>
+      <p:sp>
+        <p:nvSpPr>
+          <p:cNvPr id="45" name="ZoneTexte 44">
+            <a:extLst>
+              <a:ext uri="{FF2B5EF4-FFF2-40B4-BE49-F238E27FC236}">
+                <a16:creationId xmlns:a16="http://schemas.microsoft.com/office/drawing/2014/main" id="{BF367F50-5720-4E7F-B6DA-33B6D1C10BDD}"/>
               </a:ext>
             </a:extLst>
           </p:cNvPr>
@@ -4795,7 +5410,7 @@
         </p:nvSpPr>
         <p:spPr>
           <a:xfrm>
-            <a:off x="2052239" y="4499754"/>
+            <a:off x="10068787" y="6205871"/>
             <a:ext cx="607145" cy="338554"/>
           </a:xfrm>
           <a:prstGeom prst="rect">
@@ -4811,447 +5426,17 @@
           <a:p>
             <a:r>
               <a:rPr lang="en-US" sz="1600" noProof="1"/>
-              <a:t>0..*</a:t>
-            </a:r>
-          </a:p>
-        </p:txBody>
-      </p:sp>
-      <p:sp>
-        <p:nvSpPr>
-          <p:cNvPr id="72" name="ZoneTexte 71">
-            <a:extLst>
-              <a:ext uri="{FF2B5EF4-FFF2-40B4-BE49-F238E27FC236}">
-                <a16:creationId xmlns:a16="http://schemas.microsoft.com/office/drawing/2014/main" id="{A9309530-9C72-431E-AF17-F95DB70E7D31}"/>
-              </a:ext>
-            </a:extLst>
-          </p:cNvPr>
-          <p:cNvSpPr txBox="1"/>
-          <p:nvPr/>
-        </p:nvSpPr>
-        <p:spPr>
-          <a:xfrm>
-            <a:off x="5976002" y="4087610"/>
-            <a:ext cx="2577103" cy="369332"/>
-          </a:xfrm>
-          <a:prstGeom prst="rect">
-            <a:avLst/>
-          </a:prstGeom>
-          <a:noFill/>
-        </p:spPr>
-        <p:txBody>
-          <a:bodyPr wrap="square" rtlCol="0">
-            <a:spAutoFit/>
-          </a:bodyPr>
-          <a:lstStyle/>
-          <a:p>
-            <a:r>
-              <a:rPr lang="en-US" noProof="1"/>
-              <a:t>observationRequirement</a:t>
-            </a:r>
-          </a:p>
-        </p:txBody>
-      </p:sp>
-      <p:sp>
-        <p:nvSpPr>
-          <p:cNvPr id="73" name="ZoneTexte 72">
-            <a:extLst>
-              <a:ext uri="{FF2B5EF4-FFF2-40B4-BE49-F238E27FC236}">
-                <a16:creationId xmlns:a16="http://schemas.microsoft.com/office/drawing/2014/main" id="{EB4220E8-E8FB-4F6B-8617-DD85238222A6}"/>
-              </a:ext>
-            </a:extLst>
-          </p:cNvPr>
-          <p:cNvSpPr txBox="1"/>
-          <p:nvPr/>
-        </p:nvSpPr>
-        <p:spPr>
-          <a:xfrm>
-            <a:off x="6000916" y="4552741"/>
-            <a:ext cx="607145" cy="338554"/>
-          </a:xfrm>
-          <a:prstGeom prst="rect">
-            <a:avLst/>
-          </a:prstGeom>
-          <a:noFill/>
-        </p:spPr>
-        <p:txBody>
-          <a:bodyPr wrap="square" rtlCol="0">
-            <a:spAutoFit/>
-          </a:bodyPr>
-          <a:lstStyle/>
-          <a:p>
-            <a:r>
-              <a:rPr lang="en-US" sz="1600" noProof="1"/>
-              <a:t>0..*</a:t>
-            </a:r>
-          </a:p>
-        </p:txBody>
-      </p:sp>
-      <p:sp>
-        <p:nvSpPr>
-          <p:cNvPr id="74" name="ZoneTexte 73">
-            <a:extLst>
-              <a:ext uri="{FF2B5EF4-FFF2-40B4-BE49-F238E27FC236}">
-                <a16:creationId xmlns:a16="http://schemas.microsoft.com/office/drawing/2014/main" id="{0DE7D4C7-570D-4738-83D2-78C610CF8DB2}"/>
-              </a:ext>
-            </a:extLst>
-          </p:cNvPr>
-          <p:cNvSpPr txBox="1"/>
-          <p:nvPr/>
-        </p:nvSpPr>
-        <p:spPr>
-          <a:xfrm>
-            <a:off x="9972372" y="4116435"/>
-            <a:ext cx="607145" cy="338554"/>
-          </a:xfrm>
-          <a:prstGeom prst="rect">
-            <a:avLst/>
-          </a:prstGeom>
-          <a:noFill/>
-        </p:spPr>
-        <p:txBody>
-          <a:bodyPr wrap="square" rtlCol="0">
-            <a:spAutoFit/>
-          </a:bodyPr>
-          <a:lstStyle/>
-          <a:p>
-            <a:r>
-              <a:rPr lang="en-US" sz="1600" noProof="1"/>
-              <a:t>0..*</a:t>
-            </a:r>
-          </a:p>
-        </p:txBody>
-      </p:sp>
-      <p:sp>
-        <p:nvSpPr>
-          <p:cNvPr id="75" name="ZoneTexte 74">
-            <a:extLst>
-              <a:ext uri="{FF2B5EF4-FFF2-40B4-BE49-F238E27FC236}">
-                <a16:creationId xmlns:a16="http://schemas.microsoft.com/office/drawing/2014/main" id="{2EFF53CD-4ECD-44EE-9F56-5713E9D8A8F4}"/>
-              </a:ext>
-            </a:extLst>
-          </p:cNvPr>
-          <p:cNvSpPr txBox="1"/>
-          <p:nvPr/>
-        </p:nvSpPr>
-        <p:spPr>
-          <a:xfrm>
-            <a:off x="7470755" y="3124652"/>
-            <a:ext cx="3111179" cy="369332"/>
-          </a:xfrm>
-          <a:prstGeom prst="rect">
-            <a:avLst/>
-          </a:prstGeom>
-          <a:noFill/>
-        </p:spPr>
-        <p:txBody>
-          <a:bodyPr wrap="square" rtlCol="0">
-            <a:spAutoFit/>
-          </a:bodyPr>
-          <a:lstStyle/>
-          <a:p>
-            <a:r>
-              <a:rPr lang="en-US" noProof="1"/>
-              <a:t>observationResultRequirement</a:t>
-            </a:r>
-          </a:p>
-        </p:txBody>
-      </p:sp>
-      <p:sp>
-        <p:nvSpPr>
-          <p:cNvPr id="2" name="ZoneTexte 1">
-            <a:extLst>
-              <a:ext uri="{FF2B5EF4-FFF2-40B4-BE49-F238E27FC236}">
-                <a16:creationId xmlns:a16="http://schemas.microsoft.com/office/drawing/2014/main" id="{14C66D9E-6541-4236-87A7-C6FE9DAC58A9}"/>
-              </a:ext>
-            </a:extLst>
-          </p:cNvPr>
-          <p:cNvSpPr txBox="1"/>
-          <p:nvPr/>
-        </p:nvSpPr>
-        <p:spPr>
-          <a:xfrm>
-            <a:off x="18301" y="19604"/>
-            <a:ext cx="1540369" cy="646331"/>
-          </a:xfrm>
-          <a:prstGeom prst="rect">
-            <a:avLst/>
-          </a:prstGeom>
-          <a:noFill/>
-        </p:spPr>
-        <p:txBody>
-          <a:bodyPr wrap="square" rtlCol="0">
-            <a:spAutoFit/>
-          </a:bodyPr>
-          <a:lstStyle/>
-          <a:p>
-            <a:pPr algn="r"/>
-            <a:r>
-              <a:rPr lang="en-US" i="1" noProof="1">
-                <a:solidFill>
-                  <a:schemeClr val="accent1">
-                    <a:lumMod val="60000"/>
-                    <a:lumOff val="40000"/>
-                  </a:schemeClr>
-                </a:solidFill>
-              </a:rPr>
-              <a:t>the laboratory compendium</a:t>
-            </a:r>
-          </a:p>
-        </p:txBody>
-      </p:sp>
-      <p:sp>
-        <p:nvSpPr>
-          <p:cNvPr id="4" name="ZoneTexte 3">
-            <a:extLst>
-              <a:ext uri="{FF2B5EF4-FFF2-40B4-BE49-F238E27FC236}">
-                <a16:creationId xmlns:a16="http://schemas.microsoft.com/office/drawing/2014/main" id="{5B6C8461-F70B-415E-81E3-8C60209C46E4}"/>
-              </a:ext>
-            </a:extLst>
-          </p:cNvPr>
-          <p:cNvSpPr txBox="1"/>
-          <p:nvPr/>
-        </p:nvSpPr>
-        <p:spPr>
-          <a:xfrm>
-            <a:off x="4688380" y="-1334"/>
-            <a:ext cx="3160644" cy="646331"/>
-          </a:xfrm>
-          <a:prstGeom prst="rect">
-            <a:avLst/>
-          </a:prstGeom>
-          <a:noFill/>
-        </p:spPr>
-        <p:txBody>
-          <a:bodyPr wrap="square" rtlCol="0">
-            <a:spAutoFit/>
-          </a:bodyPr>
-          <a:lstStyle>
-            <a:defPPr>
-              <a:defRPr lang="fr-FR"/>
-            </a:defPPr>
-            <a:lvl1pPr>
-              <a:defRPr>
-                <a:solidFill>
-                  <a:schemeClr val="accent1">
-                    <a:lumMod val="60000"/>
-                    <a:lumOff val="40000"/>
-                  </a:schemeClr>
-                </a:solidFill>
-              </a:defRPr>
-            </a:lvl1pPr>
-          </a:lstStyle>
-          <a:p>
-            <a:r>
-              <a:rPr lang="en-US" i="1" noProof="1"/>
-              <a:t>a laboratory service accessible by the consumers of the catalog</a:t>
-            </a:r>
-          </a:p>
-        </p:txBody>
-      </p:sp>
-      <p:sp>
-        <p:nvSpPr>
-          <p:cNvPr id="5" name="ZoneTexte 4">
-            <a:extLst>
-              <a:ext uri="{FF2B5EF4-FFF2-40B4-BE49-F238E27FC236}">
-                <a16:creationId xmlns:a16="http://schemas.microsoft.com/office/drawing/2014/main" id="{0BEB468F-E1B9-4178-88A1-7D05D12F5B2A}"/>
-              </a:ext>
-            </a:extLst>
-          </p:cNvPr>
-          <p:cNvSpPr txBox="1"/>
-          <p:nvPr/>
-        </p:nvSpPr>
-        <p:spPr>
-          <a:xfrm>
-            <a:off x="6017300" y="2523149"/>
-            <a:ext cx="6190996" cy="369332"/>
-          </a:xfrm>
-          <a:prstGeom prst="rect">
-            <a:avLst/>
-          </a:prstGeom>
-          <a:noFill/>
-        </p:spPr>
-        <p:txBody>
-          <a:bodyPr wrap="square" rtlCol="0">
-            <a:spAutoFit/>
-          </a:bodyPr>
-          <a:lstStyle>
-            <a:defPPr>
-              <a:defRPr lang="fr-FR"/>
-            </a:defPPr>
-            <a:lvl1pPr>
-              <a:defRPr>
-                <a:solidFill>
-                  <a:schemeClr val="accent1">
-                    <a:lumMod val="60000"/>
-                    <a:lumOff val="40000"/>
-                  </a:schemeClr>
-                </a:solidFill>
-              </a:defRPr>
-            </a:lvl1pPr>
-          </a:lstStyle>
-          <a:p>
-            <a:r>
-              <a:rPr lang="en-US" i="1" noProof="1"/>
-              <a:t>laboratory procedure operationalizing the service </a:t>
-            </a:r>
-          </a:p>
-        </p:txBody>
-      </p:sp>
-      <p:sp>
-        <p:nvSpPr>
-          <p:cNvPr id="32" name="ZoneTexte 31">
-            <a:extLst>
-              <a:ext uri="{FF2B5EF4-FFF2-40B4-BE49-F238E27FC236}">
-                <a16:creationId xmlns:a16="http://schemas.microsoft.com/office/drawing/2014/main" id="{12A68CC3-C8B9-4937-AF74-D3235493E42E}"/>
-              </a:ext>
-            </a:extLst>
-          </p:cNvPr>
-          <p:cNvSpPr txBox="1"/>
-          <p:nvPr/>
-        </p:nvSpPr>
-        <p:spPr>
-          <a:xfrm>
-            <a:off x="480116" y="3940643"/>
-            <a:ext cx="1540369" cy="923330"/>
-          </a:xfrm>
-          <a:prstGeom prst="rect">
-            <a:avLst/>
-          </a:prstGeom>
-          <a:noFill/>
-        </p:spPr>
-        <p:txBody>
-          <a:bodyPr wrap="square" rtlCol="0">
-            <a:spAutoFit/>
-          </a:bodyPr>
-          <a:lstStyle>
-            <a:defPPr>
-              <a:defRPr lang="fr-FR"/>
-            </a:defPPr>
-            <a:lvl1pPr>
-              <a:defRPr>
-                <a:solidFill>
-                  <a:schemeClr val="accent1">
-                    <a:lumMod val="60000"/>
-                    <a:lumOff val="40000"/>
-                  </a:schemeClr>
-                </a:solidFill>
-              </a:defRPr>
-            </a:lvl1pPr>
-          </a:lstStyle>
-          <a:p>
-            <a:pPr algn="r"/>
-            <a:r>
-              <a:rPr lang="en-US" i="1" noProof="1"/>
-              <a:t>a specimen required by the procedure</a:t>
-            </a:r>
-          </a:p>
-        </p:txBody>
-      </p:sp>
-      <p:sp>
-        <p:nvSpPr>
-          <p:cNvPr id="33" name="ZoneTexte 32">
-            <a:extLst>
-              <a:ext uri="{FF2B5EF4-FFF2-40B4-BE49-F238E27FC236}">
-                <a16:creationId xmlns:a16="http://schemas.microsoft.com/office/drawing/2014/main" id="{0A105627-941F-444D-B556-9B067AA85A13}"/>
-              </a:ext>
-            </a:extLst>
-          </p:cNvPr>
-          <p:cNvSpPr txBox="1"/>
-          <p:nvPr/>
-        </p:nvSpPr>
-        <p:spPr>
-          <a:xfrm>
-            <a:off x="3702787" y="4259092"/>
-            <a:ext cx="2268722" cy="646331"/>
-          </a:xfrm>
-          <a:prstGeom prst="rect">
-            <a:avLst/>
-          </a:prstGeom>
-          <a:noFill/>
-        </p:spPr>
-        <p:txBody>
-          <a:bodyPr wrap="square" rtlCol="0">
-            <a:spAutoFit/>
-          </a:bodyPr>
-          <a:lstStyle>
-            <a:defPPr>
-              <a:defRPr lang="fr-FR"/>
-            </a:defPPr>
-            <a:lvl1pPr>
-              <a:defRPr>
-                <a:solidFill>
-                  <a:schemeClr val="accent1">
-                    <a:lumMod val="60000"/>
-                    <a:lumOff val="40000"/>
-                  </a:schemeClr>
-                </a:solidFill>
-              </a:defRPr>
-            </a:lvl1pPr>
-          </a:lstStyle>
-          <a:p>
-            <a:pPr algn="r"/>
-            <a:r>
-              <a:rPr lang="en-US" i="1" noProof="1"/>
-              <a:t>an input observation to the procedure</a:t>
-            </a:r>
-          </a:p>
-        </p:txBody>
-      </p:sp>
-      <p:sp>
-        <p:nvSpPr>
-          <p:cNvPr id="34" name="ZoneTexte 33">
-            <a:extLst>
-              <a:ext uri="{FF2B5EF4-FFF2-40B4-BE49-F238E27FC236}">
-                <a16:creationId xmlns:a16="http://schemas.microsoft.com/office/drawing/2014/main" id="{F26F3D45-53F9-4EC5-BA9D-39047742D144}"/>
-              </a:ext>
-            </a:extLst>
-          </p:cNvPr>
-          <p:cNvSpPr txBox="1"/>
-          <p:nvPr/>
-        </p:nvSpPr>
-        <p:spPr>
-          <a:xfrm>
-            <a:off x="10503583" y="3503857"/>
-            <a:ext cx="1541314" cy="923330"/>
-          </a:xfrm>
-          <a:prstGeom prst="rect">
-            <a:avLst/>
-          </a:prstGeom>
-          <a:noFill/>
-        </p:spPr>
-        <p:txBody>
-          <a:bodyPr wrap="square" rtlCol="0">
-            <a:spAutoFit/>
-          </a:bodyPr>
-          <a:lstStyle>
-            <a:defPPr>
-              <a:defRPr lang="fr-FR"/>
-            </a:defPPr>
-            <a:lvl1pPr>
-              <a:defRPr>
-                <a:solidFill>
-                  <a:schemeClr val="accent1">
-                    <a:lumMod val="60000"/>
-                    <a:lumOff val="40000"/>
-                  </a:schemeClr>
-                </a:solidFill>
-              </a:defRPr>
-            </a:lvl1pPr>
-          </a:lstStyle>
-          <a:p>
-            <a:r>
-              <a:rPr lang="en-US" i="1" noProof="1"/>
-              <a:t>an output observation of the procedure</a:t>
-            </a:r>
-          </a:p>
-        </p:txBody>
-      </p:sp>
-      <p:sp>
-        <p:nvSpPr>
-          <p:cNvPr id="30" name="Rectangle 29">
-            <a:extLst>
-              <a:ext uri="{FF2B5EF4-FFF2-40B4-BE49-F238E27FC236}">
-                <a16:creationId xmlns:a16="http://schemas.microsoft.com/office/drawing/2014/main" id="{3FF89A57-DB25-4A6C-878E-8BC0F0E66DCE}"/>
+              <a:t>0..4</a:t>
+            </a:r>
+          </a:p>
+        </p:txBody>
+      </p:sp>
+      <p:sp>
+        <p:nvSpPr>
+          <p:cNvPr id="41" name="Rectangle 40">
+            <a:extLst>
+              <a:ext uri="{FF2B5EF4-FFF2-40B4-BE49-F238E27FC236}">
+                <a16:creationId xmlns:a16="http://schemas.microsoft.com/office/drawing/2014/main" id="{98246E45-031A-4786-ACF4-D927C7E9CB6C}"/>
               </a:ext>
             </a:extLst>
           </p:cNvPr>
@@ -5260,185 +5445,8 @@
         </p:nvSpPr>
         <p:spPr>
           <a:xfrm>
-            <a:off x="6908365" y="1919252"/>
-            <a:ext cx="340999" cy="217887"/>
-          </a:xfrm>
-          <a:prstGeom prst="rect">
-            <a:avLst/>
-          </a:prstGeom>
-        </p:spPr>
-        <p:style>
-          <a:lnRef idx="2">
-            <a:schemeClr val="accent1">
-              <a:shade val="50000"/>
-            </a:schemeClr>
-          </a:lnRef>
-          <a:fillRef idx="1">
-            <a:schemeClr val="accent1"/>
-          </a:fillRef>
-          <a:effectRef idx="0">
-            <a:schemeClr val="accent1"/>
-          </a:effectRef>
-          <a:fontRef idx="minor">
-            <a:schemeClr val="lt1"/>
-          </a:fontRef>
-        </p:style>
-        <p:txBody>
-          <a:bodyPr rtlCol="0" anchor="ctr"/>
-          <a:lstStyle/>
-          <a:p>
-            <a:pPr algn="ctr"/>
-            <a:endParaRPr lang="fr-FR"/>
-          </a:p>
-        </p:txBody>
-      </p:sp>
-      <p:cxnSp>
-        <p:nvCxnSpPr>
-          <p:cNvPr id="35" name="Connecteur : en angle 34">
-            <a:extLst>
-              <a:ext uri="{FF2B5EF4-FFF2-40B4-BE49-F238E27FC236}">
-                <a16:creationId xmlns:a16="http://schemas.microsoft.com/office/drawing/2014/main" id="{E8634128-453D-4B9E-A1BE-AA9C0F17215D}"/>
-              </a:ext>
-            </a:extLst>
-          </p:cNvPr>
-          <p:cNvCxnSpPr>
-            <a:cxnSpLocks/>
-            <a:stCxn id="30" idx="2"/>
-            <a:endCxn id="30" idx="3"/>
-          </p:cNvCxnSpPr>
-          <p:nvPr/>
-        </p:nvCxnSpPr>
-        <p:spPr>
-          <a:xfrm rot="5400000" flipH="1" flipV="1">
-            <a:off x="7109642" y="1997418"/>
-            <a:ext cx="108943" cy="170499"/>
-          </a:xfrm>
-          <a:prstGeom prst="bentConnector4">
-            <a:avLst>
-              <a:gd name="adj1" fmla="val -209835"/>
-              <a:gd name="adj2" fmla="val 234077"/>
-            </a:avLst>
-          </a:prstGeom>
-          <a:ln w="28575">
-            <a:headEnd type="arrow" w="med" len="med"/>
-            <a:tailEnd type="none" w="med" len="med"/>
-          </a:ln>
-        </p:spPr>
-        <p:style>
-          <a:lnRef idx="1">
-            <a:schemeClr val="accent1"/>
-          </a:lnRef>
-          <a:fillRef idx="0">
-            <a:schemeClr val="accent1"/>
-          </a:fillRef>
-          <a:effectRef idx="0">
-            <a:schemeClr val="accent1"/>
-          </a:effectRef>
-          <a:fontRef idx="minor">
-            <a:schemeClr val="tx1"/>
-          </a:fontRef>
-        </p:style>
-      </p:cxnSp>
-      <p:sp>
-        <p:nvSpPr>
-          <p:cNvPr id="36" name="ZoneTexte 35">
-            <a:extLst>
-              <a:ext uri="{FF2B5EF4-FFF2-40B4-BE49-F238E27FC236}">
-                <a16:creationId xmlns:a16="http://schemas.microsoft.com/office/drawing/2014/main" id="{6FC2082B-E275-4667-BE96-11DA28C72440}"/>
-              </a:ext>
-            </a:extLst>
-          </p:cNvPr>
-          <p:cNvSpPr txBox="1"/>
-          <p:nvPr/>
-        </p:nvSpPr>
-        <p:spPr>
-          <a:xfrm>
-            <a:off x="6559778" y="2130127"/>
-            <a:ext cx="607145" cy="338554"/>
-          </a:xfrm>
-          <a:prstGeom prst="rect">
-            <a:avLst/>
-          </a:prstGeom>
-          <a:noFill/>
-        </p:spPr>
-        <p:txBody>
-          <a:bodyPr wrap="square" rtlCol="0">
-            <a:spAutoFit/>
-          </a:bodyPr>
-          <a:lstStyle/>
-          <a:p>
-            <a:r>
-              <a:rPr lang="en-US" sz="1600" noProof="1"/>
-              <a:t>0..*</a:t>
-            </a:r>
-          </a:p>
-        </p:txBody>
-      </p:sp>
-      <p:sp>
-        <p:nvSpPr>
-          <p:cNvPr id="37" name="ZoneTexte 36">
-            <a:extLst>
-              <a:ext uri="{FF2B5EF4-FFF2-40B4-BE49-F238E27FC236}">
-                <a16:creationId xmlns:a16="http://schemas.microsoft.com/office/drawing/2014/main" id="{0221B08F-79D1-4CDA-957A-4D91B4E1FE2C}"/>
-              </a:ext>
-            </a:extLst>
-          </p:cNvPr>
-          <p:cNvSpPr txBox="1"/>
-          <p:nvPr/>
-        </p:nvSpPr>
-        <p:spPr>
-          <a:xfrm>
-            <a:off x="7557252" y="1989998"/>
-            <a:ext cx="3757993" cy="369332"/>
-          </a:xfrm>
-          <a:prstGeom prst="rect">
-            <a:avLst/>
-          </a:prstGeom>
-          <a:noFill/>
-        </p:spPr>
-        <p:txBody>
-          <a:bodyPr wrap="square" rtlCol="0">
-            <a:spAutoFit/>
-          </a:bodyPr>
-          <a:lstStyle/>
-          <a:p>
-            <a:r>
-              <a:rPr lang="en-US" noProof="1"/>
-              <a:t>relatedArtifact (</a:t>
-            </a:r>
-            <a:r>
-              <a:rPr lang="en-US" i="1" noProof="1">
-                <a:solidFill>
-                  <a:schemeClr val="accent6">
-                    <a:lumMod val="75000"/>
-                  </a:schemeClr>
-                </a:solidFill>
-              </a:rPr>
-              <a:t>is replaced by</a:t>
-            </a:r>
-            <a:r>
-              <a:rPr lang="en-US" noProof="1"/>
-              <a:t>)</a:t>
-            </a:r>
-          </a:p>
-        </p:txBody>
-      </p:sp>
-      <p:sp>
-        <p:nvSpPr>
-          <p:cNvPr id="11" name="Rectangle 10">
-            <a:extLst>
-              <a:ext uri="{FF2B5EF4-FFF2-40B4-BE49-F238E27FC236}">
-                <a16:creationId xmlns:a16="http://schemas.microsoft.com/office/drawing/2014/main" id="{E2B1908B-CC45-41BD-BE20-7F25C0BD8D17}"/>
-              </a:ext>
-            </a:extLst>
-          </p:cNvPr>
-          <p:cNvSpPr/>
-          <p:nvPr/>
-        </p:nvSpPr>
-        <p:spPr>
-          <a:xfrm>
-            <a:off x="4688380" y="1019944"/>
-            <a:ext cx="2593911" cy="1140542"/>
+            <a:off x="189854" y="2089752"/>
+            <a:ext cx="2627866" cy="1140542"/>
           </a:xfrm>
           <a:prstGeom prst="rect">
             <a:avLst/>
@@ -5506,7 +5514,7 @@
                   <a:srgbClr val="FFFF00"/>
                 </a:solidFill>
               </a:rPr>
-              <a:t>LabServiceDefinition</a:t>
+              <a:t>BillingCodeAndRule</a:t>
             </a:r>
           </a:p>
           <a:p>
@@ -5525,17 +5533,304 @@
                   <a:srgbClr val="FFFF00"/>
                 </a:solidFill>
               </a:rPr>
-              <a:t>PlanDefinition</a:t>
-            </a:r>
-          </a:p>
-        </p:txBody>
-      </p:sp>
-      <p:sp>
-        <p:nvSpPr>
-          <p:cNvPr id="38" name="Rectangle 37">
-            <a:extLst>
-              <a:ext uri="{FF2B5EF4-FFF2-40B4-BE49-F238E27FC236}">
-                <a16:creationId xmlns:a16="http://schemas.microsoft.com/office/drawing/2014/main" id="{84729A3E-A76D-4D5C-845E-6B5227D6B57E}"/>
+              <a:t>ChargeItemDefinition</a:t>
+            </a:r>
+          </a:p>
+        </p:txBody>
+      </p:sp>
+      <p:cxnSp>
+        <p:nvCxnSpPr>
+          <p:cNvPr id="42" name="Connecteur : en angle 41">
+            <a:extLst>
+              <a:ext uri="{FF2B5EF4-FFF2-40B4-BE49-F238E27FC236}">
+                <a16:creationId xmlns:a16="http://schemas.microsoft.com/office/drawing/2014/main" id="{7CB04F81-F845-4409-8A16-0150F3ABCA14}"/>
+              </a:ext>
+            </a:extLst>
+          </p:cNvPr>
+          <p:cNvCxnSpPr>
+            <a:cxnSpLocks/>
+            <a:stCxn id="11" idx="1"/>
+            <a:endCxn id="41" idx="0"/>
+          </p:cNvCxnSpPr>
+          <p:nvPr/>
+        </p:nvCxnSpPr>
+        <p:spPr>
+          <a:xfrm rot="10800000" flipV="1">
+            <a:off x="1503788" y="1590214"/>
+            <a:ext cx="3184593" cy="499537"/>
+          </a:xfrm>
+          <a:prstGeom prst="bentConnector2">
+            <a:avLst/>
+          </a:prstGeom>
+          <a:ln w="28575">
+            <a:headEnd type="none" w="med" len="med"/>
+            <a:tailEnd type="arrow" w="med" len="med"/>
+          </a:ln>
+        </p:spPr>
+        <p:style>
+          <a:lnRef idx="1">
+            <a:schemeClr val="accent1"/>
+          </a:lnRef>
+          <a:fillRef idx="0">
+            <a:schemeClr val="accent1"/>
+          </a:fillRef>
+          <a:effectRef idx="0">
+            <a:schemeClr val="accent1"/>
+          </a:effectRef>
+          <a:fontRef idx="minor">
+            <a:schemeClr val="tx1"/>
+          </a:fontRef>
+        </p:style>
+      </p:cxnSp>
+      <p:sp>
+        <p:nvSpPr>
+          <p:cNvPr id="47" name="ZoneTexte 46">
+            <a:extLst>
+              <a:ext uri="{FF2B5EF4-FFF2-40B4-BE49-F238E27FC236}">
+                <a16:creationId xmlns:a16="http://schemas.microsoft.com/office/drawing/2014/main" id="{7EBC759F-3EC1-4AEE-B495-9524A5FA0F8C}"/>
+              </a:ext>
+            </a:extLst>
+          </p:cNvPr>
+          <p:cNvSpPr txBox="1"/>
+          <p:nvPr/>
+        </p:nvSpPr>
+        <p:spPr>
+          <a:xfrm>
+            <a:off x="1556018" y="1725868"/>
+            <a:ext cx="607145" cy="338554"/>
+          </a:xfrm>
+          <a:prstGeom prst="rect">
+            <a:avLst/>
+          </a:prstGeom>
+          <a:noFill/>
+        </p:spPr>
+        <p:txBody>
+          <a:bodyPr wrap="square" rtlCol="0">
+            <a:spAutoFit/>
+          </a:bodyPr>
+          <a:lstStyle/>
+          <a:p>
+            <a:r>
+              <a:rPr lang="en-US" sz="1600" noProof="1"/>
+              <a:t>0..*</a:t>
+            </a:r>
+          </a:p>
+        </p:txBody>
+      </p:sp>
+      <p:sp>
+        <p:nvSpPr>
+          <p:cNvPr id="48" name="ZoneTexte 47">
+            <a:extLst>
+              <a:ext uri="{FF2B5EF4-FFF2-40B4-BE49-F238E27FC236}">
+                <a16:creationId xmlns:a16="http://schemas.microsoft.com/office/drawing/2014/main" id="{6B1EB918-EDEA-46FE-BFD2-7B8AC4B29986}"/>
+              </a:ext>
+            </a:extLst>
+          </p:cNvPr>
+          <p:cNvSpPr txBox="1"/>
+          <p:nvPr/>
+        </p:nvSpPr>
+        <p:spPr>
+          <a:xfrm>
+            <a:off x="3289961" y="1286559"/>
+            <a:ext cx="1443487" cy="369332"/>
+          </a:xfrm>
+          <a:prstGeom prst="rect">
+            <a:avLst/>
+          </a:prstGeom>
+          <a:noFill/>
+        </p:spPr>
+        <p:txBody>
+          <a:bodyPr wrap="square" rtlCol="0">
+            <a:spAutoFit/>
+          </a:bodyPr>
+          <a:lstStyle/>
+          <a:p>
+            <a:r>
+              <a:rPr lang="en-US" noProof="1"/>
+              <a:t>serviceBilling</a:t>
+            </a:r>
+          </a:p>
+        </p:txBody>
+      </p:sp>
+      <p:sp>
+        <p:nvSpPr>
+          <p:cNvPr id="49" name="ZoneTexte 48">
+            <a:extLst>
+              <a:ext uri="{FF2B5EF4-FFF2-40B4-BE49-F238E27FC236}">
+                <a16:creationId xmlns:a16="http://schemas.microsoft.com/office/drawing/2014/main" id="{34BC439E-46D1-4D3A-A747-099A225EED85}"/>
+              </a:ext>
+            </a:extLst>
+          </p:cNvPr>
+          <p:cNvSpPr txBox="1"/>
+          <p:nvPr/>
+        </p:nvSpPr>
+        <p:spPr>
+          <a:xfrm>
+            <a:off x="-183392" y="1357828"/>
+            <a:ext cx="1627978" cy="646331"/>
+          </a:xfrm>
+          <a:prstGeom prst="rect">
+            <a:avLst/>
+          </a:prstGeom>
+          <a:noFill/>
+        </p:spPr>
+        <p:txBody>
+          <a:bodyPr wrap="square" rtlCol="0">
+            <a:spAutoFit/>
+          </a:bodyPr>
+          <a:lstStyle/>
+          <a:p>
+            <a:pPr algn="r"/>
+            <a:r>
+              <a:rPr lang="en-US" i="1" noProof="1">
+                <a:solidFill>
+                  <a:schemeClr val="accent1">
+                    <a:lumMod val="60000"/>
+                    <a:lumOff val="40000"/>
+                  </a:schemeClr>
+                </a:solidFill>
+              </a:rPr>
+              <a:t>a billing code and its rules</a:t>
+            </a:r>
+          </a:p>
+        </p:txBody>
+      </p:sp>
+      <p:sp>
+        <p:nvSpPr>
+          <p:cNvPr id="50" name="ZoneTexte 49">
+            <a:extLst>
+              <a:ext uri="{FF2B5EF4-FFF2-40B4-BE49-F238E27FC236}">
+                <a16:creationId xmlns:a16="http://schemas.microsoft.com/office/drawing/2014/main" id="{8B1414DC-932C-4FB2-A682-250462EEBE39}"/>
+              </a:ext>
+            </a:extLst>
+          </p:cNvPr>
+          <p:cNvSpPr txBox="1"/>
+          <p:nvPr/>
+        </p:nvSpPr>
+        <p:spPr>
+          <a:xfrm>
+            <a:off x="7248233" y="6490589"/>
+            <a:ext cx="3938309" cy="369332"/>
+          </a:xfrm>
+          <a:prstGeom prst="rect">
+            <a:avLst/>
+          </a:prstGeom>
+          <a:noFill/>
+        </p:spPr>
+        <p:txBody>
+          <a:bodyPr wrap="square" rtlCol="0">
+            <a:spAutoFit/>
+          </a:bodyPr>
+          <a:lstStyle>
+            <a:defPPr>
+              <a:defRPr lang="fr-FR"/>
+            </a:defPPr>
+            <a:lvl1pPr>
+              <a:defRPr>
+                <a:solidFill>
+                  <a:schemeClr val="accent1">
+                    <a:lumMod val="60000"/>
+                    <a:lumOff val="40000"/>
+                  </a:schemeClr>
+                </a:solidFill>
+              </a:defRPr>
+            </a:lvl1pPr>
+          </a:lstStyle>
+          <a:p>
+            <a:pPr algn="ctr"/>
+            <a:r>
+              <a:rPr lang="en-US" i="1" noProof="1"/>
+              <a:t>valid|normal|abnormal|critical values</a:t>
+            </a:r>
+          </a:p>
+        </p:txBody>
+      </p:sp>
+      <p:cxnSp>
+        <p:nvCxnSpPr>
+          <p:cNvPr id="59" name="Connecteur : en angle 58">
+            <a:extLst>
+              <a:ext uri="{FF2B5EF4-FFF2-40B4-BE49-F238E27FC236}">
+                <a16:creationId xmlns:a16="http://schemas.microsoft.com/office/drawing/2014/main" id="{CEC98B57-A84A-4965-8F1C-9AD5C1F66F68}"/>
+              </a:ext>
+            </a:extLst>
+          </p:cNvPr>
+          <p:cNvCxnSpPr>
+            <a:cxnSpLocks/>
+            <a:endCxn id="8" idx="3"/>
+          </p:cNvCxnSpPr>
+          <p:nvPr/>
+        </p:nvCxnSpPr>
+        <p:spPr>
+          <a:xfrm flipH="1" flipV="1">
+            <a:off x="7255499" y="1117432"/>
+            <a:ext cx="20166" cy="234943"/>
+          </a:xfrm>
+          <a:prstGeom prst="bentConnector3">
+            <a:avLst>
+              <a:gd name="adj1" fmla="val -1133591"/>
+            </a:avLst>
+          </a:prstGeom>
+          <a:ln w="28575">
+            <a:headEnd type="arrow" w="med" len="med"/>
+            <a:tailEnd type="none" w="med" len="med"/>
+          </a:ln>
+        </p:spPr>
+        <p:style>
+          <a:lnRef idx="1">
+            <a:schemeClr val="accent1"/>
+          </a:lnRef>
+          <a:fillRef idx="0">
+            <a:schemeClr val="accent1"/>
+          </a:fillRef>
+          <a:effectRef idx="0">
+            <a:schemeClr val="accent1"/>
+          </a:effectRef>
+          <a:fontRef idx="minor">
+            <a:schemeClr val="tx1"/>
+          </a:fontRef>
+        </p:style>
+      </p:cxnSp>
+      <p:sp>
+        <p:nvSpPr>
+          <p:cNvPr id="61" name="ZoneTexte 60">
+            <a:extLst>
+              <a:ext uri="{FF2B5EF4-FFF2-40B4-BE49-F238E27FC236}">
+                <a16:creationId xmlns:a16="http://schemas.microsoft.com/office/drawing/2014/main" id="{F15FD08A-EE01-41B9-A74C-D190D9D0CE08}"/>
+              </a:ext>
+            </a:extLst>
+          </p:cNvPr>
+          <p:cNvSpPr txBox="1"/>
+          <p:nvPr/>
+        </p:nvSpPr>
+        <p:spPr>
+          <a:xfrm>
+            <a:off x="7287980" y="1323583"/>
+            <a:ext cx="607145" cy="338554"/>
+          </a:xfrm>
+          <a:prstGeom prst="rect">
+            <a:avLst/>
+          </a:prstGeom>
+          <a:noFill/>
+        </p:spPr>
+        <p:txBody>
+          <a:bodyPr wrap="square" rtlCol="0">
+            <a:spAutoFit/>
+          </a:bodyPr>
+          <a:lstStyle/>
+          <a:p>
+            <a:r>
+              <a:rPr lang="en-US" sz="1600" noProof="1"/>
+              <a:t>0..*</a:t>
+            </a:r>
+          </a:p>
+        </p:txBody>
+      </p:sp>
+      <p:sp>
+        <p:nvSpPr>
+          <p:cNvPr id="6" name="Rectangle 5">
+            <a:extLst>
+              <a:ext uri="{FF2B5EF4-FFF2-40B4-BE49-F238E27FC236}">
+                <a16:creationId xmlns:a16="http://schemas.microsoft.com/office/drawing/2014/main" id="{1C6DDBC5-A792-48D7-9DEB-B008187D51FB}"/>
               </a:ext>
             </a:extLst>
           </p:cNvPr>
@@ -5544,8 +5839,369 @@
         </p:nvSpPr>
         <p:spPr>
           <a:xfrm>
-            <a:off x="8338775" y="6013917"/>
-            <a:ext cx="1667712" cy="476672"/>
+            <a:off x="7571885" y="1063556"/>
+            <a:ext cx="2496902" cy="369332"/>
+          </a:xfrm>
+          <a:prstGeom prst="rect">
+            <a:avLst/>
+          </a:prstGeom>
+        </p:spPr>
+        <p:txBody>
+          <a:bodyPr wrap="none">
+            <a:spAutoFit/>
+          </a:bodyPr>
+          <a:lstStyle/>
+          <a:p>
+            <a:r>
+              <a:rPr lang="en-US" noProof="1"/>
+              <a:t>relatedArtifact (</a:t>
+            </a:r>
+            <a:r>
+              <a:rPr lang="en-US" i="1" noProof="1">
+                <a:solidFill>
+                  <a:schemeClr val="accent6">
+                    <a:lumMod val="75000"/>
+                  </a:schemeClr>
+                </a:solidFill>
+              </a:rPr>
+              <a:t>Includes</a:t>
+            </a:r>
+            <a:r>
+              <a:rPr lang="en-US" noProof="1"/>
+              <a:t>)</a:t>
+            </a:r>
+          </a:p>
+        </p:txBody>
+      </p:sp>
+      <p:sp>
+        <p:nvSpPr>
+          <p:cNvPr id="53" name="Rectangle 52">
+            <a:extLst>
+              <a:ext uri="{FF2B5EF4-FFF2-40B4-BE49-F238E27FC236}">
+                <a16:creationId xmlns:a16="http://schemas.microsoft.com/office/drawing/2014/main" id="{F537AED2-9E97-485C-A84E-51BF2306A00D}"/>
+              </a:ext>
+            </a:extLst>
+          </p:cNvPr>
+          <p:cNvSpPr/>
+          <p:nvPr/>
+        </p:nvSpPr>
+        <p:spPr>
+          <a:xfrm>
+            <a:off x="7112003" y="1605145"/>
+            <a:ext cx="143498" cy="164249"/>
+          </a:xfrm>
+          <a:prstGeom prst="rect">
+            <a:avLst/>
+          </a:prstGeom>
+        </p:spPr>
+        <p:style>
+          <a:lnRef idx="2">
+            <a:schemeClr val="accent1">
+              <a:shade val="50000"/>
+            </a:schemeClr>
+          </a:lnRef>
+          <a:fillRef idx="1">
+            <a:schemeClr val="accent1"/>
+          </a:fillRef>
+          <a:effectRef idx="0">
+            <a:schemeClr val="accent1"/>
+          </a:effectRef>
+          <a:fontRef idx="minor">
+            <a:schemeClr val="lt1"/>
+          </a:fontRef>
+        </p:style>
+        <p:txBody>
+          <a:bodyPr rtlCol="0" anchor="ctr"/>
+          <a:lstStyle/>
+          <a:p>
+            <a:pPr algn="ctr"/>
+            <a:endParaRPr lang="fr-FR"/>
+          </a:p>
+        </p:txBody>
+      </p:sp>
+      <p:sp>
+        <p:nvSpPr>
+          <p:cNvPr id="62" name="Rectangle 61">
+            <a:extLst>
+              <a:ext uri="{FF2B5EF4-FFF2-40B4-BE49-F238E27FC236}">
+                <a16:creationId xmlns:a16="http://schemas.microsoft.com/office/drawing/2014/main" id="{CC06C13B-AAED-42D3-AC8E-E9010DD2A1F9}"/>
+              </a:ext>
+            </a:extLst>
+          </p:cNvPr>
+          <p:cNvSpPr/>
+          <p:nvPr/>
+        </p:nvSpPr>
+        <p:spPr>
+          <a:xfrm>
+            <a:off x="6928358" y="1808450"/>
+            <a:ext cx="340999" cy="195582"/>
+          </a:xfrm>
+          <a:prstGeom prst="rect">
+            <a:avLst/>
+          </a:prstGeom>
+        </p:spPr>
+        <p:style>
+          <a:lnRef idx="2">
+            <a:schemeClr val="accent1">
+              <a:shade val="50000"/>
+            </a:schemeClr>
+          </a:lnRef>
+          <a:fillRef idx="1">
+            <a:schemeClr val="accent1"/>
+          </a:fillRef>
+          <a:effectRef idx="0">
+            <a:schemeClr val="accent1"/>
+          </a:effectRef>
+          <a:fontRef idx="minor">
+            <a:schemeClr val="lt1"/>
+          </a:fontRef>
+        </p:style>
+        <p:txBody>
+          <a:bodyPr rtlCol="0" anchor="ctr"/>
+          <a:lstStyle/>
+          <a:p>
+            <a:pPr algn="ctr"/>
+            <a:endParaRPr lang="fr-FR"/>
+          </a:p>
+        </p:txBody>
+      </p:sp>
+      <p:cxnSp>
+        <p:nvCxnSpPr>
+          <p:cNvPr id="64" name="Connecteur : en angle 63">
+            <a:extLst>
+              <a:ext uri="{FF2B5EF4-FFF2-40B4-BE49-F238E27FC236}">
+                <a16:creationId xmlns:a16="http://schemas.microsoft.com/office/drawing/2014/main" id="{3335D043-C903-4BE8-AD2D-90AB3E5DD599}"/>
+              </a:ext>
+            </a:extLst>
+          </p:cNvPr>
+          <p:cNvCxnSpPr>
+            <a:cxnSpLocks/>
+            <a:stCxn id="62" idx="3"/>
+            <a:endCxn id="53" idx="3"/>
+          </p:cNvCxnSpPr>
+          <p:nvPr/>
+        </p:nvCxnSpPr>
+        <p:spPr>
+          <a:xfrm flipH="1" flipV="1">
+            <a:off x="7255501" y="1687270"/>
+            <a:ext cx="13856" cy="218971"/>
+          </a:xfrm>
+          <a:prstGeom prst="bentConnector3">
+            <a:avLst>
+              <a:gd name="adj1" fmla="val -1649827"/>
+            </a:avLst>
+          </a:prstGeom>
+          <a:ln w="28575">
+            <a:headEnd type="arrow" w="med" len="med"/>
+            <a:tailEnd type="none" w="med" len="med"/>
+          </a:ln>
+        </p:spPr>
+        <p:style>
+          <a:lnRef idx="1">
+            <a:schemeClr val="accent1"/>
+          </a:lnRef>
+          <a:fillRef idx="0">
+            <a:schemeClr val="accent1"/>
+          </a:fillRef>
+          <a:effectRef idx="0">
+            <a:schemeClr val="accent1"/>
+          </a:effectRef>
+          <a:fontRef idx="minor">
+            <a:schemeClr val="tx1"/>
+          </a:fontRef>
+        </p:style>
+      </p:cxnSp>
+      <p:sp>
+        <p:nvSpPr>
+          <p:cNvPr id="65" name="ZoneTexte 64">
+            <a:extLst>
+              <a:ext uri="{FF2B5EF4-FFF2-40B4-BE49-F238E27FC236}">
+                <a16:creationId xmlns:a16="http://schemas.microsoft.com/office/drawing/2014/main" id="{A0A89A95-A588-46F5-BA0F-55DBADAB29F5}"/>
+              </a:ext>
+            </a:extLst>
+          </p:cNvPr>
+          <p:cNvSpPr txBox="1"/>
+          <p:nvPr/>
+        </p:nvSpPr>
+        <p:spPr>
+          <a:xfrm>
+            <a:off x="7287982" y="1893421"/>
+            <a:ext cx="607145" cy="338554"/>
+          </a:xfrm>
+          <a:prstGeom prst="rect">
+            <a:avLst/>
+          </a:prstGeom>
+          <a:noFill/>
+        </p:spPr>
+        <p:txBody>
+          <a:bodyPr wrap="square" rtlCol="0">
+            <a:spAutoFit/>
+          </a:bodyPr>
+          <a:lstStyle/>
+          <a:p>
+            <a:r>
+              <a:rPr lang="en-US" sz="1600" noProof="1"/>
+              <a:t>0..*</a:t>
+            </a:r>
+          </a:p>
+        </p:txBody>
+      </p:sp>
+      <p:sp>
+        <p:nvSpPr>
+          <p:cNvPr id="66" name="Rectangle 65">
+            <a:extLst>
+              <a:ext uri="{FF2B5EF4-FFF2-40B4-BE49-F238E27FC236}">
+                <a16:creationId xmlns:a16="http://schemas.microsoft.com/office/drawing/2014/main" id="{A75549AC-A1E5-42FF-B36C-5EA2320DE11D}"/>
+              </a:ext>
+            </a:extLst>
+          </p:cNvPr>
+          <p:cNvSpPr/>
+          <p:nvPr/>
+        </p:nvSpPr>
+        <p:spPr>
+          <a:xfrm>
+            <a:off x="7571887" y="1633394"/>
+            <a:ext cx="2956322" cy="369332"/>
+          </a:xfrm>
+          <a:prstGeom prst="rect">
+            <a:avLst/>
+          </a:prstGeom>
+        </p:spPr>
+        <p:txBody>
+          <a:bodyPr wrap="none">
+            <a:spAutoFit/>
+          </a:bodyPr>
+          <a:lstStyle/>
+          <a:p>
+            <a:r>
+              <a:rPr lang="en-US" noProof="1"/>
+              <a:t>relatedArtifact (</a:t>
+            </a:r>
+            <a:r>
+              <a:rPr lang="en-US" i="1" noProof="1">
+                <a:solidFill>
+                  <a:schemeClr val="accent6">
+                    <a:lumMod val="75000"/>
+                  </a:schemeClr>
+                </a:solidFill>
+              </a:rPr>
+              <a:t>IsReplacedBy</a:t>
+            </a:r>
+            <a:r>
+              <a:rPr lang="en-US" noProof="1"/>
+              <a:t>)</a:t>
+            </a:r>
+          </a:p>
+        </p:txBody>
+      </p:sp>
+      <p:sp>
+        <p:nvSpPr>
+          <p:cNvPr id="13" name="Rectangle 12">
+            <a:extLst>
+              <a:ext uri="{FF2B5EF4-FFF2-40B4-BE49-F238E27FC236}">
+                <a16:creationId xmlns:a16="http://schemas.microsoft.com/office/drawing/2014/main" id="{1C72EAEF-6D83-49DD-98E1-F0B22E4F5A26}"/>
+              </a:ext>
+            </a:extLst>
+          </p:cNvPr>
+          <p:cNvSpPr/>
+          <p:nvPr/>
+        </p:nvSpPr>
+        <p:spPr>
+          <a:xfrm>
+            <a:off x="4701632" y="1918695"/>
+            <a:ext cx="283614" cy="235165"/>
+          </a:xfrm>
+          <a:prstGeom prst="rect">
+            <a:avLst/>
+          </a:prstGeom>
+        </p:spPr>
+        <p:style>
+          <a:lnRef idx="2">
+            <a:schemeClr val="accent1">
+              <a:shade val="50000"/>
+            </a:schemeClr>
+          </a:lnRef>
+          <a:fillRef idx="1">
+            <a:schemeClr val="accent1"/>
+          </a:fillRef>
+          <a:effectRef idx="0">
+            <a:schemeClr val="accent1"/>
+          </a:effectRef>
+          <a:fontRef idx="minor">
+            <a:schemeClr val="lt1"/>
+          </a:fontRef>
+        </p:style>
+        <p:txBody>
+          <a:bodyPr rtlCol="0" anchor="ctr"/>
+          <a:lstStyle/>
+          <a:p>
+            <a:pPr algn="ctr"/>
+            <a:endParaRPr lang="fr-FR"/>
+          </a:p>
+        </p:txBody>
+      </p:sp>
+      <p:sp>
+        <p:nvSpPr>
+          <p:cNvPr id="67" name="Rectangle 66">
+            <a:extLst>
+              <a:ext uri="{FF2B5EF4-FFF2-40B4-BE49-F238E27FC236}">
+                <a16:creationId xmlns:a16="http://schemas.microsoft.com/office/drawing/2014/main" id="{4E2B7AF2-F6C6-4086-A3C5-6ECD0A900716}"/>
+              </a:ext>
+            </a:extLst>
+          </p:cNvPr>
+          <p:cNvSpPr/>
+          <p:nvPr/>
+        </p:nvSpPr>
+        <p:spPr>
+          <a:xfrm>
+            <a:off x="3148351" y="4945929"/>
+            <a:ext cx="283614" cy="235165"/>
+          </a:xfrm>
+          <a:prstGeom prst="rect">
+            <a:avLst/>
+          </a:prstGeom>
+        </p:spPr>
+        <p:style>
+          <a:lnRef idx="2">
+            <a:schemeClr val="accent1">
+              <a:shade val="50000"/>
+            </a:schemeClr>
+          </a:lnRef>
+          <a:fillRef idx="1">
+            <a:schemeClr val="accent1"/>
+          </a:fillRef>
+          <a:effectRef idx="0">
+            <a:schemeClr val="accent1"/>
+          </a:effectRef>
+          <a:fontRef idx="minor">
+            <a:schemeClr val="lt1"/>
+          </a:fontRef>
+        </p:style>
+        <p:txBody>
+          <a:bodyPr rtlCol="0" anchor="ctr"/>
+          <a:lstStyle/>
+          <a:p>
+            <a:pPr algn="ctr"/>
+            <a:endParaRPr lang="fr-FR"/>
+          </a:p>
+        </p:txBody>
+      </p:sp>
+      <p:sp>
+        <p:nvSpPr>
+          <p:cNvPr id="56" name="Rectangle 55">
+            <a:extLst>
+              <a:ext uri="{FF2B5EF4-FFF2-40B4-BE49-F238E27FC236}">
+                <a16:creationId xmlns:a16="http://schemas.microsoft.com/office/drawing/2014/main" id="{F6F11366-8458-4112-A323-141BA159FFFC}"/>
+              </a:ext>
+            </a:extLst>
+          </p:cNvPr>
+          <p:cNvSpPr/>
+          <p:nvPr/>
+        </p:nvSpPr>
+        <p:spPr>
+          <a:xfrm>
+            <a:off x="737087" y="4932679"/>
+            <a:ext cx="2887484" cy="1142774"/>
           </a:xfrm>
           <a:prstGeom prst="rect">
             <a:avLst/>
@@ -5613,175 +6269,36 @@
                   <a:srgbClr val="FFFF00"/>
                 </a:solidFill>
               </a:rPr>
-              <a:t>ValueSet</a:t>
-            </a:r>
-          </a:p>
-        </p:txBody>
-      </p:sp>
-      <p:cxnSp>
-        <p:nvCxnSpPr>
-          <p:cNvPr id="39" name="Connecteur : en angle 38">
-            <a:extLst>
-              <a:ext uri="{FF2B5EF4-FFF2-40B4-BE49-F238E27FC236}">
-                <a16:creationId xmlns:a16="http://schemas.microsoft.com/office/drawing/2014/main" id="{8C9A6475-6E13-4D17-99C8-139A747BD801}"/>
-              </a:ext>
-            </a:extLst>
-          </p:cNvPr>
-          <p:cNvCxnSpPr>
-            <a:cxnSpLocks/>
-            <a:stCxn id="54" idx="2"/>
-            <a:endCxn id="38" idx="1"/>
-          </p:cNvCxnSpPr>
-          <p:nvPr/>
-        </p:nvCxnSpPr>
-        <p:spPr>
-          <a:xfrm rot="16200000" flipH="1">
-            <a:off x="7057495" y="4970973"/>
-            <a:ext cx="210874" cy="2351686"/>
-          </a:xfrm>
-          <a:prstGeom prst="bentConnector2">
-            <a:avLst/>
-          </a:prstGeom>
-          <a:ln w="28575">
-            <a:headEnd type="none" w="med" len="med"/>
-            <a:tailEnd type="arrow" w="med" len="med"/>
-          </a:ln>
-        </p:spPr>
-        <p:style>
-          <a:lnRef idx="1">
-            <a:schemeClr val="accent1"/>
-          </a:lnRef>
-          <a:fillRef idx="0">
-            <a:schemeClr val="accent1"/>
-          </a:fillRef>
-          <a:effectRef idx="0">
-            <a:schemeClr val="accent1"/>
-          </a:effectRef>
-          <a:fontRef idx="minor">
-            <a:schemeClr val="tx1"/>
-          </a:fontRef>
-        </p:style>
-      </p:cxnSp>
-      <p:cxnSp>
-        <p:nvCxnSpPr>
-          <p:cNvPr id="40" name="Connecteur : en angle 39">
-            <a:extLst>
-              <a:ext uri="{FF2B5EF4-FFF2-40B4-BE49-F238E27FC236}">
-                <a16:creationId xmlns:a16="http://schemas.microsoft.com/office/drawing/2014/main" id="{444B2695-C708-469B-B42D-479F8382004C}"/>
-              </a:ext>
-            </a:extLst>
-          </p:cNvPr>
-          <p:cNvCxnSpPr>
-            <a:cxnSpLocks/>
-            <a:stCxn id="55" idx="2"/>
-            <a:endCxn id="38" idx="3"/>
-          </p:cNvCxnSpPr>
-          <p:nvPr/>
-        </p:nvCxnSpPr>
-        <p:spPr>
-          <a:xfrm rot="5400000">
-            <a:off x="9900128" y="5710423"/>
-            <a:ext cx="648190" cy="435471"/>
-          </a:xfrm>
-          <a:prstGeom prst="bentConnector2">
-            <a:avLst/>
-          </a:prstGeom>
-          <a:ln w="28575">
-            <a:headEnd type="none" w="med" len="med"/>
-            <a:tailEnd type="arrow" w="med" len="med"/>
-          </a:ln>
-        </p:spPr>
-        <p:style>
-          <a:lnRef idx="1">
-            <a:schemeClr val="accent1"/>
-          </a:lnRef>
-          <a:fillRef idx="0">
-            <a:schemeClr val="accent1"/>
-          </a:fillRef>
-          <a:effectRef idx="0">
-            <a:schemeClr val="accent1"/>
-          </a:effectRef>
-          <a:fontRef idx="minor">
-            <a:schemeClr val="tx1"/>
-          </a:fontRef>
-        </p:style>
-      </p:cxnSp>
-      <p:sp>
-        <p:nvSpPr>
-          <p:cNvPr id="44" name="ZoneTexte 43">
-            <a:extLst>
-              <a:ext uri="{FF2B5EF4-FFF2-40B4-BE49-F238E27FC236}">
-                <a16:creationId xmlns:a16="http://schemas.microsoft.com/office/drawing/2014/main" id="{ABDD23CA-E87E-4D3B-BBE6-6BFF35D20C07}"/>
-              </a:ext>
-            </a:extLst>
-          </p:cNvPr>
-          <p:cNvSpPr txBox="1"/>
-          <p:nvPr/>
-        </p:nvSpPr>
-        <p:spPr>
-          <a:xfrm>
-            <a:off x="7787304" y="6202144"/>
-            <a:ext cx="607145" cy="338554"/>
-          </a:xfrm>
-          <a:prstGeom prst="rect">
-            <a:avLst/>
-          </a:prstGeom>
-          <a:noFill/>
-        </p:spPr>
-        <p:txBody>
-          <a:bodyPr wrap="square" rtlCol="0">
-            <a:spAutoFit/>
-          </a:bodyPr>
-          <a:lstStyle/>
-          <a:p>
-            <a:r>
-              <a:rPr lang="en-US" sz="1600" noProof="1"/>
-              <a:t>0..4</a:t>
-            </a:r>
-          </a:p>
-        </p:txBody>
-      </p:sp>
-      <p:sp>
-        <p:nvSpPr>
-          <p:cNvPr id="45" name="ZoneTexte 44">
-            <a:extLst>
-              <a:ext uri="{FF2B5EF4-FFF2-40B4-BE49-F238E27FC236}">
-                <a16:creationId xmlns:a16="http://schemas.microsoft.com/office/drawing/2014/main" id="{BF367F50-5720-4E7F-B6DA-33B6D1C10BDD}"/>
-              </a:ext>
-            </a:extLst>
-          </p:cNvPr>
-          <p:cNvSpPr txBox="1"/>
-          <p:nvPr/>
-        </p:nvSpPr>
-        <p:spPr>
-          <a:xfrm>
-            <a:off x="10068787" y="6205871"/>
-            <a:ext cx="607145" cy="338554"/>
-          </a:xfrm>
-          <a:prstGeom prst="rect">
-            <a:avLst/>
-          </a:prstGeom>
-          <a:noFill/>
-        </p:spPr>
-        <p:txBody>
-          <a:bodyPr wrap="square" rtlCol="0">
-            <a:spAutoFit/>
-          </a:bodyPr>
-          <a:lstStyle/>
-          <a:p>
-            <a:r>
-              <a:rPr lang="en-US" sz="1600" noProof="1"/>
-              <a:t>0..4</a:t>
-            </a:r>
-          </a:p>
-        </p:txBody>
-      </p:sp>
-      <p:sp>
-        <p:nvSpPr>
-          <p:cNvPr id="41" name="Rectangle 40">
-            <a:extLst>
-              <a:ext uri="{FF2B5EF4-FFF2-40B4-BE49-F238E27FC236}">
-                <a16:creationId xmlns:a16="http://schemas.microsoft.com/office/drawing/2014/main" id="{98246E45-031A-4786-ACF4-D927C7E9CB6C}"/>
+              <a:t>LabSpecimenDefinition</a:t>
+            </a:r>
+          </a:p>
+          <a:p>
+            <a:pPr algn="ctr"/>
+            <a:r>
+              <a:rPr lang="en-US" sz="2000" noProof="1">
+                <a:solidFill>
+                  <a:schemeClr val="bg1"/>
+                </a:solidFill>
+              </a:rPr>
+              <a:t>Profile of </a:t>
+            </a:r>
+            <a:r>
+              <a:rPr lang="en-US" sz="2200" noProof="1">
+                <a:solidFill>
+                  <a:srgbClr val="FFFF00"/>
+                </a:solidFill>
+              </a:rPr>
+              <a:t>SpecimenDefinition</a:t>
+            </a:r>
+          </a:p>
+        </p:txBody>
+      </p:sp>
+      <p:sp>
+        <p:nvSpPr>
+          <p:cNvPr id="11" name="Rectangle 10">
+            <a:extLst>
+              <a:ext uri="{FF2B5EF4-FFF2-40B4-BE49-F238E27FC236}">
+                <a16:creationId xmlns:a16="http://schemas.microsoft.com/office/drawing/2014/main" id="{E2B1908B-CC45-41BD-BE20-7F25C0BD8D17}"/>
               </a:ext>
             </a:extLst>
           </p:cNvPr>
@@ -5790,8 +6307,8 @@
         </p:nvSpPr>
         <p:spPr>
           <a:xfrm>
-            <a:off x="189854" y="2089752"/>
-            <a:ext cx="2627866" cy="1140542"/>
+            <a:off x="4688380" y="1019944"/>
+            <a:ext cx="2593911" cy="1140542"/>
           </a:xfrm>
           <a:prstGeom prst="rect">
             <a:avLst/>
@@ -5859,7 +6376,7 @@
                   <a:srgbClr val="FFFF00"/>
                 </a:solidFill>
               </a:rPr>
-              <a:t>BillingCodeAndRule</a:t>
+              <a:t>LabServiceDefinition</a:t>
             </a:r>
           </a:p>
           <a:p>
@@ -5878,342 +6395,7 @@
                   <a:srgbClr val="FFFF00"/>
                 </a:solidFill>
               </a:rPr>
-              <a:t>ChargeItemDefinition</a:t>
-            </a:r>
-          </a:p>
-        </p:txBody>
-      </p:sp>
-      <p:cxnSp>
-        <p:nvCxnSpPr>
-          <p:cNvPr id="42" name="Connecteur : en angle 41">
-            <a:extLst>
-              <a:ext uri="{FF2B5EF4-FFF2-40B4-BE49-F238E27FC236}">
-                <a16:creationId xmlns:a16="http://schemas.microsoft.com/office/drawing/2014/main" id="{7CB04F81-F845-4409-8A16-0150F3ABCA14}"/>
-              </a:ext>
-            </a:extLst>
-          </p:cNvPr>
-          <p:cNvCxnSpPr>
-            <a:cxnSpLocks/>
-            <a:stCxn id="11" idx="1"/>
-            <a:endCxn id="41" idx="0"/>
-          </p:cNvCxnSpPr>
-          <p:nvPr/>
-        </p:nvCxnSpPr>
-        <p:spPr>
-          <a:xfrm rot="10800000" flipV="1">
-            <a:off x="1503788" y="1590214"/>
-            <a:ext cx="3184593" cy="499537"/>
-          </a:xfrm>
-          <a:prstGeom prst="bentConnector2">
-            <a:avLst/>
-          </a:prstGeom>
-          <a:ln w="28575">
-            <a:headEnd type="none" w="med" len="med"/>
-            <a:tailEnd type="arrow" w="med" len="med"/>
-          </a:ln>
-        </p:spPr>
-        <p:style>
-          <a:lnRef idx="1">
-            <a:schemeClr val="accent1"/>
-          </a:lnRef>
-          <a:fillRef idx="0">
-            <a:schemeClr val="accent1"/>
-          </a:fillRef>
-          <a:effectRef idx="0">
-            <a:schemeClr val="accent1"/>
-          </a:effectRef>
-          <a:fontRef idx="minor">
-            <a:schemeClr val="tx1"/>
-          </a:fontRef>
-        </p:style>
-      </p:cxnSp>
-      <p:sp>
-        <p:nvSpPr>
-          <p:cNvPr id="47" name="ZoneTexte 46">
-            <a:extLst>
-              <a:ext uri="{FF2B5EF4-FFF2-40B4-BE49-F238E27FC236}">
-                <a16:creationId xmlns:a16="http://schemas.microsoft.com/office/drawing/2014/main" id="{7EBC759F-3EC1-4AEE-B495-9524A5FA0F8C}"/>
-              </a:ext>
-            </a:extLst>
-          </p:cNvPr>
-          <p:cNvSpPr txBox="1"/>
-          <p:nvPr/>
-        </p:nvSpPr>
-        <p:spPr>
-          <a:xfrm>
-            <a:off x="1556018" y="1725868"/>
-            <a:ext cx="607145" cy="338554"/>
-          </a:xfrm>
-          <a:prstGeom prst="rect">
-            <a:avLst/>
-          </a:prstGeom>
-          <a:noFill/>
-        </p:spPr>
-        <p:txBody>
-          <a:bodyPr wrap="square" rtlCol="0">
-            <a:spAutoFit/>
-          </a:bodyPr>
-          <a:lstStyle/>
-          <a:p>
-            <a:r>
-              <a:rPr lang="en-US" sz="1600" noProof="1"/>
-              <a:t>0..*</a:t>
-            </a:r>
-          </a:p>
-        </p:txBody>
-      </p:sp>
-      <p:sp>
-        <p:nvSpPr>
-          <p:cNvPr id="48" name="ZoneTexte 47">
-            <a:extLst>
-              <a:ext uri="{FF2B5EF4-FFF2-40B4-BE49-F238E27FC236}">
-                <a16:creationId xmlns:a16="http://schemas.microsoft.com/office/drawing/2014/main" id="{6B1EB918-EDEA-46FE-BFD2-7B8AC4B29986}"/>
-              </a:ext>
-            </a:extLst>
-          </p:cNvPr>
-          <p:cNvSpPr txBox="1"/>
-          <p:nvPr/>
-        </p:nvSpPr>
-        <p:spPr>
-          <a:xfrm>
-            <a:off x="3330595" y="1545357"/>
-            <a:ext cx="1443487" cy="369332"/>
-          </a:xfrm>
-          <a:prstGeom prst="rect">
-            <a:avLst/>
-          </a:prstGeom>
-          <a:noFill/>
-        </p:spPr>
-        <p:txBody>
-          <a:bodyPr wrap="square" rtlCol="0">
-            <a:spAutoFit/>
-          </a:bodyPr>
-          <a:lstStyle/>
-          <a:p>
-            <a:r>
-              <a:rPr lang="en-US" noProof="1"/>
-              <a:t>serviceBilling</a:t>
-            </a:r>
-          </a:p>
-        </p:txBody>
-      </p:sp>
-      <p:sp>
-        <p:nvSpPr>
-          <p:cNvPr id="49" name="ZoneTexte 48">
-            <a:extLst>
-              <a:ext uri="{FF2B5EF4-FFF2-40B4-BE49-F238E27FC236}">
-                <a16:creationId xmlns:a16="http://schemas.microsoft.com/office/drawing/2014/main" id="{34BC439E-46D1-4D3A-A747-099A225EED85}"/>
-              </a:ext>
-            </a:extLst>
-          </p:cNvPr>
-          <p:cNvSpPr txBox="1"/>
-          <p:nvPr/>
-        </p:nvSpPr>
-        <p:spPr>
-          <a:xfrm>
-            <a:off x="-183392" y="1357828"/>
-            <a:ext cx="1627978" cy="646331"/>
-          </a:xfrm>
-          <a:prstGeom prst="rect">
-            <a:avLst/>
-          </a:prstGeom>
-          <a:noFill/>
-        </p:spPr>
-        <p:txBody>
-          <a:bodyPr wrap="square" rtlCol="0">
-            <a:spAutoFit/>
-          </a:bodyPr>
-          <a:lstStyle/>
-          <a:p>
-            <a:pPr algn="r"/>
-            <a:r>
-              <a:rPr lang="en-US" i="1" noProof="1">
-                <a:solidFill>
-                  <a:schemeClr val="accent1">
-                    <a:lumMod val="60000"/>
-                    <a:lumOff val="40000"/>
-                  </a:schemeClr>
-                </a:solidFill>
-              </a:rPr>
-              <a:t>a billing code and its rules</a:t>
-            </a:r>
-          </a:p>
-        </p:txBody>
-      </p:sp>
-      <p:sp>
-        <p:nvSpPr>
-          <p:cNvPr id="50" name="ZoneTexte 49">
-            <a:extLst>
-              <a:ext uri="{FF2B5EF4-FFF2-40B4-BE49-F238E27FC236}">
-                <a16:creationId xmlns:a16="http://schemas.microsoft.com/office/drawing/2014/main" id="{8B1414DC-932C-4FB2-A682-250462EEBE39}"/>
-              </a:ext>
-            </a:extLst>
-          </p:cNvPr>
-          <p:cNvSpPr txBox="1"/>
-          <p:nvPr/>
-        </p:nvSpPr>
-        <p:spPr>
-          <a:xfrm>
-            <a:off x="7248233" y="6490589"/>
-            <a:ext cx="3938309" cy="369332"/>
-          </a:xfrm>
-          <a:prstGeom prst="rect">
-            <a:avLst/>
-          </a:prstGeom>
-          <a:noFill/>
-        </p:spPr>
-        <p:txBody>
-          <a:bodyPr wrap="square" rtlCol="0">
-            <a:spAutoFit/>
-          </a:bodyPr>
-          <a:lstStyle>
-            <a:defPPr>
-              <a:defRPr lang="fr-FR"/>
-            </a:defPPr>
-            <a:lvl1pPr>
-              <a:defRPr>
-                <a:solidFill>
-                  <a:schemeClr val="accent1">
-                    <a:lumMod val="60000"/>
-                    <a:lumOff val="40000"/>
-                  </a:schemeClr>
-                </a:solidFill>
-              </a:defRPr>
-            </a:lvl1pPr>
-          </a:lstStyle>
-          <a:p>
-            <a:pPr algn="ctr"/>
-            <a:r>
-              <a:rPr lang="en-US" i="1" noProof="1"/>
-              <a:t>valid|normal|abnormal|critical values</a:t>
-            </a:r>
-          </a:p>
-        </p:txBody>
-      </p:sp>
-      <p:cxnSp>
-        <p:nvCxnSpPr>
-          <p:cNvPr id="59" name="Connecteur : en angle 58">
-            <a:extLst>
-              <a:ext uri="{FF2B5EF4-FFF2-40B4-BE49-F238E27FC236}">
-                <a16:creationId xmlns:a16="http://schemas.microsoft.com/office/drawing/2014/main" id="{CEC98B57-A84A-4965-8F1C-9AD5C1F66F68}"/>
-              </a:ext>
-            </a:extLst>
-          </p:cNvPr>
-          <p:cNvCxnSpPr>
-            <a:cxnSpLocks/>
-            <a:endCxn id="8" idx="3"/>
-          </p:cNvCxnSpPr>
-          <p:nvPr/>
-        </p:nvCxnSpPr>
-        <p:spPr>
-          <a:xfrm flipH="1" flipV="1">
-            <a:off x="7255499" y="1508366"/>
-            <a:ext cx="20166" cy="234943"/>
-          </a:xfrm>
-          <a:prstGeom prst="bentConnector3">
-            <a:avLst>
-              <a:gd name="adj1" fmla="val -1133591"/>
-            </a:avLst>
-          </a:prstGeom>
-          <a:ln w="28575">
-            <a:headEnd type="arrow" w="med" len="med"/>
-            <a:tailEnd type="none" w="med" len="med"/>
-          </a:ln>
-        </p:spPr>
-        <p:style>
-          <a:lnRef idx="1">
-            <a:schemeClr val="accent1"/>
-          </a:lnRef>
-          <a:fillRef idx="0">
-            <a:schemeClr val="accent1"/>
-          </a:fillRef>
-          <a:effectRef idx="0">
-            <a:schemeClr val="accent1"/>
-          </a:effectRef>
-          <a:fontRef idx="minor">
-            <a:schemeClr val="tx1"/>
-          </a:fontRef>
-        </p:style>
-      </p:cxnSp>
-      <p:sp>
-        <p:nvSpPr>
-          <p:cNvPr id="61" name="ZoneTexte 60">
-            <a:extLst>
-              <a:ext uri="{FF2B5EF4-FFF2-40B4-BE49-F238E27FC236}">
-                <a16:creationId xmlns:a16="http://schemas.microsoft.com/office/drawing/2014/main" id="{F15FD08A-EE01-41B9-A74C-D190D9D0CE08}"/>
-              </a:ext>
-            </a:extLst>
-          </p:cNvPr>
-          <p:cNvSpPr txBox="1"/>
-          <p:nvPr/>
-        </p:nvSpPr>
-        <p:spPr>
-          <a:xfrm>
-            <a:off x="7287980" y="1714517"/>
-            <a:ext cx="607145" cy="338554"/>
-          </a:xfrm>
-          <a:prstGeom prst="rect">
-            <a:avLst/>
-          </a:prstGeom>
-          <a:noFill/>
-        </p:spPr>
-        <p:txBody>
-          <a:bodyPr wrap="square" rtlCol="0">
-            <a:spAutoFit/>
-          </a:bodyPr>
-          <a:lstStyle/>
-          <a:p>
-            <a:r>
-              <a:rPr lang="en-US" sz="1600" noProof="1"/>
-              <a:t>0..*</a:t>
-            </a:r>
-          </a:p>
-        </p:txBody>
-      </p:sp>
-      <p:sp>
-        <p:nvSpPr>
-          <p:cNvPr id="6" name="Rectangle 5">
-            <a:extLst>
-              <a:ext uri="{FF2B5EF4-FFF2-40B4-BE49-F238E27FC236}">
-                <a16:creationId xmlns:a16="http://schemas.microsoft.com/office/drawing/2014/main" id="{1C6DDBC5-A792-48D7-9DEB-B008187D51FB}"/>
-              </a:ext>
-            </a:extLst>
-          </p:cNvPr>
-          <p:cNvSpPr/>
-          <p:nvPr/>
-        </p:nvSpPr>
-        <p:spPr>
-          <a:xfrm>
-            <a:off x="7571885" y="1454490"/>
-            <a:ext cx="2496902" cy="369332"/>
-          </a:xfrm>
-          <a:prstGeom prst="rect">
-            <a:avLst/>
-          </a:prstGeom>
-        </p:spPr>
-        <p:txBody>
-          <a:bodyPr wrap="none">
-            <a:spAutoFit/>
-          </a:bodyPr>
-          <a:lstStyle/>
-          <a:p>
-            <a:r>
-              <a:rPr lang="en-US" noProof="1"/>
-              <a:t>relatedArtifact (</a:t>
-            </a:r>
-            <a:r>
-              <a:rPr lang="en-US" i="1" noProof="1">
-                <a:solidFill>
-                  <a:schemeClr val="accent6">
-                    <a:lumMod val="75000"/>
-                  </a:schemeClr>
-                </a:solidFill>
-              </a:rPr>
-              <a:t>includes</a:t>
-            </a:r>
-            <a:r>
-              <a:rPr lang="en-US" noProof="1"/>
-              <a:t>)</a:t>
+              <a:t>PlanDefinition</a:t>
             </a:r>
           </a:p>
         </p:txBody>

</xml_diff>

<commit_message>
One profile name erroneous in the lab catalog big picture
</commit_message>
<xml_diff>
--- a/input/images-source/LabCompendium.pptx
+++ b/input/images-source/LabCompendium.pptx
@@ -197,7 +197,7 @@
           <a:p>
             <a:fld id="{C0FC2EA5-DDD9-41B5-A743-573E81829967}" type="datetimeFigureOut">
               <a:rPr lang="fr-FR" smtClean="0"/>
-              <a:t>12/06/2020</a:t>
+              <a:t>26/06/2020</a:t>
             </a:fld>
             <a:endParaRPr lang="fr-FR"/>
           </a:p>
@@ -695,7 +695,7 @@
           <a:p>
             <a:fld id="{DEBA1CB3-45B4-4365-8A01-D60AF6EBF46C}" type="datetimeFigureOut">
               <a:rPr lang="fr-FR" smtClean="0"/>
-              <a:t>12/06/2020</a:t>
+              <a:t>26/06/2020</a:t>
             </a:fld>
             <a:endParaRPr lang="fr-FR"/>
           </a:p>
@@ -893,7 +893,7 @@
           <a:p>
             <a:fld id="{DEBA1CB3-45B4-4365-8A01-D60AF6EBF46C}" type="datetimeFigureOut">
               <a:rPr lang="fr-FR" smtClean="0"/>
-              <a:t>12/06/2020</a:t>
+              <a:t>26/06/2020</a:t>
             </a:fld>
             <a:endParaRPr lang="fr-FR"/>
           </a:p>
@@ -1101,7 +1101,7 @@
           <a:p>
             <a:fld id="{DEBA1CB3-45B4-4365-8A01-D60AF6EBF46C}" type="datetimeFigureOut">
               <a:rPr lang="fr-FR" smtClean="0"/>
-              <a:t>12/06/2020</a:t>
+              <a:t>26/06/2020</a:t>
             </a:fld>
             <a:endParaRPr lang="fr-FR"/>
           </a:p>
@@ -1299,7 +1299,7 @@
           <a:p>
             <a:fld id="{DEBA1CB3-45B4-4365-8A01-D60AF6EBF46C}" type="datetimeFigureOut">
               <a:rPr lang="fr-FR" smtClean="0"/>
-              <a:t>12/06/2020</a:t>
+              <a:t>26/06/2020</a:t>
             </a:fld>
             <a:endParaRPr lang="fr-FR"/>
           </a:p>
@@ -1574,7 +1574,7 @@
           <a:p>
             <a:fld id="{DEBA1CB3-45B4-4365-8A01-D60AF6EBF46C}" type="datetimeFigureOut">
               <a:rPr lang="fr-FR" smtClean="0"/>
-              <a:t>12/06/2020</a:t>
+              <a:t>26/06/2020</a:t>
             </a:fld>
             <a:endParaRPr lang="fr-FR"/>
           </a:p>
@@ -1839,7 +1839,7 @@
           <a:p>
             <a:fld id="{DEBA1CB3-45B4-4365-8A01-D60AF6EBF46C}" type="datetimeFigureOut">
               <a:rPr lang="fr-FR" smtClean="0"/>
-              <a:t>12/06/2020</a:t>
+              <a:t>26/06/2020</a:t>
             </a:fld>
             <a:endParaRPr lang="fr-FR"/>
           </a:p>
@@ -2251,7 +2251,7 @@
           <a:p>
             <a:fld id="{DEBA1CB3-45B4-4365-8A01-D60AF6EBF46C}" type="datetimeFigureOut">
               <a:rPr lang="fr-FR" smtClean="0"/>
-              <a:t>12/06/2020</a:t>
+              <a:t>26/06/2020</a:t>
             </a:fld>
             <a:endParaRPr lang="fr-FR"/>
           </a:p>
@@ -2392,7 +2392,7 @@
           <a:p>
             <a:fld id="{DEBA1CB3-45B4-4365-8A01-D60AF6EBF46C}" type="datetimeFigureOut">
               <a:rPr lang="fr-FR" smtClean="0"/>
-              <a:t>12/06/2020</a:t>
+              <a:t>26/06/2020</a:t>
             </a:fld>
             <a:endParaRPr lang="fr-FR"/>
           </a:p>
@@ -2505,7 +2505,7 @@
           <a:p>
             <a:fld id="{DEBA1CB3-45B4-4365-8A01-D60AF6EBF46C}" type="datetimeFigureOut">
               <a:rPr lang="fr-FR" smtClean="0"/>
-              <a:t>12/06/2020</a:t>
+              <a:t>26/06/2020</a:t>
             </a:fld>
             <a:endParaRPr lang="fr-FR"/>
           </a:p>
@@ -2816,7 +2816,7 @@
           <a:p>
             <a:fld id="{DEBA1CB3-45B4-4365-8A01-D60AF6EBF46C}" type="datetimeFigureOut">
               <a:rPr lang="fr-FR" smtClean="0"/>
-              <a:t>12/06/2020</a:t>
+              <a:t>26/06/2020</a:t>
             </a:fld>
             <a:endParaRPr lang="fr-FR"/>
           </a:p>
@@ -3104,7 +3104,7 @@
           <a:p>
             <a:fld id="{DEBA1CB3-45B4-4365-8A01-D60AF6EBF46C}" type="datetimeFigureOut">
               <a:rPr lang="fr-FR" smtClean="0"/>
-              <a:t>12/06/2020</a:t>
+              <a:t>26/06/2020</a:t>
             </a:fld>
             <a:endParaRPr lang="fr-FR"/>
           </a:p>
@@ -3345,7 +3345,7 @@
           <a:p>
             <a:fld id="{DEBA1CB3-45B4-4365-8A01-D60AF6EBF46C}" type="datetimeFigureOut">
               <a:rPr lang="fr-FR" smtClean="0"/>
-              <a:t>12/06/2020</a:t>
+              <a:t>26/06/2020</a:t>
             </a:fld>
             <a:endParaRPr lang="fr-FR"/>
           </a:p>
@@ -5509,18 +5509,18 @@
           <a:p>
             <a:pPr algn="ctr"/>
             <a:r>
-              <a:rPr lang="en-US" sz="2200" noProof="1">
+              <a:rPr lang="en-US" noProof="1">
                 <a:solidFill>
                   <a:srgbClr val="FFFF00"/>
                 </a:solidFill>
               </a:rPr>
-              <a:t>BillingCodeAndRule</a:t>
+              <a:t>LabChargeItemDefinition</a:t>
             </a:r>
           </a:p>
           <a:p>
             <a:pPr algn="ctr"/>
             <a:r>
-              <a:rPr lang="en-US" sz="2000" noProof="1">
+              <a:rPr lang="en-US" noProof="1">
                 <a:solidFill>
                   <a:schemeClr val="bg1"/>
                 </a:solidFill>

</xml_diff>

<commit_message>
TORCH narrative + figures
</commit_message>
<xml_diff>
--- a/input/images-source/LabCompendium.pptx
+++ b/input/images-source/LabCompendium.pptx
@@ -197,7 +197,7 @@
           <a:p>
             <a:fld id="{C0FC2EA5-DDD9-41B5-A743-573E81829967}" type="datetimeFigureOut">
               <a:rPr lang="fr-FR" smtClean="0"/>
-              <a:t>26/06/2020</a:t>
+              <a:t>27/06/2020</a:t>
             </a:fld>
             <a:endParaRPr lang="fr-FR"/>
           </a:p>
@@ -695,7 +695,7 @@
           <a:p>
             <a:fld id="{DEBA1CB3-45B4-4365-8A01-D60AF6EBF46C}" type="datetimeFigureOut">
               <a:rPr lang="fr-FR" smtClean="0"/>
-              <a:t>26/06/2020</a:t>
+              <a:t>27/06/2020</a:t>
             </a:fld>
             <a:endParaRPr lang="fr-FR"/>
           </a:p>
@@ -893,7 +893,7 @@
           <a:p>
             <a:fld id="{DEBA1CB3-45B4-4365-8A01-D60AF6EBF46C}" type="datetimeFigureOut">
               <a:rPr lang="fr-FR" smtClean="0"/>
-              <a:t>26/06/2020</a:t>
+              <a:t>27/06/2020</a:t>
             </a:fld>
             <a:endParaRPr lang="fr-FR"/>
           </a:p>
@@ -1101,7 +1101,7 @@
           <a:p>
             <a:fld id="{DEBA1CB3-45B4-4365-8A01-D60AF6EBF46C}" type="datetimeFigureOut">
               <a:rPr lang="fr-FR" smtClean="0"/>
-              <a:t>26/06/2020</a:t>
+              <a:t>27/06/2020</a:t>
             </a:fld>
             <a:endParaRPr lang="fr-FR"/>
           </a:p>
@@ -1299,7 +1299,7 @@
           <a:p>
             <a:fld id="{DEBA1CB3-45B4-4365-8A01-D60AF6EBF46C}" type="datetimeFigureOut">
               <a:rPr lang="fr-FR" smtClean="0"/>
-              <a:t>26/06/2020</a:t>
+              <a:t>27/06/2020</a:t>
             </a:fld>
             <a:endParaRPr lang="fr-FR"/>
           </a:p>
@@ -1574,7 +1574,7 @@
           <a:p>
             <a:fld id="{DEBA1CB3-45B4-4365-8A01-D60AF6EBF46C}" type="datetimeFigureOut">
               <a:rPr lang="fr-FR" smtClean="0"/>
-              <a:t>26/06/2020</a:t>
+              <a:t>27/06/2020</a:t>
             </a:fld>
             <a:endParaRPr lang="fr-FR"/>
           </a:p>
@@ -1839,7 +1839,7 @@
           <a:p>
             <a:fld id="{DEBA1CB3-45B4-4365-8A01-D60AF6EBF46C}" type="datetimeFigureOut">
               <a:rPr lang="fr-FR" smtClean="0"/>
-              <a:t>26/06/2020</a:t>
+              <a:t>27/06/2020</a:t>
             </a:fld>
             <a:endParaRPr lang="fr-FR"/>
           </a:p>
@@ -2251,7 +2251,7 @@
           <a:p>
             <a:fld id="{DEBA1CB3-45B4-4365-8A01-D60AF6EBF46C}" type="datetimeFigureOut">
               <a:rPr lang="fr-FR" smtClean="0"/>
-              <a:t>26/06/2020</a:t>
+              <a:t>27/06/2020</a:t>
             </a:fld>
             <a:endParaRPr lang="fr-FR"/>
           </a:p>
@@ -2392,7 +2392,7 @@
           <a:p>
             <a:fld id="{DEBA1CB3-45B4-4365-8A01-D60AF6EBF46C}" type="datetimeFigureOut">
               <a:rPr lang="fr-FR" smtClean="0"/>
-              <a:t>26/06/2020</a:t>
+              <a:t>27/06/2020</a:t>
             </a:fld>
             <a:endParaRPr lang="fr-FR"/>
           </a:p>
@@ -2505,7 +2505,7 @@
           <a:p>
             <a:fld id="{DEBA1CB3-45B4-4365-8A01-D60AF6EBF46C}" type="datetimeFigureOut">
               <a:rPr lang="fr-FR" smtClean="0"/>
-              <a:t>26/06/2020</a:t>
+              <a:t>27/06/2020</a:t>
             </a:fld>
             <a:endParaRPr lang="fr-FR"/>
           </a:p>
@@ -2816,7 +2816,7 @@
           <a:p>
             <a:fld id="{DEBA1CB3-45B4-4365-8A01-D60AF6EBF46C}" type="datetimeFigureOut">
               <a:rPr lang="fr-FR" smtClean="0"/>
-              <a:t>26/06/2020</a:t>
+              <a:t>27/06/2020</a:t>
             </a:fld>
             <a:endParaRPr lang="fr-FR"/>
           </a:p>
@@ -3104,7 +3104,7 @@
           <a:p>
             <a:fld id="{DEBA1CB3-45B4-4365-8A01-D60AF6EBF46C}" type="datetimeFigureOut">
               <a:rPr lang="fr-FR" smtClean="0"/>
-              <a:t>26/06/2020</a:t>
+              <a:t>27/06/2020</a:t>
             </a:fld>
             <a:endParaRPr lang="fr-FR"/>
           </a:p>
@@ -3345,7 +3345,7 @@
           <a:p>
             <a:fld id="{DEBA1CB3-45B4-4365-8A01-D60AF6EBF46C}" type="datetimeFigureOut">
               <a:rPr lang="fr-FR" smtClean="0"/>
-              <a:t>26/06/2020</a:t>
+              <a:t>27/06/2020</a:t>
             </a:fld>
             <a:endParaRPr lang="fr-FR"/>
           </a:p>
@@ -3776,7 +3776,7 @@
         </p:nvSpPr>
         <p:spPr>
           <a:xfrm>
-            <a:off x="7112001" y="1035307"/>
+            <a:off x="8165541" y="1459371"/>
             <a:ext cx="143498" cy="164249"/>
           </a:xfrm>
           <a:prstGeom prst="rect">
@@ -3822,7 +3822,7 @@
         </p:nvSpPr>
         <p:spPr>
           <a:xfrm>
-            <a:off x="6934666" y="1318072"/>
+            <a:off x="7988206" y="1655998"/>
             <a:ext cx="340999" cy="288748"/>
           </a:xfrm>
           <a:prstGeom prst="rect">
@@ -3868,7 +3868,7 @@
         </p:nvSpPr>
         <p:spPr>
           <a:xfrm>
-            <a:off x="3852577" y="342770"/>
+            <a:off x="3780195" y="601868"/>
             <a:ext cx="607145" cy="338554"/>
           </a:xfrm>
           <a:prstGeom prst="rect">
@@ -3907,8 +3907,8 @@
         </p:nvCxnSpPr>
         <p:spPr>
           <a:xfrm rot="16200000" flipV="1">
-            <a:off x="4760456" y="-204937"/>
-            <a:ext cx="299085" cy="2150677"/>
+            <a:off x="5084007" y="-706606"/>
+            <a:ext cx="846507" cy="3474044"/>
           </a:xfrm>
           <a:prstGeom prst="bentConnector2">
             <a:avLst/>
@@ -3947,8 +3947,8 @@
         </p:nvSpPr>
         <p:spPr>
           <a:xfrm>
-            <a:off x="1673674" y="152288"/>
-            <a:ext cx="2160985" cy="1137142"/>
+            <a:off x="1894230" y="154094"/>
+            <a:ext cx="1876008" cy="906135"/>
           </a:xfrm>
           <a:prstGeom prst="rect">
             <a:avLst/>
@@ -4011,7 +4011,7 @@
           <a:p>
             <a:pPr algn="ctr"/>
             <a:r>
-              <a:rPr lang="en-US" sz="2200" noProof="1">
+              <a:rPr lang="en-US" noProof="1">
                 <a:solidFill>
                   <a:srgbClr val="FFFF00"/>
                 </a:solidFill>
@@ -4019,7 +4019,7 @@
               <a:t>CatalogHeader </a:t>
             </a:r>
             <a:r>
-              <a:rPr lang="en-US" sz="2000" noProof="1"/>
+              <a:rPr lang="en-US" noProof="1"/>
               <a:t>profile of </a:t>
             </a:r>
             <a:r>
@@ -4047,8 +4047,8 @@
         </p:nvSpPr>
         <p:spPr>
           <a:xfrm>
-            <a:off x="4283482" y="379103"/>
-            <a:ext cx="1876007" cy="369332"/>
+            <a:off x="5646246" y="285916"/>
+            <a:ext cx="1740711" cy="338554"/>
           </a:xfrm>
           <a:prstGeom prst="rect">
             <a:avLst/>
@@ -4062,7 +4062,7 @@
           <a:lstStyle/>
           <a:p>
             <a:r>
-              <a:rPr lang="en-US" noProof="1"/>
+              <a:rPr lang="en-US" sz="1600" noProof="1"/>
               <a:t>catalogReference</a:t>
             </a:r>
           </a:p>
@@ -4086,8 +4086,8 @@
         </p:nvCxnSpPr>
         <p:spPr>
           <a:xfrm rot="5400000">
-            <a:off x="5600182" y="2545640"/>
-            <a:ext cx="770309" cy="1"/>
+            <a:off x="6746456" y="2900439"/>
+            <a:ext cx="995653" cy="1"/>
           </a:xfrm>
           <a:prstGeom prst="bentConnector3">
             <a:avLst>
@@ -4128,8 +4128,8 @@
         </p:nvSpPr>
         <p:spPr>
           <a:xfrm>
-            <a:off x="4527907" y="2930795"/>
-            <a:ext cx="2914855" cy="1140542"/>
+            <a:off x="5992395" y="3398266"/>
+            <a:ext cx="2503772" cy="907956"/>
           </a:xfrm>
           <a:prstGeom prst="rect">
             <a:avLst/>
@@ -4192,7 +4192,7 @@
           <a:p>
             <a:pPr algn="ctr"/>
             <a:r>
-              <a:rPr lang="en-US" sz="2200" noProof="1">
+              <a:rPr lang="en-US" noProof="1">
                 <a:solidFill>
                   <a:srgbClr val="FFFF00"/>
                 </a:solidFill>
@@ -4203,7 +4203,7 @@
           <a:p>
             <a:pPr algn="ctr"/>
             <a:r>
-              <a:rPr lang="en-US" sz="2000" noProof="1">
+              <a:rPr lang="en-US" noProof="1">
                 <a:solidFill>
                   <a:schemeClr val="bg1"/>
                 </a:solidFill>
@@ -4235,8 +4235,8 @@
         </p:nvSpPr>
         <p:spPr>
           <a:xfrm>
-            <a:off x="5516244" y="2515527"/>
-            <a:ext cx="607145" cy="369332"/>
+            <a:off x="6723784" y="3006700"/>
+            <a:ext cx="607145" cy="338554"/>
           </a:xfrm>
           <a:prstGeom prst="rect">
             <a:avLst/>
@@ -4250,7 +4250,7 @@
           <a:lstStyle/>
           <a:p>
             <a:r>
-              <a:rPr lang="en-US" noProof="1"/>
+              <a:rPr lang="en-US" sz="1600" noProof="1"/>
               <a:t>1..*</a:t>
             </a:r>
           </a:p>
@@ -4270,8 +4270,8 @@
         </p:nvSpPr>
         <p:spPr>
           <a:xfrm>
-            <a:off x="5944430" y="2232575"/>
-            <a:ext cx="4293851" cy="369332"/>
+            <a:off x="7224080" y="2550583"/>
+            <a:ext cx="4293851" cy="338554"/>
           </a:xfrm>
           <a:prstGeom prst="rect">
             <a:avLst/>
@@ -4285,7 +4285,7 @@
           <a:lstStyle/>
           <a:p>
             <a:r>
-              <a:rPr lang="en-US" noProof="1"/>
+              <a:rPr lang="en-US" sz="1600" noProof="1"/>
               <a:t>action[.action[.action]].definitionCanonical</a:t>
             </a:r>
           </a:p>
@@ -4305,8 +4305,8 @@
         </p:nvSpPr>
         <p:spPr>
           <a:xfrm>
-            <a:off x="4373268" y="4950922"/>
-            <a:ext cx="3227642" cy="1090457"/>
+            <a:off x="4015972" y="4613945"/>
+            <a:ext cx="2750664" cy="929390"/>
           </a:xfrm>
           <a:prstGeom prst="rect">
             <a:avLst/>
@@ -4369,7 +4369,7 @@
           <a:p>
             <a:pPr algn="ctr"/>
             <a:r>
-              <a:rPr lang="en-US" sz="2200" noProof="1">
+              <a:rPr lang="en-US" noProof="1">
                 <a:solidFill>
                   <a:srgbClr val="FFFF00"/>
                 </a:solidFill>
@@ -4380,7 +4380,7 @@
           <a:p>
             <a:pPr algn="ctr"/>
             <a:r>
-              <a:rPr lang="en-US" sz="2000" noProof="1">
+              <a:rPr lang="en-US" noProof="1">
                 <a:solidFill>
                   <a:schemeClr val="bg1"/>
                 </a:solidFill>
@@ -4412,8 +4412,8 @@
         </p:nvSpPr>
         <p:spPr>
           <a:xfrm>
-            <a:off x="8886368" y="4513606"/>
-            <a:ext cx="3111179" cy="1090457"/>
+            <a:off x="7638378" y="4619903"/>
+            <a:ext cx="2744710" cy="917620"/>
           </a:xfrm>
           <a:prstGeom prst="rect">
             <a:avLst/>
@@ -4476,7 +4476,7 @@
           <a:p>
             <a:pPr algn="ctr"/>
             <a:r>
-              <a:rPr lang="en-US" sz="2200" noProof="1">
+              <a:rPr lang="en-US" noProof="1">
                 <a:solidFill>
                   <a:srgbClr val="FFFF00"/>
                 </a:solidFill>
@@ -4487,7 +4487,7 @@
           <a:p>
             <a:pPr algn="ctr"/>
             <a:r>
-              <a:rPr lang="en-US" sz="2000" noProof="1">
+              <a:rPr lang="en-US" noProof="1">
                 <a:solidFill>
                   <a:schemeClr val="bg1"/>
                 </a:solidFill>
@@ -4517,58 +4517,14 @@
           <p:cNvCxnSpPr>
             <a:cxnSpLocks/>
             <a:stCxn id="13" idx="1"/>
-            <a:endCxn id="67" idx="0"/>
+            <a:endCxn id="56" idx="3"/>
           </p:cNvCxnSpPr>
           <p:nvPr/>
         </p:nvCxnSpPr>
         <p:spPr>
           <a:xfrm rot="10800000" flipV="1">
-            <a:off x="3290158" y="2036277"/>
-            <a:ext cx="1411474" cy="2909651"/>
-          </a:xfrm>
-          <a:prstGeom prst="bentConnector2">
-            <a:avLst/>
-          </a:prstGeom>
-          <a:ln w="28575">
-            <a:headEnd type="none" w="med" len="med"/>
-            <a:tailEnd type="arrow" w="med" len="med"/>
-          </a:ln>
-        </p:spPr>
-        <p:style>
-          <a:lnRef idx="1">
-            <a:schemeClr val="accent1"/>
-          </a:lnRef>
-          <a:fillRef idx="0">
-            <a:schemeClr val="accent1"/>
-          </a:fillRef>
-          <a:effectRef idx="0">
-            <a:schemeClr val="accent1"/>
-          </a:effectRef>
-          <a:fontRef idx="minor">
-            <a:schemeClr val="tx1"/>
-          </a:fontRef>
-        </p:style>
-      </p:cxnSp>
-      <p:cxnSp>
-        <p:nvCxnSpPr>
-          <p:cNvPr id="60" name="Connecteur : en angle 59">
-            <a:extLst>
-              <a:ext uri="{FF2B5EF4-FFF2-40B4-BE49-F238E27FC236}">
-                <a16:creationId xmlns:a16="http://schemas.microsoft.com/office/drawing/2014/main" id="{DA2AF1A3-48F7-47E0-B4B7-79E68B4E6B5C}"/>
-              </a:ext>
-            </a:extLst>
-          </p:cNvPr>
-          <p:cNvCxnSpPr>
-            <a:cxnSpLocks/>
-            <a:stCxn id="46" idx="2"/>
-            <a:endCxn id="54" idx="0"/>
-          </p:cNvCxnSpPr>
-          <p:nvPr/>
-        </p:nvCxnSpPr>
-        <p:spPr>
-          <a:xfrm rot="16200000" flipH="1">
-            <a:off x="5546420" y="4510252"/>
-            <a:ext cx="879585" cy="1754"/>
+            <a:off x="3761494" y="2274814"/>
+            <a:ext cx="2411116" cy="839432"/>
           </a:xfrm>
           <a:prstGeom prst="bentConnector3">
             <a:avLst>
@@ -4613,8 +4569,8 @@
         </p:nvCxnSpPr>
         <p:spPr>
           <a:xfrm>
-            <a:off x="7442762" y="3501066"/>
-            <a:ext cx="2999196" cy="1012540"/>
+            <a:off x="8496167" y="3852244"/>
+            <a:ext cx="514566" cy="767659"/>
           </a:xfrm>
           <a:prstGeom prst="bentConnector2">
             <a:avLst/>
@@ -4653,8 +4609,8 @@
         </p:nvSpPr>
         <p:spPr>
           <a:xfrm>
-            <a:off x="3238672" y="1998412"/>
-            <a:ext cx="1429261" cy="923330"/>
+            <a:off x="4288328" y="1933631"/>
+            <a:ext cx="1987886" cy="338554"/>
           </a:xfrm>
           <a:prstGeom prst="rect">
             <a:avLst/>
@@ -4668,8 +4624,8 @@
           <a:lstStyle/>
           <a:p>
             <a:r>
-              <a:rPr lang="en-US" noProof="1"/>
-              <a:t>Requirement for input specimen</a:t>
+              <a:rPr lang="en-US" sz="1600" noProof="1"/>
+              <a:t>specimenRequested</a:t>
             </a:r>
           </a:p>
         </p:txBody>
@@ -4688,7 +4644,7 @@
         </p:nvSpPr>
         <p:spPr>
           <a:xfrm>
-            <a:off x="2847435" y="4511129"/>
+            <a:off x="3806451" y="3078451"/>
             <a:ext cx="607145" cy="338554"/>
           </a:xfrm>
           <a:prstGeom prst="rect">
@@ -4723,8 +4679,8 @@
         </p:nvSpPr>
         <p:spPr>
           <a:xfrm>
-            <a:off x="5976002" y="4087610"/>
-            <a:ext cx="2577103" cy="369332"/>
+            <a:off x="3780195" y="3550372"/>
+            <a:ext cx="2339634" cy="338554"/>
           </a:xfrm>
           <a:prstGeom prst="rect">
             <a:avLst/>
@@ -4738,7 +4694,7 @@
           <a:lstStyle/>
           <a:p>
             <a:r>
-              <a:rPr lang="en-US" noProof="1"/>
+              <a:rPr lang="en-US" sz="1600" noProof="1"/>
               <a:t>observationRequirement</a:t>
             </a:r>
           </a:p>
@@ -4758,7 +4714,7 @@
         </p:nvSpPr>
         <p:spPr>
           <a:xfrm>
-            <a:off x="6000916" y="4552741"/>
+            <a:off x="4950795" y="4229779"/>
             <a:ext cx="607145" cy="338554"/>
           </a:xfrm>
           <a:prstGeom prst="rect">
@@ -4793,7 +4749,7 @@
         </p:nvSpPr>
         <p:spPr>
           <a:xfrm>
-            <a:off x="9972372" y="4116435"/>
+            <a:off x="8543564" y="4231240"/>
             <a:ext cx="607145" cy="338554"/>
           </a:xfrm>
           <a:prstGeom prst="rect">
@@ -4828,8 +4784,8 @@
         </p:nvSpPr>
         <p:spPr>
           <a:xfrm>
-            <a:off x="7470755" y="3124652"/>
-            <a:ext cx="3111179" cy="369332"/>
+            <a:off x="8496167" y="3503065"/>
+            <a:ext cx="3111179" cy="338554"/>
           </a:xfrm>
           <a:prstGeom prst="rect">
             <a:avLst/>
@@ -4843,7 +4799,7 @@
           <a:lstStyle/>
           <a:p>
             <a:r>
-              <a:rPr lang="en-US" noProof="1"/>
+              <a:rPr lang="en-US" sz="1600" noProof="1"/>
               <a:t>observationResultRequirement</a:t>
             </a:r>
           </a:p>
@@ -4863,7 +4819,7 @@
         </p:nvSpPr>
         <p:spPr>
           <a:xfrm>
-            <a:off x="18301" y="19604"/>
+            <a:off x="316157" y="231960"/>
             <a:ext cx="1540369" cy="646331"/>
           </a:xfrm>
           <a:prstGeom prst="rect">
@@ -4906,8 +4862,8 @@
         </p:nvSpPr>
         <p:spPr>
           <a:xfrm>
-            <a:off x="6159489" y="215127"/>
-            <a:ext cx="3160644" cy="646331"/>
+            <a:off x="7621432" y="397982"/>
+            <a:ext cx="2614709" cy="923330"/>
           </a:xfrm>
           <a:prstGeom prst="rect">
             <a:avLst/>
@@ -4955,8 +4911,8 @@
         </p:nvSpPr>
         <p:spPr>
           <a:xfrm>
-            <a:off x="6017300" y="2523149"/>
-            <a:ext cx="6190996" cy="369332"/>
+            <a:off x="7275472" y="3006700"/>
+            <a:ext cx="4928219" cy="369332"/>
           </a:xfrm>
           <a:prstGeom prst="rect">
             <a:avLst/>
@@ -5004,8 +4960,8 @@
         </p:nvSpPr>
         <p:spPr>
           <a:xfrm>
-            <a:off x="637856" y="4187963"/>
-            <a:ext cx="2109840" cy="646331"/>
+            <a:off x="-80" y="2630056"/>
+            <a:ext cx="1255065" cy="923330"/>
           </a:xfrm>
           <a:prstGeom prst="rect">
             <a:avLst/>
@@ -5035,7 +4991,7 @@
             <a:pPr algn="r"/>
             <a:r>
               <a:rPr lang="en-US" i="1" noProof="1"/>
-              <a:t>a specimen required by the procedure</a:t>
+              <a:t>a specimen required by the service</a:t>
             </a:r>
           </a:p>
         </p:txBody>
@@ -5054,8 +5010,8 @@
         </p:nvSpPr>
         <p:spPr>
           <a:xfrm>
-            <a:off x="3702787" y="4259092"/>
-            <a:ext cx="2268722" cy="646331"/>
+            <a:off x="2438401" y="4439682"/>
+            <a:ext cx="1506979" cy="1200329"/>
           </a:xfrm>
           <a:prstGeom prst="rect">
             <a:avLst/>
@@ -5104,8 +5060,8 @@
         </p:nvSpPr>
         <p:spPr>
           <a:xfrm>
-            <a:off x="10503583" y="3503857"/>
-            <a:ext cx="1541314" cy="923330"/>
+            <a:off x="10458939" y="4439682"/>
+            <a:ext cx="1315620" cy="1200329"/>
           </a:xfrm>
           <a:prstGeom prst="rect">
             <a:avLst/>
@@ -5141,10 +5097,10 @@
       </p:sp>
       <p:sp>
         <p:nvSpPr>
-          <p:cNvPr id="30" name="Rectangle 29">
-            <a:extLst>
-              <a:ext uri="{FF2B5EF4-FFF2-40B4-BE49-F238E27FC236}">
-                <a16:creationId xmlns:a16="http://schemas.microsoft.com/office/drawing/2014/main" id="{3FF89A57-DB25-4A6C-878E-8BC0F0E66DCE}"/>
+          <p:cNvPr id="38" name="Rectangle 37">
+            <a:extLst>
+              <a:ext uri="{FF2B5EF4-FFF2-40B4-BE49-F238E27FC236}">
+                <a16:creationId xmlns:a16="http://schemas.microsoft.com/office/drawing/2014/main" id="{84729A3E-A76D-4D5C-845E-6B5227D6B57E}"/>
               </a:ext>
             </a:extLst>
           </p:cNvPr>
@@ -5153,53 +5109,7 @@
         </p:nvSpPr>
         <p:spPr>
           <a:xfrm>
-            <a:off x="6908365" y="1872870"/>
-            <a:ext cx="340999" cy="217887"/>
-          </a:xfrm>
-          <a:prstGeom prst="rect">
-            <a:avLst/>
-          </a:prstGeom>
-        </p:spPr>
-        <p:style>
-          <a:lnRef idx="2">
-            <a:schemeClr val="accent1">
-              <a:shade val="50000"/>
-            </a:schemeClr>
-          </a:lnRef>
-          <a:fillRef idx="1">
-            <a:schemeClr val="accent1"/>
-          </a:fillRef>
-          <a:effectRef idx="0">
-            <a:schemeClr val="accent1"/>
-          </a:effectRef>
-          <a:fontRef idx="minor">
-            <a:schemeClr val="lt1"/>
-          </a:fontRef>
-        </p:style>
-        <p:txBody>
-          <a:bodyPr rtlCol="0" anchor="ctr"/>
-          <a:lstStyle/>
-          <a:p>
-            <a:pPr algn="ctr"/>
-            <a:endParaRPr lang="fr-FR"/>
-          </a:p>
-        </p:txBody>
-      </p:sp>
-      <p:sp>
-        <p:nvSpPr>
-          <p:cNvPr id="38" name="Rectangle 37">
-            <a:extLst>
-              <a:ext uri="{FF2B5EF4-FFF2-40B4-BE49-F238E27FC236}">
-                <a16:creationId xmlns:a16="http://schemas.microsoft.com/office/drawing/2014/main" id="{84729A3E-A76D-4D5C-845E-6B5227D6B57E}"/>
-              </a:ext>
-            </a:extLst>
-          </p:cNvPr>
-          <p:cNvSpPr/>
-          <p:nvPr/>
-        </p:nvSpPr>
-        <p:spPr>
-          <a:xfrm>
-            <a:off x="8338775" y="6013917"/>
+            <a:off x="6543117" y="5994039"/>
             <a:ext cx="1667712" cy="476672"/>
           </a:xfrm>
           <a:prstGeom prst="rect">
@@ -5291,8 +5201,8 @@
         </p:nvCxnSpPr>
         <p:spPr>
           <a:xfrm rot="16200000" flipH="1">
-            <a:off x="7057495" y="4970973"/>
-            <a:ext cx="210874" cy="2351686"/>
+            <a:off x="5622690" y="5311948"/>
+            <a:ext cx="689040" cy="1151813"/>
           </a:xfrm>
           <a:prstGeom prst="bentConnector2">
             <a:avLst/>
@@ -5335,8 +5245,8 @@
         </p:nvCxnSpPr>
         <p:spPr>
           <a:xfrm rot="5400000">
-            <a:off x="9900128" y="5710423"/>
-            <a:ext cx="648190" cy="435471"/>
+            <a:off x="8263355" y="5484997"/>
+            <a:ext cx="694852" cy="799904"/>
           </a:xfrm>
           <a:prstGeom prst="bentConnector2">
             <a:avLst/>
@@ -5375,7 +5285,7 @@
         </p:nvSpPr>
         <p:spPr>
           <a:xfrm>
-            <a:off x="7787304" y="6202144"/>
+            <a:off x="5991646" y="6182266"/>
             <a:ext cx="607145" cy="338554"/>
           </a:xfrm>
           <a:prstGeom prst="rect">
@@ -5410,7 +5320,7 @@
         </p:nvSpPr>
         <p:spPr>
           <a:xfrm>
-            <a:off x="10068787" y="6205871"/>
+            <a:off x="8273129" y="6185993"/>
             <a:ext cx="607145" cy="338554"/>
           </a:xfrm>
           <a:prstGeom prst="rect">
@@ -5445,8 +5355,8 @@
         </p:nvSpPr>
         <p:spPr>
           <a:xfrm>
-            <a:off x="189854" y="2089752"/>
-            <a:ext cx="2627866" cy="1140542"/>
+            <a:off x="1170489" y="1347636"/>
+            <a:ext cx="2621259" cy="989630"/>
           </a:xfrm>
           <a:prstGeom prst="rect">
             <a:avLst/>
@@ -5549,18 +5459,20 @@
           </p:cNvPr>
           <p:cNvCxnSpPr>
             <a:cxnSpLocks/>
-            <a:stCxn id="11" idx="1"/>
-            <a:endCxn id="41" idx="0"/>
+            <a:stCxn id="84" idx="1"/>
+            <a:endCxn id="41" idx="3"/>
           </p:cNvCxnSpPr>
           <p:nvPr/>
         </p:nvCxnSpPr>
         <p:spPr>
-          <a:xfrm rot="10800000" flipV="1">
-            <a:off x="1503788" y="1590214"/>
-            <a:ext cx="3184593" cy="499537"/>
-          </a:xfrm>
-          <a:prstGeom prst="bentConnector2">
-            <a:avLst/>
+          <a:xfrm rot="10800000">
+            <a:off x="3791748" y="1842452"/>
+            <a:ext cx="2373592" cy="1303"/>
+          </a:xfrm>
+          <a:prstGeom prst="bentConnector3">
+            <a:avLst>
+              <a:gd name="adj1" fmla="val 50000"/>
+            </a:avLst>
           </a:prstGeom>
           <a:ln w="28575">
             <a:headEnd type="none" w="med" len="med"/>
@@ -5596,7 +5508,7 @@
         </p:nvSpPr>
         <p:spPr>
           <a:xfrm>
-            <a:off x="1556018" y="1725868"/>
+            <a:off x="3757192" y="1973824"/>
             <a:ext cx="607145" cy="338554"/>
           </a:xfrm>
           <a:prstGeom prst="rect">
@@ -5631,8 +5543,8 @@
         </p:nvSpPr>
         <p:spPr>
           <a:xfrm>
-            <a:off x="3289961" y="1286559"/>
-            <a:ext cx="1443487" cy="369332"/>
+            <a:off x="4364337" y="1505287"/>
+            <a:ext cx="1730265" cy="338554"/>
           </a:xfrm>
           <a:prstGeom prst="rect">
             <a:avLst/>
@@ -5646,8 +5558,8 @@
           <a:lstStyle/>
           <a:p>
             <a:r>
-              <a:rPr lang="en-US" noProof="1"/>
-              <a:t>serviceBilling</a:t>
+              <a:rPr lang="en-US" sz="1600" noProof="1"/>
+              <a:t>serviceBillingCode</a:t>
             </a:r>
           </a:p>
         </p:txBody>
@@ -5666,8 +5578,8 @@
         </p:nvSpPr>
         <p:spPr>
           <a:xfrm>
-            <a:off x="-183392" y="1357828"/>
-            <a:ext cx="1627978" cy="646331"/>
+            <a:off x="-1" y="1371837"/>
+            <a:ext cx="1098565" cy="923330"/>
           </a:xfrm>
           <a:prstGeom prst="rect">
             <a:avLst/>
@@ -5709,7 +5621,7 @@
         </p:nvSpPr>
         <p:spPr>
           <a:xfrm>
-            <a:off x="7248233" y="6490589"/>
+            <a:off x="5432697" y="6483963"/>
             <a:ext cx="3938309" cy="369332"/>
           </a:xfrm>
           <a:prstGeom prst="rect">
@@ -5756,13 +5668,12 @@
           </p:cNvPr>
           <p:cNvCxnSpPr>
             <a:cxnSpLocks/>
-            <a:endCxn id="8" idx="3"/>
           </p:cNvCxnSpPr>
           <p:nvPr/>
         </p:nvCxnSpPr>
         <p:spPr>
           <a:xfrm flipH="1" flipV="1">
-            <a:off x="7255499" y="1117432"/>
+            <a:off x="8302413" y="1541496"/>
             <a:ext cx="20166" cy="234943"/>
           </a:xfrm>
           <a:prstGeom prst="bentConnector3">
@@ -5804,8 +5715,8 @@
         </p:nvSpPr>
         <p:spPr>
           <a:xfrm>
-            <a:off x="7287980" y="1323583"/>
-            <a:ext cx="607145" cy="338554"/>
+            <a:off x="8365057" y="1714517"/>
+            <a:ext cx="563730" cy="338554"/>
           </a:xfrm>
           <a:prstGeom prst="rect">
             <a:avLst/>
@@ -5839,8 +5750,8 @@
         </p:nvSpPr>
         <p:spPr>
           <a:xfrm>
-            <a:off x="7571885" y="1063556"/>
-            <a:ext cx="2496902" cy="369332"/>
+            <a:off x="8570910" y="1474301"/>
+            <a:ext cx="2243306" cy="338554"/>
           </a:xfrm>
           <a:prstGeom prst="rect">
             <a:avLst/>
@@ -5853,11 +5764,11 @@
           <a:lstStyle/>
           <a:p>
             <a:r>
-              <a:rPr lang="en-US" noProof="1"/>
+              <a:rPr lang="en-US" sz="1600" noProof="1"/>
               <a:t>relatedArtifact (</a:t>
             </a:r>
             <a:r>
-              <a:rPr lang="en-US" i="1" noProof="1">
+              <a:rPr lang="en-US" sz="1600" i="1" noProof="1">
                 <a:solidFill>
                   <a:schemeClr val="accent6">
                     <a:lumMod val="75000"/>
@@ -5867,7 +5778,7 @@
               <a:t>Includes</a:t>
             </a:r>
             <a:r>
-              <a:rPr lang="en-US" noProof="1"/>
+              <a:rPr lang="en-US" sz="1600" noProof="1"/>
               <a:t>)</a:t>
             </a:r>
           </a:p>
@@ -5887,7 +5798,7 @@
         </p:nvSpPr>
         <p:spPr>
           <a:xfrm>
-            <a:off x="7112003" y="1605145"/>
+            <a:off x="8165543" y="1989453"/>
             <a:ext cx="143498" cy="164249"/>
           </a:xfrm>
           <a:prstGeom prst="rect">
@@ -5933,7 +5844,7 @@
         </p:nvSpPr>
         <p:spPr>
           <a:xfrm>
-            <a:off x="6928358" y="1808450"/>
+            <a:off x="7981898" y="2146376"/>
             <a:ext cx="340999" cy="195582"/>
           </a:xfrm>
           <a:prstGeom prst="rect">
@@ -5976,14 +5887,12 @@
           </p:cNvPr>
           <p:cNvCxnSpPr>
             <a:cxnSpLocks/>
-            <a:stCxn id="62" idx="3"/>
-            <a:endCxn id="53" idx="3"/>
           </p:cNvCxnSpPr>
           <p:nvPr/>
         </p:nvCxnSpPr>
         <p:spPr>
           <a:xfrm flipH="1" flipV="1">
-            <a:off x="7255501" y="1687270"/>
+            <a:off x="8302415" y="2071578"/>
             <a:ext cx="13856" cy="218971"/>
           </a:xfrm>
           <a:prstGeom prst="bentConnector3">
@@ -6025,8 +5934,8 @@
         </p:nvSpPr>
         <p:spPr>
           <a:xfrm>
-            <a:off x="7287982" y="1893421"/>
-            <a:ext cx="607145" cy="338554"/>
+            <a:off x="8365057" y="2277729"/>
+            <a:ext cx="523976" cy="338554"/>
           </a:xfrm>
           <a:prstGeom prst="rect">
             <a:avLst/>
@@ -6060,8 +5969,8 @@
         </p:nvSpPr>
         <p:spPr>
           <a:xfrm>
-            <a:off x="7571887" y="1633394"/>
-            <a:ext cx="2956322" cy="369332"/>
+            <a:off x="8559167" y="2017702"/>
+            <a:ext cx="2649187" cy="338554"/>
           </a:xfrm>
           <a:prstGeom prst="rect">
             <a:avLst/>
@@ -6074,11 +5983,11 @@
           <a:lstStyle/>
           <a:p>
             <a:r>
-              <a:rPr lang="en-US" noProof="1"/>
+              <a:rPr lang="en-US" sz="1600" noProof="1"/>
               <a:t>relatedArtifact (</a:t>
             </a:r>
             <a:r>
-              <a:rPr lang="en-US" i="1" noProof="1">
+              <a:rPr lang="en-US" sz="1600" i="1" noProof="1">
                 <a:solidFill>
                   <a:schemeClr val="accent6">
                     <a:lumMod val="75000"/>
@@ -6088,7 +5997,7 @@
               <a:t>IsReplacedBy</a:t>
             </a:r>
             <a:r>
-              <a:rPr lang="en-US" noProof="1"/>
+              <a:rPr lang="en-US" sz="1600" noProof="1"/>
               <a:t>)</a:t>
             </a:r>
           </a:p>
@@ -6108,7 +6017,7 @@
         </p:nvSpPr>
         <p:spPr>
           <a:xfrm>
-            <a:off x="4701632" y="1918695"/>
+            <a:off x="6172610" y="2157231"/>
             <a:ext cx="283614" cy="235165"/>
           </a:xfrm>
           <a:prstGeom prst="rect">
@@ -6142,10 +6051,10 @@
       </p:sp>
       <p:sp>
         <p:nvSpPr>
-          <p:cNvPr id="67" name="Rectangle 66">
-            <a:extLst>
-              <a:ext uri="{FF2B5EF4-FFF2-40B4-BE49-F238E27FC236}">
-                <a16:creationId xmlns:a16="http://schemas.microsoft.com/office/drawing/2014/main" id="{4E2B7AF2-F6C6-4086-A3C5-6ECD0A900716}"/>
+          <p:cNvPr id="56" name="Rectangle 55">
+            <a:extLst>
+              <a:ext uri="{FF2B5EF4-FFF2-40B4-BE49-F238E27FC236}">
+                <a16:creationId xmlns:a16="http://schemas.microsoft.com/office/drawing/2014/main" id="{F6F11366-8458-4112-A323-141BA159FFFC}"/>
               </a:ext>
             </a:extLst>
           </p:cNvPr>
@@ -6154,54 +6063,8 @@
         </p:nvSpPr>
         <p:spPr>
           <a:xfrm>
-            <a:off x="3148351" y="4945929"/>
-            <a:ext cx="283614" cy="235165"/>
-          </a:xfrm>
-          <a:prstGeom prst="rect">
-            <a:avLst/>
-          </a:prstGeom>
-        </p:spPr>
-        <p:style>
-          <a:lnRef idx="2">
-            <a:schemeClr val="accent1">
-              <a:shade val="50000"/>
-            </a:schemeClr>
-          </a:lnRef>
-          <a:fillRef idx="1">
-            <a:schemeClr val="accent1"/>
-          </a:fillRef>
-          <a:effectRef idx="0">
-            <a:schemeClr val="accent1"/>
-          </a:effectRef>
-          <a:fontRef idx="minor">
-            <a:schemeClr val="lt1"/>
-          </a:fontRef>
-        </p:style>
-        <p:txBody>
-          <a:bodyPr rtlCol="0" anchor="ctr"/>
-          <a:lstStyle/>
-          <a:p>
-            <a:pPr algn="ctr"/>
-            <a:endParaRPr lang="fr-FR"/>
-          </a:p>
-        </p:txBody>
-      </p:sp>
-      <p:sp>
-        <p:nvSpPr>
-          <p:cNvPr id="56" name="Rectangle 55">
-            <a:extLst>
-              <a:ext uri="{FF2B5EF4-FFF2-40B4-BE49-F238E27FC236}">
-                <a16:creationId xmlns:a16="http://schemas.microsoft.com/office/drawing/2014/main" id="{F6F11366-8458-4112-A323-141BA159FFFC}"/>
-              </a:ext>
-            </a:extLst>
-          </p:cNvPr>
-          <p:cNvSpPr/>
-          <p:nvPr/>
-        </p:nvSpPr>
-        <p:spPr>
-          <a:xfrm>
-            <a:off x="737087" y="4932679"/>
-            <a:ext cx="2887484" cy="1142774"/>
+            <a:off x="1331843" y="2626533"/>
+            <a:ext cx="2429651" cy="975425"/>
           </a:xfrm>
           <a:prstGeom prst="rect">
             <a:avLst/>
@@ -6264,7 +6127,7 @@
           <a:p>
             <a:pPr algn="ctr"/>
             <a:r>
-              <a:rPr lang="en-US" sz="2200" noProof="1">
+              <a:rPr lang="en-US" noProof="1">
                 <a:solidFill>
                   <a:srgbClr val="FFFF00"/>
                 </a:solidFill>
@@ -6275,7 +6138,7 @@
           <a:p>
             <a:pPr algn="ctr"/>
             <a:r>
-              <a:rPr lang="en-US" sz="2000" noProof="1">
+              <a:rPr lang="en-US" noProof="1">
                 <a:solidFill>
                   <a:schemeClr val="bg1"/>
                 </a:solidFill>
@@ -6295,10 +6158,10 @@
       </p:sp>
       <p:sp>
         <p:nvSpPr>
-          <p:cNvPr id="11" name="Rectangle 10">
-            <a:extLst>
-              <a:ext uri="{FF2B5EF4-FFF2-40B4-BE49-F238E27FC236}">
-                <a16:creationId xmlns:a16="http://schemas.microsoft.com/office/drawing/2014/main" id="{E2B1908B-CC45-41BD-BE20-7F25C0BD8D17}"/>
+          <p:cNvPr id="84" name="Rectangle 83">
+            <a:extLst>
+              <a:ext uri="{FF2B5EF4-FFF2-40B4-BE49-F238E27FC236}">
+                <a16:creationId xmlns:a16="http://schemas.microsoft.com/office/drawing/2014/main" id="{0C6BEAAE-84AD-4EA9-8750-21ACC1178B80}"/>
               </a:ext>
             </a:extLst>
           </p:cNvPr>
@@ -6307,8 +6170,54 @@
         </p:nvSpPr>
         <p:spPr>
           <a:xfrm>
-            <a:off x="4688380" y="1019944"/>
-            <a:ext cx="2593911" cy="1140542"/>
+            <a:off x="6165340" y="1726171"/>
+            <a:ext cx="283614" cy="235165"/>
+          </a:xfrm>
+          <a:prstGeom prst="rect">
+            <a:avLst/>
+          </a:prstGeom>
+        </p:spPr>
+        <p:style>
+          <a:lnRef idx="2">
+            <a:schemeClr val="accent1">
+              <a:shade val="50000"/>
+            </a:schemeClr>
+          </a:lnRef>
+          <a:fillRef idx="1">
+            <a:schemeClr val="accent1"/>
+          </a:fillRef>
+          <a:effectRef idx="0">
+            <a:schemeClr val="accent1"/>
+          </a:effectRef>
+          <a:fontRef idx="minor">
+            <a:schemeClr val="lt1"/>
+          </a:fontRef>
+        </p:style>
+        <p:txBody>
+          <a:bodyPr rtlCol="0" anchor="ctr"/>
+          <a:lstStyle/>
+          <a:p>
+            <a:pPr algn="ctr"/>
+            <a:endParaRPr lang="fr-FR"/>
+          </a:p>
+        </p:txBody>
+      </p:sp>
+      <p:sp>
+        <p:nvSpPr>
+          <p:cNvPr id="11" name="Rectangle 10">
+            <a:extLst>
+              <a:ext uri="{FF2B5EF4-FFF2-40B4-BE49-F238E27FC236}">
+                <a16:creationId xmlns:a16="http://schemas.microsoft.com/office/drawing/2014/main" id="{E2B1908B-CC45-41BD-BE20-7F25C0BD8D17}"/>
+              </a:ext>
+            </a:extLst>
+          </p:cNvPr>
+          <p:cNvSpPr/>
+          <p:nvPr/>
+        </p:nvSpPr>
+        <p:spPr>
+          <a:xfrm>
+            <a:off x="6148058" y="1453669"/>
+            <a:ext cx="2192448" cy="948944"/>
           </a:xfrm>
           <a:prstGeom prst="rect">
             <a:avLst/>
@@ -6371,7 +6280,7 @@
           <a:p>
             <a:pPr algn="ctr"/>
             <a:r>
-              <a:rPr lang="en-US" sz="2200" noProof="1">
+              <a:rPr lang="en-US" noProof="1">
                 <a:solidFill>
                   <a:srgbClr val="FFFF00"/>
                 </a:solidFill>
@@ -6382,7 +6291,7 @@
           <a:p>
             <a:pPr algn="ctr"/>
             <a:r>
-              <a:rPr lang="en-US" sz="2000" noProof="1">
+              <a:rPr lang="en-US" noProof="1">
                 <a:solidFill>
                   <a:schemeClr val="bg1"/>
                 </a:solidFill>
@@ -6400,6 +6309,50 @@
           </a:p>
         </p:txBody>
       </p:sp>
+      <p:cxnSp>
+        <p:nvCxnSpPr>
+          <p:cNvPr id="86" name="Connecteur : en angle 85">
+            <a:extLst>
+              <a:ext uri="{FF2B5EF4-FFF2-40B4-BE49-F238E27FC236}">
+                <a16:creationId xmlns:a16="http://schemas.microsoft.com/office/drawing/2014/main" id="{B5C3B02D-3738-4164-AFEF-95348B20873E}"/>
+              </a:ext>
+            </a:extLst>
+          </p:cNvPr>
+          <p:cNvCxnSpPr>
+            <a:cxnSpLocks/>
+            <a:stCxn id="46" idx="1"/>
+            <a:endCxn id="54" idx="0"/>
+          </p:cNvCxnSpPr>
+          <p:nvPr/>
+        </p:nvCxnSpPr>
+        <p:spPr>
+          <a:xfrm rot="10800000" flipV="1">
+            <a:off x="5391305" y="3852243"/>
+            <a:ext cx="601091" cy="761701"/>
+          </a:xfrm>
+          <a:prstGeom prst="bentConnector2">
+            <a:avLst/>
+          </a:prstGeom>
+          <a:ln w="28575">
+            <a:headEnd type="none" w="med" len="med"/>
+            <a:tailEnd type="arrow" w="med" len="med"/>
+          </a:ln>
+        </p:spPr>
+        <p:style>
+          <a:lnRef idx="1">
+            <a:schemeClr val="accent1"/>
+          </a:lnRef>
+          <a:fillRef idx="0">
+            <a:schemeClr val="accent1"/>
+          </a:fillRef>
+          <a:effectRef idx="0">
+            <a:schemeClr val="accent1"/>
+          </a:effectRef>
+          <a:fontRef idx="minor">
+            <a:schemeClr val="tx1"/>
+          </a:fontRef>
+        </p:style>
+      </p:cxnSp>
     </p:spTree>
     <p:extLst>
       <p:ext uri="{BB962C8B-B14F-4D97-AF65-F5344CB8AC3E}">

</xml_diff>

<commit_message>
Reflex explicitly descibed in the specification page ; narrative of TORCH completed
</commit_message>
<xml_diff>
--- a/input/images-source/LabCompendium.pptx
+++ b/input/images-source/LabCompendium.pptx
@@ -197,7 +197,7 @@
           <a:p>
             <a:fld id="{C0FC2EA5-DDD9-41B5-A743-573E81829967}" type="datetimeFigureOut">
               <a:rPr lang="fr-FR" smtClean="0"/>
-              <a:t>27/06/2020</a:t>
+              <a:t>28/06/2020</a:t>
             </a:fld>
             <a:endParaRPr lang="fr-FR"/>
           </a:p>
@@ -695,7 +695,7 @@
           <a:p>
             <a:fld id="{DEBA1CB3-45B4-4365-8A01-D60AF6EBF46C}" type="datetimeFigureOut">
               <a:rPr lang="fr-FR" smtClean="0"/>
-              <a:t>27/06/2020</a:t>
+              <a:t>28/06/2020</a:t>
             </a:fld>
             <a:endParaRPr lang="fr-FR"/>
           </a:p>
@@ -893,7 +893,7 @@
           <a:p>
             <a:fld id="{DEBA1CB3-45B4-4365-8A01-D60AF6EBF46C}" type="datetimeFigureOut">
               <a:rPr lang="fr-FR" smtClean="0"/>
-              <a:t>27/06/2020</a:t>
+              <a:t>28/06/2020</a:t>
             </a:fld>
             <a:endParaRPr lang="fr-FR"/>
           </a:p>
@@ -1101,7 +1101,7 @@
           <a:p>
             <a:fld id="{DEBA1CB3-45B4-4365-8A01-D60AF6EBF46C}" type="datetimeFigureOut">
               <a:rPr lang="fr-FR" smtClean="0"/>
-              <a:t>27/06/2020</a:t>
+              <a:t>28/06/2020</a:t>
             </a:fld>
             <a:endParaRPr lang="fr-FR"/>
           </a:p>
@@ -1299,7 +1299,7 @@
           <a:p>
             <a:fld id="{DEBA1CB3-45B4-4365-8A01-D60AF6EBF46C}" type="datetimeFigureOut">
               <a:rPr lang="fr-FR" smtClean="0"/>
-              <a:t>27/06/2020</a:t>
+              <a:t>28/06/2020</a:t>
             </a:fld>
             <a:endParaRPr lang="fr-FR"/>
           </a:p>
@@ -1574,7 +1574,7 @@
           <a:p>
             <a:fld id="{DEBA1CB3-45B4-4365-8A01-D60AF6EBF46C}" type="datetimeFigureOut">
               <a:rPr lang="fr-FR" smtClean="0"/>
-              <a:t>27/06/2020</a:t>
+              <a:t>28/06/2020</a:t>
             </a:fld>
             <a:endParaRPr lang="fr-FR"/>
           </a:p>
@@ -1839,7 +1839,7 @@
           <a:p>
             <a:fld id="{DEBA1CB3-45B4-4365-8A01-D60AF6EBF46C}" type="datetimeFigureOut">
               <a:rPr lang="fr-FR" smtClean="0"/>
-              <a:t>27/06/2020</a:t>
+              <a:t>28/06/2020</a:t>
             </a:fld>
             <a:endParaRPr lang="fr-FR"/>
           </a:p>
@@ -2251,7 +2251,7 @@
           <a:p>
             <a:fld id="{DEBA1CB3-45B4-4365-8A01-D60AF6EBF46C}" type="datetimeFigureOut">
               <a:rPr lang="fr-FR" smtClean="0"/>
-              <a:t>27/06/2020</a:t>
+              <a:t>28/06/2020</a:t>
             </a:fld>
             <a:endParaRPr lang="fr-FR"/>
           </a:p>
@@ -2392,7 +2392,7 @@
           <a:p>
             <a:fld id="{DEBA1CB3-45B4-4365-8A01-D60AF6EBF46C}" type="datetimeFigureOut">
               <a:rPr lang="fr-FR" smtClean="0"/>
-              <a:t>27/06/2020</a:t>
+              <a:t>28/06/2020</a:t>
             </a:fld>
             <a:endParaRPr lang="fr-FR"/>
           </a:p>
@@ -2505,7 +2505,7 @@
           <a:p>
             <a:fld id="{DEBA1CB3-45B4-4365-8A01-D60AF6EBF46C}" type="datetimeFigureOut">
               <a:rPr lang="fr-FR" smtClean="0"/>
-              <a:t>27/06/2020</a:t>
+              <a:t>28/06/2020</a:t>
             </a:fld>
             <a:endParaRPr lang="fr-FR"/>
           </a:p>
@@ -2816,7 +2816,7 @@
           <a:p>
             <a:fld id="{DEBA1CB3-45B4-4365-8A01-D60AF6EBF46C}" type="datetimeFigureOut">
               <a:rPr lang="fr-FR" smtClean="0"/>
-              <a:t>27/06/2020</a:t>
+              <a:t>28/06/2020</a:t>
             </a:fld>
             <a:endParaRPr lang="fr-FR"/>
           </a:p>
@@ -3104,7 +3104,7 @@
           <a:p>
             <a:fld id="{DEBA1CB3-45B4-4365-8A01-D60AF6EBF46C}" type="datetimeFigureOut">
               <a:rPr lang="fr-FR" smtClean="0"/>
-              <a:t>27/06/2020</a:t>
+              <a:t>28/06/2020</a:t>
             </a:fld>
             <a:endParaRPr lang="fr-FR"/>
           </a:p>
@@ -3345,7 +3345,7 @@
           <a:p>
             <a:fld id="{DEBA1CB3-45B4-4365-8A01-D60AF6EBF46C}" type="datetimeFigureOut">
               <a:rPr lang="fr-FR" smtClean="0"/>
-              <a:t>27/06/2020</a:t>
+              <a:t>28/06/2020</a:t>
             </a:fld>
             <a:endParaRPr lang="fr-FR"/>
           </a:p>
@@ -3908,7 +3908,7 @@
         <p:spPr>
           <a:xfrm rot="16200000" flipV="1">
             <a:off x="5084007" y="-706606"/>
-            <a:ext cx="846507" cy="3474044"/>
+            <a:ext cx="846507" cy="3474043"/>
           </a:xfrm>
           <a:prstGeom prst="bentConnector2">
             <a:avLst/>
@@ -4085,9 +4085,9 @@
           <p:nvPr/>
         </p:nvCxnSpPr>
         <p:spPr>
-          <a:xfrm rot="5400000">
-            <a:off x="6746456" y="2900439"/>
-            <a:ext cx="995653" cy="1"/>
+          <a:xfrm rot="16200000" flipH="1">
+            <a:off x="6747508" y="2899385"/>
+            <a:ext cx="995653" cy="2107"/>
           </a:xfrm>
           <a:prstGeom prst="bentConnector3">
             <a:avLst>
@@ -4128,8 +4128,8 @@
         </p:nvSpPr>
         <p:spPr>
           <a:xfrm>
-            <a:off x="5992395" y="3398266"/>
-            <a:ext cx="2503772" cy="907956"/>
+            <a:off x="5996609" y="3398266"/>
+            <a:ext cx="2499558" cy="907956"/>
           </a:xfrm>
           <a:prstGeom prst="rect">
             <a:avLst/>
@@ -4305,7 +4305,7 @@
         </p:nvSpPr>
         <p:spPr>
           <a:xfrm>
-            <a:off x="4015972" y="4613945"/>
+            <a:off x="3830444" y="4613945"/>
             <a:ext cx="2750664" cy="929390"/>
           </a:xfrm>
           <a:prstGeom prst="rect">
@@ -4412,7 +4412,7 @@
         </p:nvSpPr>
         <p:spPr>
           <a:xfrm>
-            <a:off x="7638378" y="4619903"/>
+            <a:off x="7910044" y="4619903"/>
             <a:ext cx="2744710" cy="917620"/>
           </a:xfrm>
           <a:prstGeom prst="rect">
@@ -4570,7 +4570,7 @@
         <p:spPr>
           <a:xfrm>
             <a:off x="8496167" y="3852244"/>
-            <a:ext cx="514566" cy="767659"/>
+            <a:ext cx="786232" cy="767659"/>
           </a:xfrm>
           <a:prstGeom prst="bentConnector2">
             <a:avLst/>
@@ -4714,7 +4714,7 @@
         </p:nvSpPr>
         <p:spPr>
           <a:xfrm>
-            <a:off x="4950795" y="4229779"/>
+            <a:off x="4765267" y="4229779"/>
             <a:ext cx="607145" cy="338554"/>
           </a:xfrm>
           <a:prstGeom prst="rect">
@@ -4749,7 +4749,7 @@
         </p:nvSpPr>
         <p:spPr>
           <a:xfrm>
-            <a:off x="8543564" y="4231240"/>
+            <a:off x="8815230" y="4231240"/>
             <a:ext cx="607145" cy="338554"/>
           </a:xfrm>
           <a:prstGeom prst="rect">
@@ -5010,7 +5010,7 @@
         </p:nvSpPr>
         <p:spPr>
           <a:xfrm>
-            <a:off x="2438401" y="4439682"/>
+            <a:off x="2252873" y="4439682"/>
             <a:ext cx="1506979" cy="1200329"/>
           </a:xfrm>
           <a:prstGeom prst="rect">
@@ -5060,7 +5060,7 @@
         </p:nvSpPr>
         <p:spPr>
           <a:xfrm>
-            <a:off x="10458939" y="4439682"/>
+            <a:off x="10730605" y="4439682"/>
             <a:ext cx="1315620" cy="1200329"/>
           </a:xfrm>
           <a:prstGeom prst="rect">
@@ -5109,7 +5109,7 @@
         </p:nvSpPr>
         <p:spPr>
           <a:xfrm>
-            <a:off x="6543117" y="5994039"/>
+            <a:off x="6410425" y="6166315"/>
             <a:ext cx="1667712" cy="476672"/>
           </a:xfrm>
           <a:prstGeom prst="rect">
@@ -5201,8 +5201,8 @@
         </p:nvCxnSpPr>
         <p:spPr>
           <a:xfrm rot="16200000" flipH="1">
-            <a:off x="5622690" y="5311948"/>
-            <a:ext cx="689040" cy="1151813"/>
+            <a:off x="5377442" y="5371668"/>
+            <a:ext cx="861316" cy="1204649"/>
           </a:xfrm>
           <a:prstGeom prst="bentConnector2">
             <a:avLst/>
@@ -5245,8 +5245,8 @@
         </p:nvCxnSpPr>
         <p:spPr>
           <a:xfrm rot="5400000">
-            <a:off x="8263355" y="5484997"/>
-            <a:ext cx="694852" cy="799904"/>
+            <a:off x="8246704" y="5368956"/>
+            <a:ext cx="867128" cy="1204262"/>
           </a:xfrm>
           <a:prstGeom prst="bentConnector2">
             <a:avLst/>
@@ -5285,7 +5285,7 @@
         </p:nvSpPr>
         <p:spPr>
           <a:xfrm>
-            <a:off x="5991646" y="6182266"/>
+            <a:off x="5918760" y="6354542"/>
             <a:ext cx="607145" cy="338554"/>
           </a:xfrm>
           <a:prstGeom prst="rect">
@@ -5320,7 +5320,7 @@
         </p:nvSpPr>
         <p:spPr>
           <a:xfrm>
-            <a:off x="8273129" y="6185993"/>
+            <a:off x="8200243" y="6358269"/>
             <a:ext cx="607145" cy="338554"/>
           </a:xfrm>
           <a:prstGeom prst="rect">
@@ -5621,7 +5621,7 @@
         </p:nvSpPr>
         <p:spPr>
           <a:xfrm>
-            <a:off x="5432697" y="6483963"/>
+            <a:off x="5282271" y="5743313"/>
             <a:ext cx="3938309" cy="369332"/>
           </a:xfrm>
           <a:prstGeom prst="rect">
@@ -6216,7 +6216,7 @@
         </p:nvSpPr>
         <p:spPr>
           <a:xfrm>
-            <a:off x="6148058" y="1453669"/>
+            <a:off x="6148057" y="1453669"/>
             <a:ext cx="2192448" cy="948944"/>
           </a:xfrm>
           <a:prstGeom prst="rect">
@@ -6327,8 +6327,8 @@
         </p:nvCxnSpPr>
         <p:spPr>
           <a:xfrm rot="10800000" flipV="1">
-            <a:off x="5391305" y="3852243"/>
-            <a:ext cx="601091" cy="761701"/>
+            <a:off x="5205777" y="3852243"/>
+            <a:ext cx="790833" cy="761701"/>
           </a:xfrm>
           <a:prstGeom prst="bentConnector2">
             <a:avLst/>

</xml_diff>

<commit_message>
Catalog administration interactions documented
</commit_message>
<xml_diff>
--- a/input/images-source/LabCompendium.pptx
+++ b/input/images-source/LabCompendium.pptx
@@ -197,7 +197,7 @@
           <a:p>
             <a:fld id="{C0FC2EA5-DDD9-41B5-A743-573E81829967}" type="datetimeFigureOut">
               <a:rPr lang="fr-FR" smtClean="0"/>
-              <a:t>28/06/2020</a:t>
+              <a:t>09/07/2020</a:t>
             </a:fld>
             <a:endParaRPr lang="fr-FR"/>
           </a:p>
@@ -695,7 +695,7 @@
           <a:p>
             <a:fld id="{DEBA1CB3-45B4-4365-8A01-D60AF6EBF46C}" type="datetimeFigureOut">
               <a:rPr lang="fr-FR" smtClean="0"/>
-              <a:t>28/06/2020</a:t>
+              <a:t>09/07/2020</a:t>
             </a:fld>
             <a:endParaRPr lang="fr-FR"/>
           </a:p>
@@ -893,7 +893,7 @@
           <a:p>
             <a:fld id="{DEBA1CB3-45B4-4365-8A01-D60AF6EBF46C}" type="datetimeFigureOut">
               <a:rPr lang="fr-FR" smtClean="0"/>
-              <a:t>28/06/2020</a:t>
+              <a:t>09/07/2020</a:t>
             </a:fld>
             <a:endParaRPr lang="fr-FR"/>
           </a:p>
@@ -1101,7 +1101,7 @@
           <a:p>
             <a:fld id="{DEBA1CB3-45B4-4365-8A01-D60AF6EBF46C}" type="datetimeFigureOut">
               <a:rPr lang="fr-FR" smtClean="0"/>
-              <a:t>28/06/2020</a:t>
+              <a:t>09/07/2020</a:t>
             </a:fld>
             <a:endParaRPr lang="fr-FR"/>
           </a:p>
@@ -1299,7 +1299,7 @@
           <a:p>
             <a:fld id="{DEBA1CB3-45B4-4365-8A01-D60AF6EBF46C}" type="datetimeFigureOut">
               <a:rPr lang="fr-FR" smtClean="0"/>
-              <a:t>28/06/2020</a:t>
+              <a:t>09/07/2020</a:t>
             </a:fld>
             <a:endParaRPr lang="fr-FR"/>
           </a:p>
@@ -1574,7 +1574,7 @@
           <a:p>
             <a:fld id="{DEBA1CB3-45B4-4365-8A01-D60AF6EBF46C}" type="datetimeFigureOut">
               <a:rPr lang="fr-FR" smtClean="0"/>
-              <a:t>28/06/2020</a:t>
+              <a:t>09/07/2020</a:t>
             </a:fld>
             <a:endParaRPr lang="fr-FR"/>
           </a:p>
@@ -1839,7 +1839,7 @@
           <a:p>
             <a:fld id="{DEBA1CB3-45B4-4365-8A01-D60AF6EBF46C}" type="datetimeFigureOut">
               <a:rPr lang="fr-FR" smtClean="0"/>
-              <a:t>28/06/2020</a:t>
+              <a:t>09/07/2020</a:t>
             </a:fld>
             <a:endParaRPr lang="fr-FR"/>
           </a:p>
@@ -2251,7 +2251,7 @@
           <a:p>
             <a:fld id="{DEBA1CB3-45B4-4365-8A01-D60AF6EBF46C}" type="datetimeFigureOut">
               <a:rPr lang="fr-FR" smtClean="0"/>
-              <a:t>28/06/2020</a:t>
+              <a:t>09/07/2020</a:t>
             </a:fld>
             <a:endParaRPr lang="fr-FR"/>
           </a:p>
@@ -2392,7 +2392,7 @@
           <a:p>
             <a:fld id="{DEBA1CB3-45B4-4365-8A01-D60AF6EBF46C}" type="datetimeFigureOut">
               <a:rPr lang="fr-FR" smtClean="0"/>
-              <a:t>28/06/2020</a:t>
+              <a:t>09/07/2020</a:t>
             </a:fld>
             <a:endParaRPr lang="fr-FR"/>
           </a:p>
@@ -2505,7 +2505,7 @@
           <a:p>
             <a:fld id="{DEBA1CB3-45B4-4365-8A01-D60AF6EBF46C}" type="datetimeFigureOut">
               <a:rPr lang="fr-FR" smtClean="0"/>
-              <a:t>28/06/2020</a:t>
+              <a:t>09/07/2020</a:t>
             </a:fld>
             <a:endParaRPr lang="fr-FR"/>
           </a:p>
@@ -2816,7 +2816,7 @@
           <a:p>
             <a:fld id="{DEBA1CB3-45B4-4365-8A01-D60AF6EBF46C}" type="datetimeFigureOut">
               <a:rPr lang="fr-FR" smtClean="0"/>
-              <a:t>28/06/2020</a:t>
+              <a:t>09/07/2020</a:t>
             </a:fld>
             <a:endParaRPr lang="fr-FR"/>
           </a:p>
@@ -3104,7 +3104,7 @@
           <a:p>
             <a:fld id="{DEBA1CB3-45B4-4365-8A01-D60AF6EBF46C}" type="datetimeFigureOut">
               <a:rPr lang="fr-FR" smtClean="0"/>
-              <a:t>28/06/2020</a:t>
+              <a:t>09/07/2020</a:t>
             </a:fld>
             <a:endParaRPr lang="fr-FR"/>
           </a:p>
@@ -3345,7 +3345,7 @@
           <a:p>
             <a:fld id="{DEBA1CB3-45B4-4365-8A01-D60AF6EBF46C}" type="datetimeFigureOut">
               <a:rPr lang="fr-FR" smtClean="0"/>
-              <a:t>28/06/2020</a:t>
+              <a:t>09/07/2020</a:t>
             </a:fld>
             <a:endParaRPr lang="fr-FR"/>
           </a:p>
@@ -3764,10 +3764,10 @@
       </p:grpSpPr>
       <p:sp>
         <p:nvSpPr>
-          <p:cNvPr id="8" name="Rectangle 7">
-            <a:extLst>
-              <a:ext uri="{FF2B5EF4-FFF2-40B4-BE49-F238E27FC236}">
-                <a16:creationId xmlns:a16="http://schemas.microsoft.com/office/drawing/2014/main" id="{CEEC58EF-7E7F-4AD1-BF5F-F726576E3AEA}"/>
+          <p:cNvPr id="60" name="Rectangle 59">
+            <a:extLst>
+              <a:ext uri="{FF2B5EF4-FFF2-40B4-BE49-F238E27FC236}">
+                <a16:creationId xmlns:a16="http://schemas.microsoft.com/office/drawing/2014/main" id="{B80DA291-B4AD-437B-875D-FF5B2108348A}"/>
               </a:ext>
             </a:extLst>
           </p:cNvPr>
@@ -3776,8 +3776,8 @@
         </p:nvSpPr>
         <p:spPr>
           <a:xfrm>
-            <a:off x="8165541" y="1459371"/>
-            <a:ext cx="143498" cy="164249"/>
+            <a:off x="6163081" y="1395360"/>
+            <a:ext cx="283614" cy="206038"/>
           </a:xfrm>
           <a:prstGeom prst="rect">
             <a:avLst/>
@@ -3810,10 +3810,10 @@
       </p:sp>
       <p:sp>
         <p:nvSpPr>
-          <p:cNvPr id="58" name="Rectangle 57">
-            <a:extLst>
-              <a:ext uri="{FF2B5EF4-FFF2-40B4-BE49-F238E27FC236}">
-                <a16:creationId xmlns:a16="http://schemas.microsoft.com/office/drawing/2014/main" id="{539DD055-8EF1-46D5-A759-909838B13B59}"/>
+          <p:cNvPr id="8" name="Rectangle 7">
+            <a:extLst>
+              <a:ext uri="{FF2B5EF4-FFF2-40B4-BE49-F238E27FC236}">
+                <a16:creationId xmlns:a16="http://schemas.microsoft.com/office/drawing/2014/main" id="{CEEC58EF-7E7F-4AD1-BF5F-F726576E3AEA}"/>
               </a:ext>
             </a:extLst>
           </p:cNvPr>
@@ -3822,8 +3822,8 @@
         </p:nvSpPr>
         <p:spPr>
           <a:xfrm>
-            <a:off x="7988206" y="1655998"/>
-            <a:ext cx="340999" cy="288748"/>
+            <a:off x="8165541" y="1386485"/>
+            <a:ext cx="143498" cy="164249"/>
           </a:xfrm>
           <a:prstGeom prst="rect">
             <a:avLst/>
@@ -3856,6 +3856,52 @@
       </p:sp>
       <p:sp>
         <p:nvSpPr>
+          <p:cNvPr id="58" name="Rectangle 57">
+            <a:extLst>
+              <a:ext uri="{FF2B5EF4-FFF2-40B4-BE49-F238E27FC236}">
+                <a16:creationId xmlns:a16="http://schemas.microsoft.com/office/drawing/2014/main" id="{539DD055-8EF1-46D5-A759-909838B13B59}"/>
+              </a:ext>
+            </a:extLst>
+          </p:cNvPr>
+          <p:cNvSpPr/>
+          <p:nvPr/>
+        </p:nvSpPr>
+        <p:spPr>
+          <a:xfrm>
+            <a:off x="7988206" y="1583112"/>
+            <a:ext cx="340999" cy="288748"/>
+          </a:xfrm>
+          <a:prstGeom prst="rect">
+            <a:avLst/>
+          </a:prstGeom>
+        </p:spPr>
+        <p:style>
+          <a:lnRef idx="2">
+            <a:schemeClr val="accent1">
+              <a:shade val="50000"/>
+            </a:schemeClr>
+          </a:lnRef>
+          <a:fillRef idx="1">
+            <a:schemeClr val="accent1"/>
+          </a:fillRef>
+          <a:effectRef idx="0">
+            <a:schemeClr val="accent1"/>
+          </a:effectRef>
+          <a:fontRef idx="minor">
+            <a:schemeClr val="lt1"/>
+          </a:fontRef>
+        </p:style>
+        <p:txBody>
+          <a:bodyPr rtlCol="0" anchor="ctr"/>
+          <a:lstStyle/>
+          <a:p>
+            <a:pPr algn="ctr"/>
+            <a:endParaRPr lang="fr-FR"/>
+          </a:p>
+        </p:txBody>
+      </p:sp>
+      <p:sp>
+        <p:nvSpPr>
           <p:cNvPr id="9" name="ZoneTexte 8">
             <a:extLst>
               <a:ext uri="{FF2B5EF4-FFF2-40B4-BE49-F238E27FC236}">
@@ -3868,7 +3914,7 @@
         </p:nvSpPr>
         <p:spPr>
           <a:xfrm>
-            <a:off x="3780195" y="601868"/>
+            <a:off x="3907417" y="601868"/>
             <a:ext cx="607145" cy="338554"/>
           </a:xfrm>
           <a:prstGeom prst="rect">
@@ -3900,18 +3946,20 @@
           </p:cNvPr>
           <p:cNvCxnSpPr>
             <a:cxnSpLocks/>
-            <a:stCxn id="11" idx="0"/>
+            <a:stCxn id="60" idx="1"/>
             <a:endCxn id="20" idx="3"/>
           </p:cNvCxnSpPr>
           <p:nvPr/>
         </p:nvCxnSpPr>
         <p:spPr>
-          <a:xfrm rot="16200000" flipV="1">
-            <a:off x="5084007" y="-706606"/>
-            <a:ext cx="846507" cy="3474043"/>
-          </a:xfrm>
-          <a:prstGeom prst="bentConnector2">
-            <a:avLst/>
+          <a:xfrm rot="10800000">
+            <a:off x="3897461" y="607163"/>
+            <a:ext cx="2265621" cy="891217"/>
+          </a:xfrm>
+          <a:prstGeom prst="bentConnector3">
+            <a:avLst>
+              <a:gd name="adj1" fmla="val 50000"/>
+            </a:avLst>
           </a:prstGeom>
           <a:ln w="28575">
             <a:headEnd type="none" w="med" len="med"/>
@@ -3947,8 +3995,8 @@
         </p:nvSpPr>
         <p:spPr>
           <a:xfrm>
-            <a:off x="1894230" y="154094"/>
-            <a:ext cx="1876008" cy="906135"/>
+            <a:off x="1297711" y="154094"/>
+            <a:ext cx="2599749" cy="906135"/>
           </a:xfrm>
           <a:prstGeom prst="rect">
             <a:avLst/>
@@ -4047,7 +4095,7 @@
         </p:nvSpPr>
         <p:spPr>
           <a:xfrm>
-            <a:off x="5646246" y="285916"/>
+            <a:off x="4269417" y="1206883"/>
             <a:ext cx="1740711" cy="338554"/>
           </a:xfrm>
           <a:prstGeom prst="rect">
@@ -4086,8 +4134,8 @@
         </p:nvCxnSpPr>
         <p:spPr>
           <a:xfrm rot="16200000" flipH="1">
-            <a:off x="6747508" y="2899385"/>
-            <a:ext cx="995653" cy="2107"/>
+            <a:off x="6711065" y="2862942"/>
+            <a:ext cx="1068539" cy="2107"/>
           </a:xfrm>
           <a:prstGeom prst="bentConnector3">
             <a:avLst>
@@ -4305,7 +4353,7 @@
         </p:nvSpPr>
         <p:spPr>
           <a:xfrm>
-            <a:off x="3830444" y="4613945"/>
+            <a:off x="3830444" y="4685504"/>
             <a:ext cx="2750664" cy="929390"/>
           </a:xfrm>
           <a:prstGeom prst="rect">
@@ -4412,7 +4460,7 @@
         </p:nvSpPr>
         <p:spPr>
           <a:xfrm>
-            <a:off x="7910044" y="4619903"/>
+            <a:off x="7910044" y="4691462"/>
             <a:ext cx="2744710" cy="917620"/>
           </a:xfrm>
           <a:prstGeom prst="rect">
@@ -4523,8 +4571,8 @@
         </p:nvCxnSpPr>
         <p:spPr>
           <a:xfrm rot="10800000" flipV="1">
-            <a:off x="3761494" y="2274814"/>
-            <a:ext cx="2411116" cy="839432"/>
+            <a:off x="3888716" y="2201928"/>
+            <a:ext cx="2283894" cy="912318"/>
           </a:xfrm>
           <a:prstGeom prst="bentConnector3">
             <a:avLst>
@@ -4570,7 +4618,7 @@
         <p:spPr>
           <a:xfrm>
             <a:off x="8496167" y="3852244"/>
-            <a:ext cx="786232" cy="767659"/>
+            <a:ext cx="786232" cy="839218"/>
           </a:xfrm>
           <a:prstGeom prst="bentConnector2">
             <a:avLst/>
@@ -4609,7 +4657,7 @@
         </p:nvSpPr>
         <p:spPr>
           <a:xfrm>
-            <a:off x="4288328" y="1933631"/>
+            <a:off x="4269417" y="1907127"/>
             <a:ext cx="1987886" cy="338554"/>
           </a:xfrm>
           <a:prstGeom prst="rect">
@@ -4644,7 +4692,7 @@
         </p:nvSpPr>
         <p:spPr>
           <a:xfrm>
-            <a:off x="3806451" y="3078451"/>
+            <a:off x="3933673" y="3078451"/>
             <a:ext cx="607145" cy="338554"/>
           </a:xfrm>
           <a:prstGeom prst="rect">
@@ -4679,7 +4727,7 @@
         </p:nvSpPr>
         <p:spPr>
           <a:xfrm>
-            <a:off x="3780195" y="3550372"/>
+            <a:off x="2942894" y="3775095"/>
             <a:ext cx="2339634" cy="338554"/>
           </a:xfrm>
           <a:prstGeom prst="rect">
@@ -4714,7 +4762,7 @@
         </p:nvSpPr>
         <p:spPr>
           <a:xfrm>
-            <a:off x="4765267" y="4229779"/>
+            <a:off x="4765267" y="4301338"/>
             <a:ext cx="607145" cy="338554"/>
           </a:xfrm>
           <a:prstGeom prst="rect">
@@ -4749,7 +4797,7 @@
         </p:nvSpPr>
         <p:spPr>
           <a:xfrm>
-            <a:off x="8815230" y="4231240"/>
+            <a:off x="8815230" y="4302799"/>
             <a:ext cx="607145" cy="338554"/>
           </a:xfrm>
           <a:prstGeom prst="rect">
@@ -4784,8 +4832,8 @@
         </p:nvSpPr>
         <p:spPr>
           <a:xfrm>
-            <a:off x="8496167" y="3503065"/>
-            <a:ext cx="3111179" cy="338554"/>
+            <a:off x="9282399" y="3753078"/>
+            <a:ext cx="2826490" cy="338554"/>
           </a:xfrm>
           <a:prstGeom prst="rect">
             <a:avLst/>
@@ -4819,8 +4867,8 @@
         </p:nvSpPr>
         <p:spPr>
           <a:xfrm>
-            <a:off x="316157" y="231960"/>
-            <a:ext cx="1540369" cy="646331"/>
+            <a:off x="-87459" y="231960"/>
+            <a:ext cx="1411253" cy="646331"/>
           </a:xfrm>
           <a:prstGeom prst="rect">
             <a:avLst/>
@@ -4862,8 +4910,8 @@
         </p:nvSpPr>
         <p:spPr>
           <a:xfrm>
-            <a:off x="7621432" y="397982"/>
-            <a:ext cx="2614709" cy="923330"/>
+            <a:off x="6010128" y="906203"/>
+            <a:ext cx="6043942" cy="369332"/>
           </a:xfrm>
           <a:prstGeom prst="rect">
             <a:avLst/>
@@ -4960,7 +5008,7 @@
         </p:nvSpPr>
         <p:spPr>
           <a:xfrm>
-            <a:off x="-80" y="2630056"/>
+            <a:off x="-47784" y="2630056"/>
             <a:ext cx="1255065" cy="923330"/>
           </a:xfrm>
           <a:prstGeom prst="rect">
@@ -5010,7 +5058,7 @@
         </p:nvSpPr>
         <p:spPr>
           <a:xfrm>
-            <a:off x="2252873" y="4439682"/>
+            <a:off x="2252873" y="4511241"/>
             <a:ext cx="1506979" cy="1200329"/>
           </a:xfrm>
           <a:prstGeom prst="rect">
@@ -5060,7 +5108,7 @@
         </p:nvSpPr>
         <p:spPr>
           <a:xfrm>
-            <a:off x="10730605" y="4439682"/>
+            <a:off x="10730605" y="4511241"/>
             <a:ext cx="1315620" cy="1200329"/>
           </a:xfrm>
           <a:prstGeom prst="rect">
@@ -5109,8 +5157,8 @@
         </p:nvSpPr>
         <p:spPr>
           <a:xfrm>
-            <a:off x="6410425" y="6166315"/>
-            <a:ext cx="1667712" cy="476672"/>
+            <a:off x="6410425" y="6126559"/>
+            <a:ext cx="1667712" cy="632050"/>
           </a:xfrm>
           <a:prstGeom prst="rect">
             <a:avLst/>
@@ -5201,8 +5249,8 @@
         </p:nvCxnSpPr>
         <p:spPr>
           <a:xfrm rot="16200000" flipH="1">
-            <a:off x="5377442" y="5371668"/>
-            <a:ext cx="861316" cy="1204649"/>
+            <a:off x="5394255" y="5426414"/>
+            <a:ext cx="827690" cy="1204649"/>
           </a:xfrm>
           <a:prstGeom prst="bentConnector2">
             <a:avLst/>
@@ -5245,8 +5293,8 @@
         </p:nvCxnSpPr>
         <p:spPr>
           <a:xfrm rot="5400000">
-            <a:off x="8246704" y="5368956"/>
-            <a:ext cx="867128" cy="1204262"/>
+            <a:off x="8263517" y="5423702"/>
+            <a:ext cx="833502" cy="1204262"/>
           </a:xfrm>
           <a:prstGeom prst="bentConnector2">
             <a:avLst/>
@@ -5285,7 +5333,7 @@
         </p:nvSpPr>
         <p:spPr>
           <a:xfrm>
-            <a:off x="5918760" y="6354542"/>
+            <a:off x="5872378" y="6374420"/>
             <a:ext cx="607145" cy="338554"/>
           </a:xfrm>
           <a:prstGeom prst="rect">
@@ -5320,7 +5368,7 @@
         </p:nvSpPr>
         <p:spPr>
           <a:xfrm>
-            <a:off x="8200243" y="6358269"/>
+            <a:off x="8153861" y="6378147"/>
             <a:ext cx="607145" cy="338554"/>
           </a:xfrm>
           <a:prstGeom prst="rect">
@@ -5355,7 +5403,7 @@
         </p:nvSpPr>
         <p:spPr>
           <a:xfrm>
-            <a:off x="1170489" y="1347636"/>
+            <a:off x="1297711" y="1347636"/>
             <a:ext cx="2621259" cy="989630"/>
           </a:xfrm>
           <a:prstGeom prst="rect">
@@ -5466,8 +5514,8 @@
         </p:nvCxnSpPr>
         <p:spPr>
           <a:xfrm rot="10800000">
-            <a:off x="3791748" y="1842452"/>
-            <a:ext cx="2373592" cy="1303"/>
+            <a:off x="3918970" y="1842452"/>
+            <a:ext cx="2246370" cy="1303"/>
           </a:xfrm>
           <a:prstGeom prst="bentConnector3">
             <a:avLst>
@@ -5508,7 +5556,7 @@
         </p:nvSpPr>
         <p:spPr>
           <a:xfrm>
-            <a:off x="3757192" y="1973824"/>
+            <a:off x="3884414" y="1973824"/>
             <a:ext cx="607145" cy="338554"/>
           </a:xfrm>
           <a:prstGeom prst="rect">
@@ -5543,7 +5591,7 @@
         </p:nvSpPr>
         <p:spPr>
           <a:xfrm>
-            <a:off x="4364337" y="1505287"/>
+            <a:off x="4269417" y="1538417"/>
             <a:ext cx="1730265" cy="338554"/>
           </a:xfrm>
           <a:prstGeom prst="rect">
@@ -5578,7 +5626,7 @@
         </p:nvSpPr>
         <p:spPr>
           <a:xfrm>
-            <a:off x="-1" y="1371837"/>
+            <a:off x="-47705" y="1371837"/>
             <a:ext cx="1098565" cy="923330"/>
           </a:xfrm>
           <a:prstGeom prst="rect">
@@ -5621,7 +5669,7 @@
         </p:nvSpPr>
         <p:spPr>
           <a:xfrm>
-            <a:off x="5282271" y="5743313"/>
+            <a:off x="5282271" y="5719460"/>
             <a:ext cx="3938309" cy="369332"/>
           </a:xfrm>
           <a:prstGeom prst="rect">
@@ -5673,7 +5721,7 @@
         </p:nvCxnSpPr>
         <p:spPr>
           <a:xfrm flipH="1" flipV="1">
-            <a:off x="8302413" y="1541496"/>
+            <a:off x="8302413" y="1468610"/>
             <a:ext cx="20166" cy="234943"/>
           </a:xfrm>
           <a:prstGeom prst="bentConnector3">
@@ -5715,7 +5763,7 @@
         </p:nvSpPr>
         <p:spPr>
           <a:xfrm>
-            <a:off x="8365057" y="1714517"/>
+            <a:off x="8365057" y="1641631"/>
             <a:ext cx="563730" cy="338554"/>
           </a:xfrm>
           <a:prstGeom prst="rect">
@@ -5750,7 +5798,7 @@
         </p:nvSpPr>
         <p:spPr>
           <a:xfrm>
-            <a:off x="8570910" y="1474301"/>
+            <a:off x="8570910" y="1401415"/>
             <a:ext cx="2243306" cy="338554"/>
           </a:xfrm>
           <a:prstGeom prst="rect">
@@ -5798,7 +5846,7 @@
         </p:nvSpPr>
         <p:spPr>
           <a:xfrm>
-            <a:off x="8165543" y="1989453"/>
+            <a:off x="8165543" y="1916567"/>
             <a:ext cx="143498" cy="164249"/>
           </a:xfrm>
           <a:prstGeom prst="rect">
@@ -5844,7 +5892,7 @@
         </p:nvSpPr>
         <p:spPr>
           <a:xfrm>
-            <a:off x="7981898" y="2146376"/>
+            <a:off x="7981898" y="2073490"/>
             <a:ext cx="340999" cy="195582"/>
           </a:xfrm>
           <a:prstGeom prst="rect">
@@ -5892,7 +5940,7 @@
         </p:nvCxnSpPr>
         <p:spPr>
           <a:xfrm flipH="1" flipV="1">
-            <a:off x="8302415" y="2071578"/>
+            <a:off x="8302415" y="1998692"/>
             <a:ext cx="13856" cy="218971"/>
           </a:xfrm>
           <a:prstGeom prst="bentConnector3">
@@ -5934,7 +5982,7 @@
         </p:nvSpPr>
         <p:spPr>
           <a:xfrm>
-            <a:off x="8365057" y="2277729"/>
+            <a:off x="8365057" y="2204843"/>
             <a:ext cx="523976" cy="338554"/>
           </a:xfrm>
           <a:prstGeom prst="rect">
@@ -5969,7 +6017,7 @@
         </p:nvSpPr>
         <p:spPr>
           <a:xfrm>
-            <a:off x="8559167" y="2017702"/>
+            <a:off x="8559167" y="1944816"/>
             <a:ext cx="2649187" cy="338554"/>
           </a:xfrm>
           <a:prstGeom prst="rect">
@@ -6017,7 +6065,7 @@
         </p:nvSpPr>
         <p:spPr>
           <a:xfrm>
-            <a:off x="6172610" y="2157231"/>
+            <a:off x="6172610" y="2084345"/>
             <a:ext cx="283614" cy="235165"/>
           </a:xfrm>
           <a:prstGeom prst="rect">
@@ -6063,8 +6111,8 @@
         </p:nvSpPr>
         <p:spPr>
           <a:xfrm>
-            <a:off x="1331843" y="2626533"/>
-            <a:ext cx="2429651" cy="975425"/>
+            <a:off x="1297711" y="2626533"/>
+            <a:ext cx="2591005" cy="975425"/>
           </a:xfrm>
           <a:prstGeom prst="rect">
             <a:avLst/>
@@ -6216,7 +6264,7 @@
         </p:nvSpPr>
         <p:spPr>
           <a:xfrm>
-            <a:off x="6148057" y="1453669"/>
+            <a:off x="6148057" y="1380783"/>
             <a:ext cx="2192448" cy="948944"/>
           </a:xfrm>
           <a:prstGeom prst="rect">
@@ -6327,8 +6375,8 @@
         </p:nvCxnSpPr>
         <p:spPr>
           <a:xfrm rot="10800000" flipV="1">
-            <a:off x="5205777" y="3852243"/>
-            <a:ext cx="790833" cy="761701"/>
+            <a:off x="5205777" y="3852244"/>
+            <a:ext cx="790833" cy="833260"/>
           </a:xfrm>
           <a:prstGeom prst="bentConnector2">
             <a:avLst/>

</xml_diff>

<commit_message>
Finalized specification page for lab catalogs
</commit_message>
<xml_diff>
--- a/input/images-source/LabCompendium.pptx
+++ b/input/images-source/LabCompendium.pptx
@@ -3961,7 +3961,7 @@
               <a:gd name="adj1" fmla="val 50000"/>
             </a:avLst>
           </a:prstGeom>
-          <a:ln w="28575">
+          <a:ln w="19050">
             <a:headEnd type="none" w="med" len="med"/>
             <a:tailEnd type="arrow" w="med" len="med"/>
           </a:ln>
@@ -4110,7 +4110,14 @@
           <a:lstStyle/>
           <a:p>
             <a:r>
-              <a:rPr lang="en-US" sz="1600" noProof="1"/>
+              <a:rPr lang="en-US" sz="1600" noProof="1">
+                <a:solidFill>
+                  <a:schemeClr val="tx1">
+                    <a:lumMod val="50000"/>
+                    <a:lumOff val="50000"/>
+                  </a:schemeClr>
+                </a:solidFill>
+              </a:rPr>
               <a:t>catalogReference</a:t>
             </a:r>
           </a:p>
@@ -4142,7 +4149,7 @@
               <a:gd name="adj1" fmla="val 50000"/>
             </a:avLst>
           </a:prstGeom>
-          <a:ln w="28575">
+          <a:ln w="19050">
             <a:headEnd type="none" w="med" len="med"/>
             <a:tailEnd type="arrow" w="med" len="med"/>
           </a:ln>
@@ -4333,7 +4340,14 @@
           <a:lstStyle/>
           <a:p>
             <a:r>
-              <a:rPr lang="en-US" sz="1600" noProof="1"/>
+              <a:rPr lang="en-US" sz="1600" noProof="1">
+                <a:solidFill>
+                  <a:schemeClr val="tx1">
+                    <a:lumMod val="50000"/>
+                    <a:lumOff val="50000"/>
+                  </a:schemeClr>
+                </a:solidFill>
+              </a:rPr>
               <a:t>action[.action[.action]].definitionCanonical</a:t>
             </a:r>
           </a:p>
@@ -4579,7 +4593,7 @@
               <a:gd name="adj1" fmla="val 50000"/>
             </a:avLst>
           </a:prstGeom>
-          <a:ln w="28575">
+          <a:ln w="19050">
             <a:headEnd type="none" w="med" len="med"/>
             <a:tailEnd type="arrow" w="med" len="med"/>
           </a:ln>
@@ -4623,7 +4637,7 @@
           <a:prstGeom prst="bentConnector2">
             <a:avLst/>
           </a:prstGeom>
-          <a:ln w="28575">
+          <a:ln w="19050">
             <a:headEnd type="none" w="med" len="med"/>
             <a:tailEnd type="arrow" w="med" len="med"/>
           </a:ln>
@@ -4672,7 +4686,14 @@
           <a:lstStyle/>
           <a:p>
             <a:r>
-              <a:rPr lang="en-US" sz="1600" noProof="1"/>
+              <a:rPr lang="en-US" sz="1600" noProof="1">
+                <a:solidFill>
+                  <a:schemeClr val="tx1">
+                    <a:lumMod val="50000"/>
+                    <a:lumOff val="50000"/>
+                  </a:schemeClr>
+                </a:solidFill>
+              </a:rPr>
               <a:t>specimenRequested</a:t>
             </a:r>
           </a:p>
@@ -4742,7 +4763,14 @@
           <a:lstStyle/>
           <a:p>
             <a:r>
-              <a:rPr lang="en-US" sz="1600" noProof="1"/>
+              <a:rPr lang="en-US" sz="1600" noProof="1">
+                <a:solidFill>
+                  <a:schemeClr val="tx1">
+                    <a:lumMod val="50000"/>
+                    <a:lumOff val="50000"/>
+                  </a:schemeClr>
+                </a:solidFill>
+              </a:rPr>
               <a:t>observationRequirement</a:t>
             </a:r>
           </a:p>
@@ -4847,7 +4875,14 @@
           <a:lstStyle/>
           <a:p>
             <a:r>
-              <a:rPr lang="en-US" sz="1600" noProof="1"/>
+              <a:rPr lang="en-US" sz="1600" noProof="1">
+                <a:solidFill>
+                  <a:schemeClr val="tx1">
+                    <a:lumMod val="50000"/>
+                    <a:lumOff val="50000"/>
+                  </a:schemeClr>
+                </a:solidFill>
+              </a:rPr>
               <a:t>observationResultRequirement</a:t>
             </a:r>
           </a:p>
@@ -4883,14 +4918,7 @@
           <a:p>
             <a:pPr algn="r"/>
             <a:r>
-              <a:rPr lang="en-US" i="1" noProof="1">
-                <a:solidFill>
-                  <a:schemeClr val="accent1">
-                    <a:lumMod val="60000"/>
-                    <a:lumOff val="40000"/>
-                  </a:schemeClr>
-                </a:solidFill>
-              </a:rPr>
+              <a:rPr lang="en-US" i="1" noProof="1"/>
               <a:t>a laboratory compendium</a:t>
             </a:r>
           </a:p>
@@ -4910,8 +4938,8 @@
         </p:nvSpPr>
         <p:spPr>
           <a:xfrm>
-            <a:off x="6010128" y="906203"/>
-            <a:ext cx="6043942" cy="369332"/>
+            <a:off x="6056510" y="906203"/>
+            <a:ext cx="5830689" cy="369332"/>
           </a:xfrm>
           <a:prstGeom prst="rect">
             <a:avLst/>
@@ -4939,8 +4967,12 @@
           </a:lstStyle>
           <a:p>
             <a:r>
-              <a:rPr lang="en-US" i="1" noProof="1"/>
-              <a:t>a laboratory service accessible by the consumers of the catalog</a:t>
+              <a:rPr lang="en-US" i="1" noProof="1">
+                <a:solidFill>
+                  <a:schemeClr val="tx1"/>
+                </a:solidFill>
+              </a:rPr>
+              <a:t>a laboratory service exposed to the consumers of the catalog</a:t>
             </a:r>
           </a:p>
         </p:txBody>
@@ -4988,7 +5020,11 @@
           </a:lstStyle>
           <a:p>
             <a:r>
-              <a:rPr lang="en-US" i="1" noProof="1"/>
+              <a:rPr lang="en-US" i="1" noProof="1">
+                <a:solidFill>
+                  <a:schemeClr val="tx1"/>
+                </a:solidFill>
+              </a:rPr>
               <a:t>a laboratory procedure operationalizing the service </a:t>
             </a:r>
           </a:p>
@@ -5038,7 +5074,11 @@
           <a:p>
             <a:pPr algn="r"/>
             <a:r>
-              <a:rPr lang="en-US" i="1" noProof="1"/>
+              <a:rPr lang="en-US" i="1" noProof="1">
+                <a:solidFill>
+                  <a:schemeClr val="tx1"/>
+                </a:solidFill>
+              </a:rPr>
               <a:t>a specimen required by the service</a:t>
             </a:r>
           </a:p>
@@ -5088,7 +5128,11 @@
           <a:p>
             <a:pPr algn="r"/>
             <a:r>
-              <a:rPr lang="en-US" i="1" noProof="1"/>
+              <a:rPr lang="en-US" i="1" noProof="1">
+                <a:solidFill>
+                  <a:schemeClr val="tx1"/>
+                </a:solidFill>
+              </a:rPr>
               <a:t>an input observation to the procedure</a:t>
             </a:r>
           </a:p>
@@ -5137,7 +5181,11 @@
           </a:lstStyle>
           <a:p>
             <a:r>
-              <a:rPr lang="en-US" i="1" noProof="1"/>
+              <a:rPr lang="en-US" i="1" noProof="1">
+                <a:solidFill>
+                  <a:schemeClr val="tx1"/>
+                </a:solidFill>
+              </a:rPr>
               <a:t>an output observation of the procedure</a:t>
             </a:r>
           </a:p>
@@ -5255,7 +5303,7 @@
           <a:prstGeom prst="bentConnector2">
             <a:avLst/>
           </a:prstGeom>
-          <a:ln w="28575">
+          <a:ln w="19050">
             <a:headEnd type="none" w="med" len="med"/>
             <a:tailEnd type="arrow" w="med" len="med"/>
           </a:ln>
@@ -5299,7 +5347,7 @@
           <a:prstGeom prst="bentConnector2">
             <a:avLst/>
           </a:prstGeom>
-          <a:ln w="28575">
+          <a:ln w="19050">
             <a:headEnd type="none" w="med" len="med"/>
             <a:tailEnd type="arrow" w="med" len="med"/>
           </a:ln>
@@ -5522,7 +5570,7 @@
               <a:gd name="adj1" fmla="val 50000"/>
             </a:avLst>
           </a:prstGeom>
-          <a:ln w="28575">
+          <a:ln w="19050">
             <a:headEnd type="none" w="med" len="med"/>
             <a:tailEnd type="arrow" w="med" len="med"/>
           </a:ln>
@@ -5606,7 +5654,14 @@
           <a:lstStyle/>
           <a:p>
             <a:r>
-              <a:rPr lang="en-US" sz="1600" noProof="1"/>
+              <a:rPr lang="en-US" sz="1600" noProof="1">
+                <a:solidFill>
+                  <a:schemeClr val="tx1">
+                    <a:lumMod val="50000"/>
+                    <a:lumOff val="50000"/>
+                  </a:schemeClr>
+                </a:solidFill>
+              </a:rPr>
               <a:t>serviceBillingCode</a:t>
             </a:r>
           </a:p>
@@ -5642,14 +5697,7 @@
           <a:p>
             <a:pPr algn="r"/>
             <a:r>
-              <a:rPr lang="en-US" i="1" noProof="1">
-                <a:solidFill>
-                  <a:schemeClr val="accent1">
-                    <a:lumMod val="60000"/>
-                    <a:lumOff val="40000"/>
-                  </a:schemeClr>
-                </a:solidFill>
-              </a:rPr>
+              <a:rPr lang="en-US" i="1" noProof="1"/>
               <a:t>a billing code and its rules</a:t>
             </a:r>
           </a:p>
@@ -5699,7 +5747,11 @@
           <a:p>
             <a:pPr algn="ctr"/>
             <a:r>
-              <a:rPr lang="en-US" i="1" noProof="1"/>
+              <a:rPr lang="en-US" i="1" noProof="1">
+                <a:solidFill>
+                  <a:schemeClr val="tx1"/>
+                </a:solidFill>
+              </a:rPr>
               <a:t>valid|normal|abnormal|critical values</a:t>
             </a:r>
           </a:p>
@@ -5812,7 +5864,14 @@
           <a:lstStyle/>
           <a:p>
             <a:r>
-              <a:rPr lang="en-US" sz="1600" noProof="1"/>
+              <a:rPr lang="en-US" sz="1600" noProof="1">
+                <a:solidFill>
+                  <a:schemeClr val="tx1">
+                    <a:lumMod val="50000"/>
+                    <a:lumOff val="50000"/>
+                  </a:schemeClr>
+                </a:solidFill>
+              </a:rPr>
               <a:t>relatedArtifact (</a:t>
             </a:r>
             <a:r>
@@ -5826,7 +5885,14 @@
               <a:t>Includes</a:t>
             </a:r>
             <a:r>
-              <a:rPr lang="en-US" sz="1600" noProof="1"/>
+              <a:rPr lang="en-US" sz="1600" noProof="1">
+                <a:solidFill>
+                  <a:schemeClr val="tx1">
+                    <a:lumMod val="50000"/>
+                    <a:lumOff val="50000"/>
+                  </a:schemeClr>
+                </a:solidFill>
+              </a:rPr>
               <a:t>)</a:t>
             </a:r>
           </a:p>
@@ -6031,7 +6097,14 @@
           <a:lstStyle/>
           <a:p>
             <a:r>
-              <a:rPr lang="en-US" sz="1600" noProof="1"/>
+              <a:rPr lang="en-US" sz="1600" noProof="1">
+                <a:solidFill>
+                  <a:schemeClr val="tx1">
+                    <a:lumMod val="50000"/>
+                    <a:lumOff val="50000"/>
+                  </a:schemeClr>
+                </a:solidFill>
+              </a:rPr>
               <a:t>relatedArtifact (</a:t>
             </a:r>
             <a:r>
@@ -6045,7 +6118,14 @@
               <a:t>IsReplacedBy</a:t>
             </a:r>
             <a:r>
-              <a:rPr lang="en-US" sz="1600" noProof="1"/>
+              <a:rPr lang="en-US" sz="1600" noProof="1">
+                <a:solidFill>
+                  <a:schemeClr val="tx1">
+                    <a:lumMod val="50000"/>
+                    <a:lumOff val="50000"/>
+                  </a:schemeClr>
+                </a:solidFill>
+              </a:rPr>
               <a:t>)</a:t>
             </a:r>
           </a:p>
@@ -6381,7 +6461,7 @@
           <a:prstGeom prst="bentConnector2">
             <a:avLst/>
           </a:prstGeom>
-          <a:ln w="28575">
+          <a:ln w="19050">
             <a:headEnd type="none" w="med" len="med"/>
             <a:tailEnd type="arrow" w="med" len="med"/>
           </a:ln>

</xml_diff>